<commit_message>
added my tasks webpart sample
</commit_message>
<xml_diff>
--- a/slides/Inyección de dependencias en Spfx, sí, se puede.pptx
+++ b/slides/Inyección de dependencias en Spfx, sí, se puede.pptx
@@ -6,7 +6,8 @@
   </p:sldMasterIdLst>
   <p:sldIdLst>
     <p:sldId id="256" r:id="rId2"/>
-    <p:sldId id="257" r:id="rId3"/>
+    <p:sldId id="258" r:id="rId3"/>
+    <p:sldId id="257" r:id="rId4"/>
   </p:sldIdLst>
   <p:sldSz cx="12192000" cy="6858000"/>
   <p:notesSz cx="6858000" cy="9144000"/>
@@ -105,6 +106,11 @@
       </a:defRPr>
     </a:lvl9pPr>
   </p:defaultTextStyle>
+  <p:extLst>
+    <p:ext uri="{EFAFB233-063F-42B5-8137-9DF3F51BA10A}">
+      <p15:sldGuideLst xmlns:p15="http://schemas.microsoft.com/office/powerpoint/2012/main"/>
+    </p:ext>
+  </p:extLst>
 </p:presentation>
 </file>
 
@@ -156,70 +162,6 @@
           <inkml:channelProperty channel="F" name="resolution" value="0" units="1/dev"/>
         </inkml:channelProperties>
       </inkml:inkSource>
-      <inkml:timestamp xml:id="ts0" timeString="2019-06-01T06:28:02.507"/>
-    </inkml:context>
-    <inkml:brush xml:id="br0">
-      <inkml:brushProperty name="width" value="0.1" units="cm"/>
-      <inkml:brushProperty name="height" value="0.1" units="cm"/>
-      <inkml:brushProperty name="color" value="#AE198D"/>
-      <inkml:brushProperty name="inkEffects" value="galaxy"/>
-      <inkml:brushProperty name="anchorX" value="-10842.02832"/>
-      <inkml:brushProperty name="anchorY" value="-4485.45654"/>
-      <inkml:brushProperty name="scaleFactor" value="0.5"/>
-    </inkml:brush>
-  </inkml:definitions>
-  <inkml:trace contextRef="#ctx0" brushRef="#br0">1 0 3712,'0'0'0,"3"0"1696,4 2-1717,1 1 266,1 2-256,0 4-48,-1 3 1,-2 6 68,0 10-20,-1 9 831,-2 11-682,1 8 319,0 5-346,2 2 1131,4 7 37,5-5-1152,3-7 208,-13-45-301,1 0-1,5 8-34,-6-13-544,0-1 0,0 1 0,6 5 544,-6-8-66,-1 0-1,1-1 0,0 1 1,4 2 66,-4-4-326,-1 0 1,1 0 0,0-1-1,0 0 1,0 1 325,23 4-320,-2-5-464,-4-7 640,-5-5-1754,-4-3 1572,-6-4-1647,-3 3 917</inkml:trace>
-</inkml:ink>
-</file>
-
-<file path=ppt/ink/ink11.xml><?xml version="1.0" encoding="utf-8"?>
-<inkml:ink xmlns:inkml="http://www.w3.org/2003/InkML">
-  <inkml:definitions>
-    <inkml:context xml:id="ctx0">
-      <inkml:inkSource xml:id="inkSrc0">
-        <inkml:traceFormat>
-          <inkml:channel name="X" type="integer" min="-2.14748E9" max="2.14748E9" units="cm"/>
-          <inkml:channel name="Y" type="integer" min="-2.14748E9" max="2.14748E9" units="cm"/>
-          <inkml:channel name="F" type="integer" max="32767" units="dev"/>
-        </inkml:traceFormat>
-        <inkml:channelProperties>
-          <inkml:channelProperty channel="X" name="resolution" value="1000" units="1/cm"/>
-          <inkml:channelProperty channel="Y" name="resolution" value="1000" units="1/cm"/>
-          <inkml:channelProperty channel="F" name="resolution" value="0" units="1/dev"/>
-        </inkml:channelProperties>
-      </inkml:inkSource>
-      <inkml:timestamp xml:id="ts0" timeString="2019-06-01T06:28:02.807"/>
-    </inkml:context>
-    <inkml:brush xml:id="br0">
-      <inkml:brushProperty name="width" value="0.1" units="cm"/>
-      <inkml:brushProperty name="height" value="0.1" units="cm"/>
-      <inkml:brushProperty name="color" value="#AE198D"/>
-      <inkml:brushProperty name="inkEffects" value="galaxy"/>
-      <inkml:brushProperty name="anchorX" value="-11820.80859"/>
-      <inkml:brushProperty name="anchorY" value="-5730.18994"/>
-      <inkml:brushProperty name="scaleFactor" value="0.5"/>
-    </inkml:brush>
-  </inkml:definitions>
-  <inkml:trace contextRef="#ctx0" brushRef="#br0">1 49 1312,'0'0'0,"1"9"608,1 10-635,-2 2 742,2 1-624,0 0 149,3-2-155,4-5 587,4-4-549,6-6 410,4-7-453,3-5 688,3-7-619,0-3 1542,0-4-1414,-4-1 1664,-5-1-1599,-4 0 863,-8 0-602,-7 5-523,-1 17-46,0 0 0,0 0-1,-1-1 1,1 1 0,0 0 0,-1 0 0,1 0 0,-1 0 0,0 0 0,1 0 0,-1-1-34,-9-5 48,-4 6-224,-1 4 171,0 5-1793,0 2 1478,1 0-3919,3-1-1504</inkml:trace>
-</inkml:ink>
-</file>
-
-<file path=ppt/ink/ink12.xml><?xml version="1.0" encoding="utf-8"?>
-<inkml:ink xmlns:inkml="http://www.w3.org/2003/InkML">
-  <inkml:definitions>
-    <inkml:context xml:id="ctx0">
-      <inkml:inkSource xml:id="inkSrc0">
-        <inkml:traceFormat>
-          <inkml:channel name="X" type="integer" min="-2.14748E9" max="2.14748E9" units="cm"/>
-          <inkml:channel name="Y" type="integer" min="-2.14748E9" max="2.14748E9" units="cm"/>
-          <inkml:channel name="F" type="integer" max="32767" units="dev"/>
-        </inkml:traceFormat>
-        <inkml:channelProperties>
-          <inkml:channelProperty channel="X" name="resolution" value="1000" units="1/cm"/>
-          <inkml:channelProperty channel="Y" name="resolution" value="1000" units="1/cm"/>
-          <inkml:channelProperty channel="F" name="resolution" value="0" units="1/dev"/>
-        </inkml:channelProperties>
-      </inkml:inkSource>
       <inkml:timestamp xml:id="ts0" timeString="2019-06-01T06:28:03.291"/>
     </inkml:context>
     <inkml:brush xml:id="br0">
@@ -236,7 +178,7 @@
 </inkml:ink>
 </file>
 
-<file path=ppt/ink/ink13.xml><?xml version="1.0" encoding="utf-8"?>
+<file path=ppt/ink/ink11.xml><?xml version="1.0" encoding="utf-8"?>
 <inkml:ink xmlns:inkml="http://www.w3.org/2003/InkML">
   <inkml:definitions>
     <inkml:context xml:id="ctx0">
@@ -268,7 +210,7 @@
 </inkml:ink>
 </file>
 
-<file path=ppt/ink/ink14.xml><?xml version="1.0" encoding="utf-8"?>
+<file path=ppt/ink/ink12.xml><?xml version="1.0" encoding="utf-8"?>
 <inkml:ink xmlns:inkml="http://www.w3.org/2003/InkML">
   <inkml:definitions>
     <inkml:context xml:id="ctx0">
@@ -300,39 +242,7 @@
 </inkml:ink>
 </file>
 
-<file path=ppt/ink/ink15.xml><?xml version="1.0" encoding="utf-8"?>
-<inkml:ink xmlns:inkml="http://www.w3.org/2003/InkML">
-  <inkml:definitions>
-    <inkml:context xml:id="ctx0">
-      <inkml:inkSource xml:id="inkSrc0">
-        <inkml:traceFormat>
-          <inkml:channel name="X" type="integer" min="-2.14748E9" max="2.14748E9" units="cm"/>
-          <inkml:channel name="Y" type="integer" min="-2.14748E9" max="2.14748E9" units="cm"/>
-          <inkml:channel name="F" type="integer" max="32767" units="dev"/>
-        </inkml:traceFormat>
-        <inkml:channelProperties>
-          <inkml:channelProperty channel="X" name="resolution" value="1000" units="1/cm"/>
-          <inkml:channelProperty channel="Y" name="resolution" value="1000" units="1/cm"/>
-          <inkml:channelProperty channel="F" name="resolution" value="0" units="1/dev"/>
-        </inkml:channelProperties>
-      </inkml:inkSource>
-      <inkml:timestamp xml:id="ts0" timeString="2019-06-01T06:28:19.109"/>
-    </inkml:context>
-    <inkml:brush xml:id="br0">
-      <inkml:brushProperty name="width" value="0.1" units="cm"/>
-      <inkml:brushProperty name="height" value="0.1" units="cm"/>
-      <inkml:brushProperty name="color" value="#AE198D"/>
-      <inkml:brushProperty name="inkEffects" value="galaxy"/>
-      <inkml:brushProperty name="anchorX" value="-11412.89453"/>
-      <inkml:brushProperty name="anchorY" value="-7138.91748"/>
-      <inkml:brushProperty name="scaleFactor" value="0.5"/>
-    </inkml:brush>
-  </inkml:definitions>
-  <inkml:trace contextRef="#ctx0" brushRef="#br0">95 4 3968,'0'0'0,"2"-2"1824,4 1-1867,2 2 720,2 7-618,0 8-411,0 15 256,-2 16-341,-5 18 346,-7 19 155,-7 19-75,-7 12 1057,-5 6-892,-2 0 950,0-4-864,4-7 486,6-10-561,7-12 299,6-13-363,3-54 241,1 0-1,1 1-341,-1-9 44,1-1 1,0 1-1,2 1-44,-2-6 162,0-1-1,0 0 0,1-1 1,4 8-162,-4-8 32,0-1 0,1 0 0,0 1 0,0-1 0,1 0-32,-1 0 160,2 0 0,-1-1 0,0 0 0,5 3-160,-2-3 41,1 0-1,-1 0 1,6 1-41,35 6 726,8-6-593,5-5 443,8-5-432,2-4-27,1-1-74,-3 0-150,-3 1 107,-4 1-5,-6 4 0,-5 2-1339,-5 3 1130,-7 1-6900,-11 0 2261</inkml:trace>
-</inkml:ink>
-</file>
-
-<file path=ppt/ink/ink16.xml><?xml version="1.0" encoding="utf-8"?>
+<file path=ppt/ink/ink13.xml><?xml version="1.0" encoding="utf-8"?>
 <inkml:ink xmlns:inkml="http://www.w3.org/2003/InkML">
   <inkml:definitions>
     <inkml:context xml:id="ctx0">
@@ -364,7 +274,7 @@
 </inkml:ink>
 </file>
 
-<file path=ppt/ink/ink17.xml><?xml version="1.0" encoding="utf-8"?>
+<file path=ppt/ink/ink14.xml><?xml version="1.0" encoding="utf-8"?>
 <inkml:ink xmlns:inkml="http://www.w3.org/2003/InkML">
   <inkml:definitions>
     <inkml:context xml:id="ctx0">
@@ -396,7 +306,7 @@
 </inkml:ink>
 </file>
 
-<file path=ppt/ink/ink18.xml><?xml version="1.0" encoding="utf-8"?>
+<file path=ppt/ink/ink15.xml><?xml version="1.0" encoding="utf-8"?>
 <inkml:ink xmlns:inkml="http://www.w3.org/2003/InkML">
   <inkml:definitions>
     <inkml:context xml:id="ctx0">
@@ -428,7 +338,7 @@
 </inkml:ink>
 </file>
 
-<file path=ppt/ink/ink19.xml><?xml version="1.0" encoding="utf-8"?>
+<file path=ppt/ink/ink16.xml><?xml version="1.0" encoding="utf-8"?>
 <inkml:ink xmlns:inkml="http://www.w3.org/2003/InkML">
   <inkml:definitions>
     <inkml:context xml:id="ctx0">
@@ -457,6 +367,102 @@
     </inkml:brush>
   </inkml:definitions>
   <inkml:trace contextRef="#ctx0" brushRef="#br0">14 1 3808,'0'0'0,"-1"1"1728,0 2-1755,0 0 539,0 1-485,-1 1-118,0 2 59,0 2 0,1 2 32,0 5 704,0 5-571,1 8 582,0 9-571,0 7 656,5 18-197,2 2-566,3-1-154,1-6 117,1-8-715,-2-10 571,-2-10-2101,-3-12 1866,-3-8-2202,-3-10 2572,1 0 0,0 0-1,0 0 1,0 0 0,0 0 0,0 0 0,0 0-1,0 1 1,0-1 0,0 0 0,0 0 0,0 0 0,0 0-1,0 0 1,0 0 0,0 0 0,0 0 0,0 0-1,0 0 1,0 0 0,0 0 0,0 0 0,-1 0-1,1 0 1,0 0 0,0 0 0,0 0 0,0 0 0,0 0-1,0 0 1,0 1 0,0-1 0,0 0 0,0 0-1,0 0 1,-1 0 0,1-1 0,0 1 0,0 0 0,0 0-1,0 0 1,0 0 0,0 0 0,0 0 0,0 0-1,0 0 1,0 0 0,0 0 0,0 0 0,-1 0-1,1 0 1,0 0 0,0 0 0,0 0 9,-7-5-1323,-3-4 1009,-1-2-92,0 1 102</inkml:trace>
+</inkml:ink>
+</file>
+
+<file path=ppt/ink/ink17.xml><?xml version="1.0" encoding="utf-8"?>
+<inkml:ink xmlns:inkml="http://www.w3.org/2003/InkML">
+  <inkml:definitions>
+    <inkml:context xml:id="ctx0">
+      <inkml:inkSource xml:id="inkSrc0">
+        <inkml:traceFormat>
+          <inkml:channel name="X" type="integer" min="-2.14748E9" max="2.14748E9" units="cm"/>
+          <inkml:channel name="Y" type="integer" min="-2.14748E9" max="2.14748E9" units="cm"/>
+          <inkml:channel name="F" type="integer" max="32767" units="dev"/>
+        </inkml:traceFormat>
+        <inkml:channelProperties>
+          <inkml:channelProperty channel="X" name="resolution" value="1000" units="1/cm"/>
+          <inkml:channelProperty channel="Y" name="resolution" value="1000" units="1/cm"/>
+          <inkml:channelProperty channel="F" name="resolution" value="0" units="1/dev"/>
+        </inkml:channelProperties>
+      </inkml:inkSource>
+      <inkml:timestamp xml:id="ts0" timeString="2019-06-01T06:28:23.851"/>
+    </inkml:context>
+    <inkml:brush xml:id="br0">
+      <inkml:brushProperty name="width" value="0.1" units="cm"/>
+      <inkml:brushProperty name="height" value="0.1" units="cm"/>
+      <inkml:brushProperty name="color" value="#AE198D"/>
+      <inkml:brushProperty name="inkEffects" value="galaxy"/>
+      <inkml:brushProperty name="anchorX" value="-14637.45996"/>
+      <inkml:brushProperty name="anchorY" value="-11213.78125"/>
+      <inkml:brushProperty name="scaleFactor" value="0.5"/>
+    </inkml:brush>
+  </inkml:definitions>
+  <inkml:trace contextRef="#ctx0" brushRef="#br0">0 115 7872,'0'0'0,"10"-4"3584,13-1-3622,1-1 625,5-1-587,2-2-1275,3 0 1009,3-1-1569,0-2 1483,0-1-2299,-2-1 2129,-4 0-2731,-7 2 1503</inkml:trace>
+</inkml:ink>
+</file>
+
+<file path=ppt/ink/ink18.xml><?xml version="1.0" encoding="utf-8"?>
+<inkml:ink xmlns:inkml="http://www.w3.org/2003/InkML">
+  <inkml:definitions>
+    <inkml:context xml:id="ctx0">
+      <inkml:inkSource xml:id="inkSrc0">
+        <inkml:traceFormat>
+          <inkml:channel name="X" type="integer" min="-2.14748E9" max="2.14748E9" units="cm"/>
+          <inkml:channel name="Y" type="integer" min="-2.14748E9" max="2.14748E9" units="cm"/>
+          <inkml:channel name="F" type="integer" max="32767" units="dev"/>
+        </inkml:traceFormat>
+        <inkml:channelProperties>
+          <inkml:channelProperty channel="X" name="resolution" value="1000" units="1/cm"/>
+          <inkml:channelProperty channel="Y" name="resolution" value="1000" units="1/cm"/>
+          <inkml:channelProperty channel="F" name="resolution" value="0" units="1/dev"/>
+        </inkml:channelProperties>
+      </inkml:inkSource>
+      <inkml:timestamp xml:id="ts0" timeString="2019-06-01T06:28:24.552"/>
+    </inkml:context>
+    <inkml:brush xml:id="br0">
+      <inkml:brushProperty name="width" value="0.1" units="cm"/>
+      <inkml:brushProperty name="height" value="0.1" units="cm"/>
+      <inkml:brushProperty name="color" value="#AE198D"/>
+      <inkml:brushProperty name="inkEffects" value="galaxy"/>
+      <inkml:brushProperty name="anchorX" value="-15624.51367"/>
+      <inkml:brushProperty name="anchorY" value="-11734.63672"/>
+      <inkml:brushProperty name="scaleFactor" value="0.5"/>
+    </inkml:brush>
+  </inkml:definitions>
+  <inkml:trace contextRef="#ctx0" brushRef="#br0">100 1 3488,'0'0'0,"-4"0"1568,-4 1-1568,-2 3 187,-1 3-187,-3 4 10,0 5-15,0 5-331,1 4 283,5 2 197,5 1-134,6-3 737,6-5-651,-8-19-36,0 0 1,0 1-1,1-1 1,-1 1-1,1-1 0,-1 0 1,1 1-1,0-1 1,0 0-61,0 0 10,0 0 0,0 0 0,0-1 0,0 1 0,1 0 0,-1-1 0,0 1 0,1-1-10,23-1-203,3-7 182,1-5 245,-1-4-192,-3-2 416,-3 0-411,-4 0 1552,-4 2-223,-4 4-1244,-2 7 1025,-2 6-928,0 7-91,1 5-59,0 3-1893,0 1 1531,1-1-1377,-1-2 1350,0-4-880,0-4 987,-1-5-2699,-2-3-473</inkml:trace>
+</inkml:ink>
+</file>
+
+<file path=ppt/ink/ink19.xml><?xml version="1.0" encoding="utf-8"?>
+<inkml:ink xmlns:inkml="http://www.w3.org/2003/InkML">
+  <inkml:definitions>
+    <inkml:context xml:id="ctx0">
+      <inkml:inkSource xml:id="inkSrc0">
+        <inkml:traceFormat>
+          <inkml:channel name="X" type="integer" min="-2.14748E9" max="2.14748E9" units="cm"/>
+          <inkml:channel name="Y" type="integer" min="-2.14748E9" max="2.14748E9" units="cm"/>
+          <inkml:channel name="F" type="integer" max="32767" units="dev"/>
+        </inkml:traceFormat>
+        <inkml:channelProperties>
+          <inkml:channelProperty channel="X" name="resolution" value="1000" units="1/cm"/>
+          <inkml:channelProperty channel="Y" name="resolution" value="1000" units="1/cm"/>
+          <inkml:channelProperty channel="F" name="resolution" value="0" units="1/dev"/>
+        </inkml:channelProperties>
+      </inkml:inkSource>
+      <inkml:timestamp xml:id="ts0" timeString="2019-06-01T06:28:24.911"/>
+    </inkml:context>
+    <inkml:brush xml:id="br0">
+      <inkml:brushProperty name="width" value="0.1" units="cm"/>
+      <inkml:brushProperty name="height" value="0.1" units="cm"/>
+      <inkml:brushProperty name="color" value="#AE198D"/>
+      <inkml:brushProperty name="inkEffects" value="galaxy"/>
+      <inkml:brushProperty name="anchorX" value="-16507.94336"/>
+      <inkml:brushProperty name="anchorY" value="-12531.30469"/>
+      <inkml:brushProperty name="scaleFactor" value="0.5"/>
+    </inkml:brush>
+  </inkml:definitions>
+  <inkml:trace contextRef="#ctx0" brushRef="#br0">42 0 5408,'0'0'0,"-2"0"2432,-3 3-2464,-1 1 106,-2 1-143,1 2-1104,0 1 965,2 2 896,4 0-630,4 1 620,4 1-524,5 2-218,7 7-357,2 3 362,1 3-479,-3 1 436,-4 1 204,-7-2-92,-8-1 470,-6-2-384,-6-3 22,-3-3-81,-1-6-442,1-4 341,4-7-1957,11-1 2006,0 0 1,0 0-1,-1-1 1,1 1-1,0 0 1,0 0-1,-1 0 1,1 0 0,0-1-1,0 1 1,-1 0-1,1 0 1,0-1-1,0 1 1,0 0-1,-1 0 1,1-1 0,0 1-1,0 0 1,0-1-1,0 1 1,0 0-1,0-1 1,-1 1 14,4-15-3093,2 0 1450</inkml:trace>
 </inkml:ink>
 </file>
 
@@ -508,102 +514,6 @@
           <inkml:channelProperty channel="F" name="resolution" value="0" units="1/dev"/>
         </inkml:channelProperties>
       </inkml:inkSource>
-      <inkml:timestamp xml:id="ts0" timeString="2019-06-01T06:28:23.851"/>
-    </inkml:context>
-    <inkml:brush xml:id="br0">
-      <inkml:brushProperty name="width" value="0.1" units="cm"/>
-      <inkml:brushProperty name="height" value="0.1" units="cm"/>
-      <inkml:brushProperty name="color" value="#AE198D"/>
-      <inkml:brushProperty name="inkEffects" value="galaxy"/>
-      <inkml:brushProperty name="anchorX" value="-14637.45996"/>
-      <inkml:brushProperty name="anchorY" value="-11213.78125"/>
-      <inkml:brushProperty name="scaleFactor" value="0.5"/>
-    </inkml:brush>
-  </inkml:definitions>
-  <inkml:trace contextRef="#ctx0" brushRef="#br0">0 115 7872,'0'0'0,"10"-4"3584,13-1-3622,1-1 625,5-1-587,2-2-1275,3 0 1009,3-1-1569,0-2 1483,0-1-2299,-2-1 2129,-4 0-2731,-7 2 1503</inkml:trace>
-</inkml:ink>
-</file>
-
-<file path=ppt/ink/ink21.xml><?xml version="1.0" encoding="utf-8"?>
-<inkml:ink xmlns:inkml="http://www.w3.org/2003/InkML">
-  <inkml:definitions>
-    <inkml:context xml:id="ctx0">
-      <inkml:inkSource xml:id="inkSrc0">
-        <inkml:traceFormat>
-          <inkml:channel name="X" type="integer" min="-2.14748E9" max="2.14748E9" units="cm"/>
-          <inkml:channel name="Y" type="integer" min="-2.14748E9" max="2.14748E9" units="cm"/>
-          <inkml:channel name="F" type="integer" max="32767" units="dev"/>
-        </inkml:traceFormat>
-        <inkml:channelProperties>
-          <inkml:channelProperty channel="X" name="resolution" value="1000" units="1/cm"/>
-          <inkml:channelProperty channel="Y" name="resolution" value="1000" units="1/cm"/>
-          <inkml:channelProperty channel="F" name="resolution" value="0" units="1/dev"/>
-        </inkml:channelProperties>
-      </inkml:inkSource>
-      <inkml:timestamp xml:id="ts0" timeString="2019-06-01T06:28:24.552"/>
-    </inkml:context>
-    <inkml:brush xml:id="br0">
-      <inkml:brushProperty name="width" value="0.1" units="cm"/>
-      <inkml:brushProperty name="height" value="0.1" units="cm"/>
-      <inkml:brushProperty name="color" value="#AE198D"/>
-      <inkml:brushProperty name="inkEffects" value="galaxy"/>
-      <inkml:brushProperty name="anchorX" value="-15624.51367"/>
-      <inkml:brushProperty name="anchorY" value="-11734.63672"/>
-      <inkml:brushProperty name="scaleFactor" value="0.5"/>
-    </inkml:brush>
-  </inkml:definitions>
-  <inkml:trace contextRef="#ctx0" brushRef="#br0">100 1 3488,'0'0'0,"-4"0"1568,-4 1-1568,-2 3 187,-1 3-187,-3 4 10,0 5-15,0 5-331,1 4 283,5 2 197,5 1-134,6-3 737,6-5-651,-8-19-36,0 0 1,0 1-1,1-1 1,-1 1-1,1-1 0,-1 0 1,1 1-1,0-1 1,0 0-61,0 0 10,0 0 0,0 0 0,0-1 0,0 1 0,1 0 0,-1-1 0,0 1 0,1-1-10,23-1-203,3-7 182,1-5 245,-1-4-192,-3-2 416,-3 0-411,-4 0 1552,-4 2-223,-4 4-1244,-2 7 1025,-2 6-928,0 7-91,1 5-59,0 3-1893,0 1 1531,1-1-1377,-1-2 1350,0-4-880,0-4 987,-1-5-2699,-2-3-473</inkml:trace>
-</inkml:ink>
-</file>
-
-<file path=ppt/ink/ink22.xml><?xml version="1.0" encoding="utf-8"?>
-<inkml:ink xmlns:inkml="http://www.w3.org/2003/InkML">
-  <inkml:definitions>
-    <inkml:context xml:id="ctx0">
-      <inkml:inkSource xml:id="inkSrc0">
-        <inkml:traceFormat>
-          <inkml:channel name="X" type="integer" min="-2.14748E9" max="2.14748E9" units="cm"/>
-          <inkml:channel name="Y" type="integer" min="-2.14748E9" max="2.14748E9" units="cm"/>
-          <inkml:channel name="F" type="integer" max="32767" units="dev"/>
-        </inkml:traceFormat>
-        <inkml:channelProperties>
-          <inkml:channelProperty channel="X" name="resolution" value="1000" units="1/cm"/>
-          <inkml:channelProperty channel="Y" name="resolution" value="1000" units="1/cm"/>
-          <inkml:channelProperty channel="F" name="resolution" value="0" units="1/dev"/>
-        </inkml:channelProperties>
-      </inkml:inkSource>
-      <inkml:timestamp xml:id="ts0" timeString="2019-06-01T06:28:24.911"/>
-    </inkml:context>
-    <inkml:brush xml:id="br0">
-      <inkml:brushProperty name="width" value="0.1" units="cm"/>
-      <inkml:brushProperty name="height" value="0.1" units="cm"/>
-      <inkml:brushProperty name="color" value="#AE198D"/>
-      <inkml:brushProperty name="inkEffects" value="galaxy"/>
-      <inkml:brushProperty name="anchorX" value="-16507.94336"/>
-      <inkml:brushProperty name="anchorY" value="-12531.30469"/>
-      <inkml:brushProperty name="scaleFactor" value="0.5"/>
-    </inkml:brush>
-  </inkml:definitions>
-  <inkml:trace contextRef="#ctx0" brushRef="#br0">42 0 5408,'0'0'0,"-2"0"2432,-3 3-2464,-1 1 106,-2 1-143,1 2-1104,0 1 965,2 2 896,4 0-630,4 1 620,4 1-524,5 2-218,7 7-357,2 3 362,1 3-479,-3 1 436,-4 1 204,-7-2-92,-8-1 470,-6-2-384,-6-3 22,-3-3-81,-1-6-442,1-4 341,4-7-1957,11-1 2006,0 0 1,0 0-1,-1-1 1,1 1-1,0 0 1,0 0-1,-1 0 1,1 0 0,0-1-1,0 1 1,-1 0-1,1 0 1,0-1-1,0 1 1,0 0-1,-1 0 1,1-1 0,0 1-1,0 0 1,0-1-1,0 1 1,0 0-1,0-1 1,-1 1 14,4-15-3093,2 0 1450</inkml:trace>
-</inkml:ink>
-</file>
-
-<file path=ppt/ink/ink23.xml><?xml version="1.0" encoding="utf-8"?>
-<inkml:ink xmlns:inkml="http://www.w3.org/2003/InkML">
-  <inkml:definitions>
-    <inkml:context xml:id="ctx0">
-      <inkml:inkSource xml:id="inkSrc0">
-        <inkml:traceFormat>
-          <inkml:channel name="X" type="integer" min="-2.14748E9" max="2.14748E9" units="cm"/>
-          <inkml:channel name="Y" type="integer" min="-2.14748E9" max="2.14748E9" units="cm"/>
-          <inkml:channel name="F" type="integer" max="32767" units="dev"/>
-        </inkml:traceFormat>
-        <inkml:channelProperties>
-          <inkml:channelProperty channel="X" name="resolution" value="1000" units="1/cm"/>
-          <inkml:channelProperty channel="Y" name="resolution" value="1000" units="1/cm"/>
-          <inkml:channelProperty channel="F" name="resolution" value="0" units="1/dev"/>
-        </inkml:channelProperties>
-      </inkml:inkSource>
       <inkml:timestamp xml:id="ts0" timeString="2019-06-01T06:28:25.255"/>
     </inkml:context>
     <inkml:brush xml:id="br0">
@@ -620,7 +530,7 @@
 </inkml:ink>
 </file>
 
-<file path=ppt/ink/ink24.xml><?xml version="1.0" encoding="utf-8"?>
+<file path=ppt/ink/ink21.xml><?xml version="1.0" encoding="utf-8"?>
 <inkml:ink xmlns:inkml="http://www.w3.org/2003/InkML">
   <inkml:definitions>
     <inkml:context xml:id="ctx0">
@@ -652,7 +562,7 @@
 </inkml:ink>
 </file>
 
-<file path=ppt/ink/ink25.xml><?xml version="1.0" encoding="utf-8"?>
+<file path=ppt/ink/ink22.xml><?xml version="1.0" encoding="utf-8"?>
 <inkml:ink xmlns:inkml="http://www.w3.org/2003/InkML">
   <inkml:definitions>
     <inkml:context xml:id="ctx0">
@@ -684,7 +594,7 @@
 </inkml:ink>
 </file>
 
-<file path=ppt/ink/ink26.xml><?xml version="1.0" encoding="utf-8"?>
+<file path=ppt/ink/ink23.xml><?xml version="1.0" encoding="utf-8"?>
 <inkml:ink xmlns:inkml="http://www.w3.org/2003/InkML">
   <inkml:definitions>
     <inkml:context xml:id="ctx0">
@@ -716,7 +626,7 @@
 </inkml:ink>
 </file>
 
-<file path=ppt/ink/ink27.xml><?xml version="1.0" encoding="utf-8"?>
+<file path=ppt/ink/ink24.xml><?xml version="1.0" encoding="utf-8"?>
 <inkml:ink xmlns:inkml="http://www.w3.org/2003/InkML">
   <inkml:definitions>
     <inkml:context xml:id="ctx0">
@@ -748,7 +658,7 @@
 </inkml:ink>
 </file>
 
-<file path=ppt/ink/ink28.xml><?xml version="1.0" encoding="utf-8"?>
+<file path=ppt/ink/ink25.xml><?xml version="1.0" encoding="utf-8"?>
 <inkml:ink xmlns:inkml="http://www.w3.org/2003/InkML">
   <inkml:definitions>
     <inkml:context xml:id="ctx0">
@@ -780,7 +690,7 @@
 </inkml:ink>
 </file>
 
-<file path=ppt/ink/ink29.xml><?xml version="1.0" encoding="utf-8"?>
+<file path=ppt/ink/ink26.xml><?xml version="1.0" encoding="utf-8"?>
 <inkml:ink xmlns:inkml="http://www.w3.org/2003/InkML">
   <inkml:definitions>
     <inkml:context xml:id="ctx0">
@@ -809,6 +719,102 @@
     </inkml:brush>
   </inkml:definitions>
   <inkml:trace contextRef="#ctx0" brushRef="#br0">62 1 4064,'0'0'0,"-3"2"1824,-4 2-1830,1 0 1494,-1 1-1285,-1 0 501,0 0-597,1-1-1195,1-1 917,0-3-4394,3-1 2133</inkml:trace>
+</inkml:ink>
+</file>
+
+<file path=ppt/ink/ink27.xml><?xml version="1.0" encoding="utf-8"?>
+<inkml:ink xmlns:inkml="http://www.w3.org/2003/InkML">
+  <inkml:definitions>
+    <inkml:context xml:id="ctx0">
+      <inkml:inkSource xml:id="inkSrc0">
+        <inkml:traceFormat>
+          <inkml:channel name="X" type="integer" min="-2.14748E9" max="2.14748E9" units="cm"/>
+          <inkml:channel name="Y" type="integer" min="-2.14748E9" max="2.14748E9" units="cm"/>
+          <inkml:channel name="F" type="integer" max="32767" units="dev"/>
+        </inkml:traceFormat>
+        <inkml:channelProperties>
+          <inkml:channelProperty channel="X" name="resolution" value="1000" units="1/cm"/>
+          <inkml:channelProperty channel="Y" name="resolution" value="1000" units="1/cm"/>
+          <inkml:channelProperty channel="F" name="resolution" value="0" units="1/dev"/>
+        </inkml:channelProperties>
+      </inkml:inkSource>
+      <inkml:timestamp xml:id="ts0" timeString="2019-06-01T06:28:28.644"/>
+    </inkml:context>
+    <inkml:brush xml:id="br0">
+      <inkml:brushProperty name="width" value="0.1" units="cm"/>
+      <inkml:brushProperty name="height" value="0.1" units="cm"/>
+      <inkml:brushProperty name="color" value="#AE198D"/>
+      <inkml:brushProperty name="inkEffects" value="galaxy"/>
+      <inkml:brushProperty name="anchorX" value="-18114.04102"/>
+      <inkml:brushProperty name="anchorY" value="-14517.375"/>
+      <inkml:brushProperty name="scaleFactor" value="0.5"/>
+    </inkml:brush>
+  </inkml:definitions>
+  <inkml:trace contextRef="#ctx0" brushRef="#br0">129 1 6656,'0'0'0,"-6"8"3008,-6 10-3062,-2 6 652,-4 5-598,-2 7 106,0 3-90,1 5-165,6 7-811,6-5 779,7-41-211,0 1 1,1 1-1,-1-1 1,1 0-1,0 1 392,0-6-36,-1 1-1,1 0 0,0 0 0,-1 1 0,1-1 0,0 0 1,0-1-1,1 1 0,-1 0 0,0 0 0,1 0 37,-1-1-240,0 0-1,0-1 0,0 1 1,0 0-1,0-1 0,0 1 1,0 0-1,0-1 1,0 1-1,1-1 0,-1 0 1,0 1-1,0-1 0,1 0 1,-1 0-1,0 0 1,0 0 240,2 0-85,-1 0 1,1 0 0,-1 0 0,1-1 0,0 1 0,-1-1 0,1 0-1,-1 0 1,2-1 84,1 0-306,1-2-1,0 1 0,-1 0 1,4-4 306,17-14-523</inkml:trace>
+</inkml:ink>
+</file>
+
+<file path=ppt/ink/ink28.xml><?xml version="1.0" encoding="utf-8"?>
+<inkml:ink xmlns:inkml="http://www.w3.org/2003/InkML">
+  <inkml:definitions>
+    <inkml:context xml:id="ctx0">
+      <inkml:inkSource xml:id="inkSrc0">
+        <inkml:traceFormat>
+          <inkml:channel name="X" type="integer" min="-2.14748E9" max="2.14748E9" units="cm"/>
+          <inkml:channel name="Y" type="integer" min="-2.14748E9" max="2.14748E9" units="cm"/>
+          <inkml:channel name="F" type="integer" max="32767" units="dev"/>
+        </inkml:traceFormat>
+        <inkml:channelProperties>
+          <inkml:channelProperty channel="X" name="resolution" value="1000" units="1/cm"/>
+          <inkml:channelProperty channel="Y" name="resolution" value="1000" units="1/cm"/>
+          <inkml:channelProperty channel="F" name="resolution" value="0" units="1/dev"/>
+        </inkml:channelProperties>
+      </inkml:inkSource>
+      <inkml:timestamp xml:id="ts0" timeString="2019-06-01T06:28:28.941"/>
+    </inkml:context>
+    <inkml:brush xml:id="br0">
+      <inkml:brushProperty name="width" value="0.1" units="cm"/>
+      <inkml:brushProperty name="height" value="0.1" units="cm"/>
+      <inkml:brushProperty name="color" value="#AE198D"/>
+      <inkml:brushProperty name="inkEffects" value="galaxy"/>
+      <inkml:brushProperty name="anchorX" value="-17469.42188"/>
+      <inkml:brushProperty name="anchorY" value="-14199.4668"/>
+      <inkml:brushProperty name="scaleFactor" value="0.5"/>
+    </inkml:brush>
+  </inkml:definitions>
+  <inkml:trace contextRef="#ctx0" brushRef="#br0">1 48 4896,'0'0'0,"3"2"2208,5 2-2240,1-1 1946,1 0-1663,3-2 762,1-1-783,2-2 276,1-6-63,0-1-374,-3-2 859,-5 1-752,-5 0 358,-6 2-401,-6 5 475,-4 6-485,-4 6 1418,-1 8-1269,1 8 2106,4 8-1946,4 8 512,6 4-757,6 1-2496,4-3 1941,7-5-4139,-13-35 4371,1 1 0,-1 0 0,1 0 0,0 0 0,0 0 0,1-1 136,-2-1-609,0-1-1,0 1 1,0-1-1,0 0 0,0 1 1,0-1-1,0 0 1,1 0-1,-1 0 0,2 0 610,-1-1-121,-1 0 0,1 0 0,0 0 0,-1 0 0,1 0 0,0 0 0,-1-1 0,1 1 0,-1-1 0,3 0 121,0-2-490,0 1 0,0 0 1,0-1-1,-1 0 0,1 0 0,1-1 490,23-19-1360</inkml:trace>
+</inkml:ink>
+</file>
+
+<file path=ppt/ink/ink29.xml><?xml version="1.0" encoding="utf-8"?>
+<inkml:ink xmlns:inkml="http://www.w3.org/2003/InkML">
+  <inkml:definitions>
+    <inkml:context xml:id="ctx0">
+      <inkml:inkSource xml:id="inkSrc0">
+        <inkml:traceFormat>
+          <inkml:channel name="X" type="integer" min="-2.14748E9" max="2.14748E9" units="cm"/>
+          <inkml:channel name="Y" type="integer" min="-2.14748E9" max="2.14748E9" units="cm"/>
+          <inkml:channel name="F" type="integer" max="32767" units="dev"/>
+        </inkml:traceFormat>
+        <inkml:channelProperties>
+          <inkml:channelProperty channel="X" name="resolution" value="1000" units="1/cm"/>
+          <inkml:channelProperty channel="Y" name="resolution" value="1000" units="1/cm"/>
+          <inkml:channelProperty channel="F" name="resolution" value="0" units="1/dev"/>
+        </inkml:channelProperties>
+      </inkml:inkSource>
+      <inkml:timestamp xml:id="ts0" timeString="2019-06-01T06:28:38.341"/>
+    </inkml:context>
+    <inkml:brush xml:id="br0">
+      <inkml:brushProperty name="width" value="0.1" units="cm"/>
+      <inkml:brushProperty name="height" value="0.1" units="cm"/>
+      <inkml:brushProperty name="color" value="#AE198D"/>
+      <inkml:brushProperty name="inkEffects" value="galaxy"/>
+      <inkml:brushProperty name="anchorX" value="-18313.09375"/>
+      <inkml:brushProperty name="anchorY" value="-15080.79785"/>
+      <inkml:brushProperty name="scaleFactor" value="0.5"/>
+    </inkml:brush>
+  </inkml:definitions>
+  <inkml:trace contextRef="#ctx0" brushRef="#br0">0 1498 1056,'0'0'0,"4"1"480,3 1-448,1-1 1024,3-1-880,3-2 1109,6-2-1061,8-2 891,9 0-865,14 1 700,13 2-737,13-1 27,13 1-171,11 0-170,31-2 256,3-1-129,-2-3 81,-9-3-54,-14-1-207,-14-4 132,-14-1 321,-12 0-283,-13-1 443,-11 0-422,-10-2 582,-9 0-507,-8-1 272,-7-4-304,-8-3 154,-6-6-164,-7-4 154,-6-6-198,-5-5 284,-6-5-273,-3-6 384,-4-5-373,-1-4 566,-1-1-502,3 1 197,1 4-245,5 4 59,3 6-65,4 8-212,3 8 132,4 7-90,2 7 59,3 6-203,3 6 208,3 3-32,7 3 85,9 1 545,14 0-449,18-2 390,19-3-406,20-3 43,19-2-96,14-4-27,10 0 1,4-1 218,-4 1-176,-7 1 26,-12 1-42,-14 3-704,-14 2 571,-15 1-2896,-14 1 2501,-11 1-5083,-13 3 2678</inkml:trace>
 </inkml:ink>
 </file>
 
@@ -860,102 +866,6 @@
           <inkml:channelProperty channel="F" name="resolution" value="0" units="1/dev"/>
         </inkml:channelProperties>
       </inkml:inkSource>
-      <inkml:timestamp xml:id="ts0" timeString="2019-06-01T06:28:28.644"/>
-    </inkml:context>
-    <inkml:brush xml:id="br0">
-      <inkml:brushProperty name="width" value="0.1" units="cm"/>
-      <inkml:brushProperty name="height" value="0.1" units="cm"/>
-      <inkml:brushProperty name="color" value="#AE198D"/>
-      <inkml:brushProperty name="inkEffects" value="galaxy"/>
-      <inkml:brushProperty name="anchorX" value="-18114.04102"/>
-      <inkml:brushProperty name="anchorY" value="-14517.375"/>
-      <inkml:brushProperty name="scaleFactor" value="0.5"/>
-    </inkml:brush>
-  </inkml:definitions>
-  <inkml:trace contextRef="#ctx0" brushRef="#br0">129 1 6656,'0'0'0,"-6"8"3008,-6 10-3062,-2 6 652,-4 5-598,-2 7 106,0 3-90,1 5-165,6 7-811,6-5 779,7-41-211,0 1 1,1 1-1,-1-1 1,1 0-1,0 1 392,0-6-36,-1 1-1,1 0 0,0 0 0,-1 1 0,1-1 0,0 0 1,0-1-1,1 1 0,-1 0 0,0 0 0,1 0 37,-1-1-240,0 0-1,0-1 0,0 1 1,0 0-1,0-1 0,0 1 1,0 0-1,0-1 1,0 1-1,1-1 0,-1 0 1,0 1-1,0-1 0,1 0 1,-1 0-1,0 0 1,0 0 240,2 0-85,-1 0 1,1 0 0,-1 0 0,1-1 0,0 1 0,-1-1 0,1 0-1,-1 0 1,2-1 84,1 0-306,1-2-1,0 1 0,-1 0 1,4-4 306,17-14-523</inkml:trace>
-</inkml:ink>
-</file>
-
-<file path=ppt/ink/ink31.xml><?xml version="1.0" encoding="utf-8"?>
-<inkml:ink xmlns:inkml="http://www.w3.org/2003/InkML">
-  <inkml:definitions>
-    <inkml:context xml:id="ctx0">
-      <inkml:inkSource xml:id="inkSrc0">
-        <inkml:traceFormat>
-          <inkml:channel name="X" type="integer" min="-2.14748E9" max="2.14748E9" units="cm"/>
-          <inkml:channel name="Y" type="integer" min="-2.14748E9" max="2.14748E9" units="cm"/>
-          <inkml:channel name="F" type="integer" max="32767" units="dev"/>
-        </inkml:traceFormat>
-        <inkml:channelProperties>
-          <inkml:channelProperty channel="X" name="resolution" value="1000" units="1/cm"/>
-          <inkml:channelProperty channel="Y" name="resolution" value="1000" units="1/cm"/>
-          <inkml:channelProperty channel="F" name="resolution" value="0" units="1/dev"/>
-        </inkml:channelProperties>
-      </inkml:inkSource>
-      <inkml:timestamp xml:id="ts0" timeString="2019-06-01T06:28:28.941"/>
-    </inkml:context>
-    <inkml:brush xml:id="br0">
-      <inkml:brushProperty name="width" value="0.1" units="cm"/>
-      <inkml:brushProperty name="height" value="0.1" units="cm"/>
-      <inkml:brushProperty name="color" value="#AE198D"/>
-      <inkml:brushProperty name="inkEffects" value="galaxy"/>
-      <inkml:brushProperty name="anchorX" value="-17469.42188"/>
-      <inkml:brushProperty name="anchorY" value="-14199.4668"/>
-      <inkml:brushProperty name="scaleFactor" value="0.5"/>
-    </inkml:brush>
-  </inkml:definitions>
-  <inkml:trace contextRef="#ctx0" brushRef="#br0">1 48 4896,'0'0'0,"3"2"2208,5 2-2240,1-1 1946,1 0-1663,3-2 762,1-1-783,2-2 276,1-6-63,0-1-374,-3-2 859,-5 1-752,-5 0 358,-6 2-401,-6 5 475,-4 6-485,-4 6 1418,-1 8-1269,1 8 2106,4 8-1946,4 8 512,6 4-757,6 1-2496,4-3 1941,7-5-4139,-13-35 4371,1 1 0,-1 0 0,1 0 0,0 0 0,0 0 0,1-1 136,-2-1-609,0-1-1,0 1 1,0-1-1,0 0 0,0 1 1,0-1-1,0 0 1,1 0-1,-1 0 0,2 0 610,-1-1-121,-1 0 0,1 0 0,0 0 0,-1 0 0,1 0 0,0 0 0,-1-1 0,1 1 0,-1-1 0,3 0 121,0-2-490,0 1 0,0 0 1,0-1-1,-1 0 0,1 0 0,1-1 490,23-19-1360</inkml:trace>
-</inkml:ink>
-</file>
-
-<file path=ppt/ink/ink32.xml><?xml version="1.0" encoding="utf-8"?>
-<inkml:ink xmlns:inkml="http://www.w3.org/2003/InkML">
-  <inkml:definitions>
-    <inkml:context xml:id="ctx0">
-      <inkml:inkSource xml:id="inkSrc0">
-        <inkml:traceFormat>
-          <inkml:channel name="X" type="integer" min="-2.14748E9" max="2.14748E9" units="cm"/>
-          <inkml:channel name="Y" type="integer" min="-2.14748E9" max="2.14748E9" units="cm"/>
-          <inkml:channel name="F" type="integer" max="32767" units="dev"/>
-        </inkml:traceFormat>
-        <inkml:channelProperties>
-          <inkml:channelProperty channel="X" name="resolution" value="1000" units="1/cm"/>
-          <inkml:channelProperty channel="Y" name="resolution" value="1000" units="1/cm"/>
-          <inkml:channelProperty channel="F" name="resolution" value="0" units="1/dev"/>
-        </inkml:channelProperties>
-      </inkml:inkSource>
-      <inkml:timestamp xml:id="ts0" timeString="2019-06-01T06:28:38.341"/>
-    </inkml:context>
-    <inkml:brush xml:id="br0">
-      <inkml:brushProperty name="width" value="0.1" units="cm"/>
-      <inkml:brushProperty name="height" value="0.1" units="cm"/>
-      <inkml:brushProperty name="color" value="#AE198D"/>
-      <inkml:brushProperty name="inkEffects" value="galaxy"/>
-      <inkml:brushProperty name="anchorX" value="-18313.09375"/>
-      <inkml:brushProperty name="anchorY" value="-15080.79785"/>
-      <inkml:brushProperty name="scaleFactor" value="0.5"/>
-    </inkml:brush>
-  </inkml:definitions>
-  <inkml:trace contextRef="#ctx0" brushRef="#br0">0 1498 1056,'0'0'0,"4"1"480,3 1-448,1-1 1024,3-1-880,3-2 1109,6-2-1061,8-2 891,9 0-865,14 1 700,13 2-737,13-1 27,13 1-171,11 0-170,31-2 256,3-1-129,-2-3 81,-9-3-54,-14-1-207,-14-4 132,-14-1 321,-12 0-283,-13-1 443,-11 0-422,-10-2 582,-9 0-507,-8-1 272,-7-4-304,-8-3 154,-6-6-164,-7-4 154,-6-6-198,-5-5 284,-6-5-273,-3-6 384,-4-5-373,-1-4 566,-1-1-502,3 1 197,1 4-245,5 4 59,3 6-65,4 8-212,3 8 132,4 7-90,2 7 59,3 6-203,3 6 208,3 3-32,7 3 85,9 1 545,14 0-449,18-2 390,19-3-406,20-3 43,19-2-96,14-4-27,10 0 1,4-1 218,-4 1-176,-7 1 26,-12 1-42,-14 3-704,-14 2 571,-15 1-2896,-14 1 2501,-11 1-5083,-13 3 2678</inkml:trace>
-</inkml:ink>
-</file>
-
-<file path=ppt/ink/ink33.xml><?xml version="1.0" encoding="utf-8"?>
-<inkml:ink xmlns:inkml="http://www.w3.org/2003/InkML">
-  <inkml:definitions>
-    <inkml:context xml:id="ctx0">
-      <inkml:inkSource xml:id="inkSrc0">
-        <inkml:traceFormat>
-          <inkml:channel name="X" type="integer" min="-2.14748E9" max="2.14748E9" units="cm"/>
-          <inkml:channel name="Y" type="integer" min="-2.14748E9" max="2.14748E9" units="cm"/>
-          <inkml:channel name="F" type="integer" max="32767" units="dev"/>
-        </inkml:traceFormat>
-        <inkml:channelProperties>
-          <inkml:channelProperty channel="X" name="resolution" value="1000" units="1/cm"/>
-          <inkml:channelProperty channel="Y" name="resolution" value="1000" units="1/cm"/>
-          <inkml:channelProperty channel="F" name="resolution" value="0" units="1/dev"/>
-        </inkml:channelProperties>
-      </inkml:inkSource>
       <inkml:timestamp xml:id="ts0" timeString="2019-06-01T06:28:39.147"/>
     </inkml:context>
     <inkml:brush xml:id="br0">
@@ -972,7 +882,7 @@
 </inkml:ink>
 </file>
 
-<file path=ppt/ink/ink34.xml><?xml version="1.0" encoding="utf-8"?>
+<file path=ppt/ink/ink31.xml><?xml version="1.0" encoding="utf-8"?>
 <inkml:ink xmlns:inkml="http://www.w3.org/2003/InkML">
   <inkml:definitions>
     <inkml:context xml:id="ctx0">
@@ -1004,7 +914,7 @@
 </inkml:ink>
 </file>
 
-<file path=ppt/ink/ink35.xml><?xml version="1.0" encoding="utf-8"?>
+<file path=ppt/ink/ink32.xml><?xml version="1.0" encoding="utf-8"?>
 <inkml:ink xmlns:inkml="http://www.w3.org/2003/InkML">
   <inkml:definitions>
     <inkml:context xml:id="ctx0">
@@ -1036,7 +946,7 @@
 </inkml:ink>
 </file>
 
-<file path=ppt/ink/ink36.xml><?xml version="1.0" encoding="utf-8"?>
+<file path=ppt/ink/ink33.xml><?xml version="1.0" encoding="utf-8"?>
 <inkml:ink xmlns:inkml="http://www.w3.org/2003/InkML">
   <inkml:definitions>
     <inkml:context xml:id="ctx0">
@@ -1068,7 +978,7 @@
 </inkml:ink>
 </file>
 
-<file path=ppt/ink/ink37.xml><?xml version="1.0" encoding="utf-8"?>
+<file path=ppt/ink/ink34.xml><?xml version="1.0" encoding="utf-8"?>
 <inkml:ink xmlns:inkml="http://www.w3.org/2003/InkML">
   <inkml:definitions>
     <inkml:context xml:id="ctx0">
@@ -1100,7 +1010,7 @@
 </inkml:ink>
 </file>
 
-<file path=ppt/ink/ink38.xml><?xml version="1.0" encoding="utf-8"?>
+<file path=ppt/ink/ink35.xml><?xml version="1.0" encoding="utf-8"?>
 <inkml:ink xmlns:inkml="http://www.w3.org/2003/InkML">
   <inkml:definitions>
     <inkml:context xml:id="ctx0">
@@ -1132,7 +1042,7 @@
 </inkml:ink>
 </file>
 
-<file path=ppt/ink/ink39.xml><?xml version="1.0" encoding="utf-8"?>
+<file path=ppt/ink/ink36.xml><?xml version="1.0" encoding="utf-8"?>
 <inkml:ink xmlns:inkml="http://www.w3.org/2003/InkML">
   <inkml:definitions>
     <inkml:context xml:id="ctx0">
@@ -1161,6 +1071,102 @@
     </inkml:brush>
   </inkml:definitions>
   <inkml:trace contextRef="#ctx0" brushRef="#br0">223 167 3136,'0'0'0,"-1"-1"1440,0 1-1456,-3 2 117,-1 2-122,-2 4-6,-1 8 27,-3 8-117,-2 11 112,-3 10-75,-1 9 21,-1 10 70,1 5-22,1 2 1243,0-3-1024,3-7 1040,0-9-998,3-11 598,2-12-672,1-13 182,7-16-356,0 0 0,0 1 0,0-1 0,0 0 0,0 0 0,0 0 0,0 1 0,0-1 0,0 0 0,-1 0 0,1 0 0,0 0 0,0 1 0,0-1 0,0 0 0,0 0 0,-1 0 0,1 0 0,0 0 0,0 1 0,0-1 0,-1 0 0,1 0 0,0 0 0,0 0 0,0 0 0,-1 0 0,1 0 0,0 0 0,0 0 0,0 0 0,-1 0-2,-2-16 538,1-11 262,1-11-581,0-5 992,0-4-971,0-2 714,-2-4-772,1-4 367,0-4-458,1-3 42,3-2-101,3 3-288,4 3 224,5 8-197,3 7 165,4 10-534,1 9 454,0 8-341,-19 17 470,0-1 0,0 1 0,-1 0 0,1 0-1,1 0 1,1 0 15,-2 1-29,-1-1 0,1 1 0,0 0 1,-1 0-1,1 1 0,0-1 0,1 1 29,0 0-8,-1 0 0,0 0 0,1 0 0,-1 1 0,0-1 0,2 2 8,20 18-6,1 10-4,1 8 10,2 7 0,2 4-411,2 1 342,1-2 26,-1-4 27,-2-6 421,-3-6-298,-5-7 1045,-7-6-928,-7-5 837,-9-14-1050,0-1-1,1 1 0,-1 0 1,0-1-1,0 1 0,0-1 1,0 1-1,0-1 1,0 1-1,0 0 0,0-1 1,0 1-1,0-1 0,0 1 1,0-1-1,0 1 1,-1-1-1,1 1-10,0 0 44,-1-1 1,1 1-1,-1 0 1,1-1-1,-1 1 1,1-1-1,-1 1 0,0-1 1,1 0-1,-1 1 1,1-1-1,-1 0 1,0 1-1,1-1 1,-2 0-45,-16 5 138,-9-3 65,-7-2-144,-9 0-278,-4 0 182,-1-2-1195,1 0 1045,6 0-3349,7-2 2896,11-2-5125,9 2 2320</inkml:trace>
+</inkml:ink>
+</file>
+
+<file path=ppt/ink/ink37.xml><?xml version="1.0" encoding="utf-8"?>
+<inkml:ink xmlns:inkml="http://www.w3.org/2003/InkML">
+  <inkml:definitions>
+    <inkml:context xml:id="ctx0">
+      <inkml:inkSource xml:id="inkSrc0">
+        <inkml:traceFormat>
+          <inkml:channel name="X" type="integer" min="-2.14748E9" max="2.14748E9" units="cm"/>
+          <inkml:channel name="Y" type="integer" min="-2.14748E9" max="2.14748E9" units="cm"/>
+          <inkml:channel name="F" type="integer" max="32767" units="dev"/>
+        </inkml:traceFormat>
+        <inkml:channelProperties>
+          <inkml:channelProperty channel="X" name="resolution" value="1000" units="1/cm"/>
+          <inkml:channelProperty channel="Y" name="resolution" value="1000" units="1/cm"/>
+          <inkml:channelProperty channel="F" name="resolution" value="0" units="1/dev"/>
+        </inkml:channelProperties>
+      </inkml:inkSource>
+      <inkml:timestamp xml:id="ts0" timeString="2019-06-01T06:28:46.287"/>
+    </inkml:context>
+    <inkml:brush xml:id="br0">
+      <inkml:brushProperty name="width" value="0.1" units="cm"/>
+      <inkml:brushProperty name="height" value="0.1" units="cm"/>
+      <inkml:brushProperty name="color" value="#AE198D"/>
+      <inkml:brushProperty name="inkEffects" value="galaxy"/>
+      <inkml:brushProperty name="anchorX" value="-36337.76172"/>
+      <inkml:brushProperty name="anchorY" value="-24899.26563"/>
+      <inkml:brushProperty name="scaleFactor" value="0.5"/>
+    </inkml:brush>
+  </inkml:definitions>
+  <inkml:trace contextRef="#ctx0" brushRef="#br0">1 174 4064,'0'0'0,"2"-4"1824,4-2-1830,0 0 449,2 3-427,0 0-144,0 4 101,2 1 401,1 5-305,1 4 192,0 8-197,3 6-21,4 21 0,2 10-49,0 7 86,-1 0-64,-1-1 96,-3-6-101,-1-7 592,-3-7-507,-4-7 64,-1-6-91,-3-7 640,0-6-565,-2-4 1056,0-5-970,0-4 388,1-4-490,1-4 416,-2-5-437,1-4 501,-2-6-485,0-4 261,-1-6-304,-2-6 416,-1-6-390,-2-6 572,0-5-540,0-5 284,4-3-348,3-1-244,6 1 170,6 3-230,6 5 172,5 6-241,4 8 256,2 10-1274,-27 25 1276,1 1 1,0 0-1,0 0 1,1 0-1,0 0 41,-2 2-147,0-1-1,0 1 1,0 0-1,0 0 1,0 1-1,3-1 148,-4 1-21,0 0-1,0 0 1,1 0 0,-1 1-1,0-1 1,0 1 0,0 0-1,1 0 22,-1 0 29,0 0-1,0 1 0,0-1 0,-1 1 0,1 0 0,0 0 1,1 1-29,-1-1-7,0 1 1,0 0 0,-1 0 0,1 1 0,-1-1-1,1 1 7,0 0 70,-1 1-1,0-1 0,0 1 1,0 0-1,0 1-69,3 26 64,-5 1 277,-5-3-303,-4-2-694,-1-6 565,-2-5-2197,2-7 1925,1-7-2410,3-6 2256,3-4-2006,4-5 2017,3-4-1302,0 2 853</inkml:trace>
+</inkml:ink>
+</file>
+
+<file path=ppt/ink/ink38.xml><?xml version="1.0" encoding="utf-8"?>
+<inkml:ink xmlns:inkml="http://www.w3.org/2003/InkML">
+  <inkml:definitions>
+    <inkml:context xml:id="ctx0">
+      <inkml:inkSource xml:id="inkSrc0">
+        <inkml:traceFormat>
+          <inkml:channel name="X" type="integer" min="-2.14748E9" max="2.14748E9" units="cm"/>
+          <inkml:channel name="Y" type="integer" min="-2.14748E9" max="2.14748E9" units="cm"/>
+          <inkml:channel name="F" type="integer" max="32767" units="dev"/>
+        </inkml:traceFormat>
+        <inkml:channelProperties>
+          <inkml:channelProperty channel="X" name="resolution" value="1000" units="1/cm"/>
+          <inkml:channelProperty channel="Y" name="resolution" value="1000" units="1/cm"/>
+          <inkml:channelProperty channel="F" name="resolution" value="0" units="1/dev"/>
+        </inkml:channelProperties>
+      </inkml:inkSource>
+      <inkml:timestamp xml:id="ts0" timeString="2019-06-01T06:28:46.756"/>
+    </inkml:context>
+    <inkml:brush xml:id="br0">
+      <inkml:brushProperty name="width" value="0.1" units="cm"/>
+      <inkml:brushProperty name="height" value="0.1" units="cm"/>
+      <inkml:brushProperty name="color" value="#AE198D"/>
+      <inkml:brushProperty name="inkEffects" value="galaxy"/>
+      <inkml:brushProperty name="anchorX" value="-37461.91406"/>
+      <inkml:brushProperty name="anchorY" value="-25553.09375"/>
+      <inkml:brushProperty name="scaleFactor" value="0.5"/>
+    </inkml:brush>
+  </inkml:definitions>
+  <inkml:trace contextRef="#ctx0" brushRef="#br0">140 75 4224,'0'0'0,"1"0"1920,0 0-1942,1 0 1116,0 0-961,-1 0 43,-1 2-171,-1 3 502,-4 12-384,-3 8-129,-2 9 44,-1 10-38,0 10-187,0 9 166,2 4 53,1 1-16,1-3 1061,2-6-896,1-10 694,-1-9-678,1-11 790,0-12-763,3-17-203,1 1 0,0-1 0,0 0-1,0 1 1,0-1 0,0 0 0,-1 1 0,1-1 0,0 0-1,0 1 1,-1-1 0,1 0 0,0 0 0,0 1 0,-1-1 0,1 0-1,0 0 1,-1 1 0,1-1 0,0 0 0,-1 0 0,1 0-21,0 0 5,-1 0-1,1 0 1,0 0 0,0 0 0,-1 0 0,1 0 0,0 0 0,-1 0 0,1 0 0,0 0 0,0 0 0,-1-1-1,1 1 1,0 0 0,0 0 0,0 0 0,-1 0 0,1-1 0,0 1 0,0 0 0,0 0 0,-1-1-1,1 1 1,0 0 0,0-1-5,-6-12 646,0-10-502,0-10 832,0-10-763,1-8 432,3-9-501,3-5-16,4-4-85,5-1-224,7 2 165,5 5-363,5 8 326,-20 43-494,1 0 0,7-9 547,-9 15-49,0-1 0,0 1-1,1 0 1,2-1 49,-5 4-140,1-1 1,0 1-1,0 1 1,0-1-1,0 1 1,0-1 139,-1 2-26,-1 0 0,1 0 0,0 0 0,-1 1 0,1-1 0,0 1 0,0 0 0,0 0 26,-1 0-55,0 1-1,0-1 1,0 1 0,0 0 0,0 0 0,0 0 0,0 0 0,0 0 0,1 1 55,0 0-15,-1 1 1,1-1-1,-1 1 1,1 0-1,-1 0 1,0 0-1,0 0 15,2 2-50,-1 0-1,0 0 0,-1 1 1,4 5 50,10 27-48,-6 3-219,-4-2 219,-4-4-2421,-2-6 2074,-1-8-4837,0-8 2528</inkml:trace>
+</inkml:ink>
+</file>
+
+<file path=ppt/ink/ink39.xml><?xml version="1.0" encoding="utf-8"?>
+<inkml:ink xmlns:inkml="http://www.w3.org/2003/InkML">
+  <inkml:definitions>
+    <inkml:context xml:id="ctx0">
+      <inkml:inkSource xml:id="inkSrc0">
+        <inkml:traceFormat>
+          <inkml:channel name="X" type="integer" min="-2.14748E9" max="2.14748E9" units="cm"/>
+          <inkml:channel name="Y" type="integer" min="-2.14748E9" max="2.14748E9" units="cm"/>
+          <inkml:channel name="F" type="integer" max="32767" units="dev"/>
+        </inkml:traceFormat>
+        <inkml:channelProperties>
+          <inkml:channelProperty channel="X" name="resolution" value="1000" units="1/cm"/>
+          <inkml:channelProperty channel="Y" name="resolution" value="1000" units="1/cm"/>
+          <inkml:channelProperty channel="F" name="resolution" value="0" units="1/dev"/>
+        </inkml:channelProperties>
+      </inkml:inkSource>
+      <inkml:timestamp xml:id="ts0" timeString="2019-06-01T06:28:48.550"/>
+    </inkml:context>
+    <inkml:brush xml:id="br0">
+      <inkml:brushProperty name="width" value="0.1" units="cm"/>
+      <inkml:brushProperty name="height" value="0.1" units="cm"/>
+      <inkml:brushProperty name="color" value="#AE198D"/>
+      <inkml:brushProperty name="inkEffects" value="galaxy"/>
+      <inkml:brushProperty name="anchorX" value="-38292.36719"/>
+      <inkml:brushProperty name="anchorY" value="-26392.17578"/>
+      <inkml:brushProperty name="scaleFactor" value="0.5"/>
+    </inkml:brush>
+  </inkml:definitions>
+  <inkml:trace contextRef="#ctx0" brushRef="#br0">562 168 4896,'0'0'0,"2"-13"2208,1-11-2240,0-2 714,0 1-639,1 2 58,0 3-69,-1 4-32,-1 2 230,-2 7-182,-4 9 176,-3 13-160,-6 12-102,-5 14 28,-4 14-60,-3 11 12,1 8-6,1 7 0,4 2 224,3-2-139,3-7 91,1-8-59,2-9 353,0-11-289,0-9 288,-1-9-303,1-8 239,-2-7-261,0-5 485,0-5-442,-2-3-80,-1-3-17,-4-2-20,-5-1-6,-4-1 149,-5-1-117,-4-1 677,1 0-602,1 0 656,6 1-598,8 1 70,11 0-139,9 7-99,1 0 1,0 0 0,0 0 0,0 0 0,0 0 0,0-1 0,0 1 0,0 0-1,-1 0 1,1 0 0,0 0 0,0-1 0,0 1 0,0 0 0,0 0-1,0 0 1,0-1 0,0 1 0,0 0 0,0 0 0,0 0 0,0-1 0,0 1-1,0 0 1,0 0 0,0 0 0,1 0 0,-1-1 0,0 1 0,0 0-1,0 0 1,0 0 0,0 0 0,0-1 0,0 1 2,12-6 0,9-2 75,10-1-65,8 0-10,8-3 43,3 0-54,3-2 17,0-1-6,-2-2 0,-2-1-672,-5 0 565,-6 1-1136,-4-1 993,-5 0-961,-4 0 950,-4-1-1627,-5 0 1525,-6-1-2095,-5 0 1988,-7 1-2191,-6-2 2176,-7 0-139,1 3 293</inkml:trace>
 </inkml:ink>
 </file>
 
@@ -1212,102 +1218,6 @@
           <inkml:channelProperty channel="F" name="resolution" value="0" units="1/dev"/>
         </inkml:channelProperties>
       </inkml:inkSource>
-      <inkml:timestamp xml:id="ts0" timeString="2019-06-01T06:28:46.287"/>
-    </inkml:context>
-    <inkml:brush xml:id="br0">
-      <inkml:brushProperty name="width" value="0.1" units="cm"/>
-      <inkml:brushProperty name="height" value="0.1" units="cm"/>
-      <inkml:brushProperty name="color" value="#AE198D"/>
-      <inkml:brushProperty name="inkEffects" value="galaxy"/>
-      <inkml:brushProperty name="anchorX" value="-36337.76172"/>
-      <inkml:brushProperty name="anchorY" value="-24899.26563"/>
-      <inkml:brushProperty name="scaleFactor" value="0.5"/>
-    </inkml:brush>
-  </inkml:definitions>
-  <inkml:trace contextRef="#ctx0" brushRef="#br0">1 174 4064,'0'0'0,"2"-4"1824,4-2-1830,0 0 449,2 3-427,0 0-144,0 4 101,2 1 401,1 5-305,1 4 192,0 8-197,3 6-21,4 21 0,2 10-49,0 7 86,-1 0-64,-1-1 96,-3-6-101,-1-7 592,-3-7-507,-4-7 64,-1-6-91,-3-7 640,0-6-565,-2-4 1056,0-5-970,0-4 388,1-4-490,1-4 416,-2-5-437,1-4 501,-2-6-485,0-4 261,-1-6-304,-2-6 416,-1-6-390,-2-6 572,0-5-540,0-5 284,4-3-348,3-1-244,6 1 170,6 3-230,6 5 172,5 6-241,4 8 256,2 10-1274,-27 25 1276,1 1 1,0 0-1,0 0 1,1 0-1,0 0 41,-2 2-147,0-1-1,0 1 1,0 0-1,0 0 1,0 1-1,3-1 148,-4 1-21,0 0-1,0 0 1,1 0 0,-1 1-1,0-1 1,0 1 0,0 0-1,1 0 22,-1 0 29,0 0-1,0 1 0,0-1 0,-1 1 0,1 0 0,0 0 1,1 1-29,-1-1-7,0 1 1,0 0 0,-1 0 0,1 1 0,-1-1-1,1 1 7,0 0 70,-1 1-1,0-1 0,0 1 1,0 0-1,0 1-69,3 26 64,-5 1 277,-5-3-303,-4-2-694,-1-6 565,-2-5-2197,2-7 1925,1-7-2410,3-6 2256,3-4-2006,4-5 2017,3-4-1302,0 2 853</inkml:trace>
-</inkml:ink>
-</file>
-
-<file path=ppt/ink/ink41.xml><?xml version="1.0" encoding="utf-8"?>
-<inkml:ink xmlns:inkml="http://www.w3.org/2003/InkML">
-  <inkml:definitions>
-    <inkml:context xml:id="ctx0">
-      <inkml:inkSource xml:id="inkSrc0">
-        <inkml:traceFormat>
-          <inkml:channel name="X" type="integer" min="-2.14748E9" max="2.14748E9" units="cm"/>
-          <inkml:channel name="Y" type="integer" min="-2.14748E9" max="2.14748E9" units="cm"/>
-          <inkml:channel name="F" type="integer" max="32767" units="dev"/>
-        </inkml:traceFormat>
-        <inkml:channelProperties>
-          <inkml:channelProperty channel="X" name="resolution" value="1000" units="1/cm"/>
-          <inkml:channelProperty channel="Y" name="resolution" value="1000" units="1/cm"/>
-          <inkml:channelProperty channel="F" name="resolution" value="0" units="1/dev"/>
-        </inkml:channelProperties>
-      </inkml:inkSource>
-      <inkml:timestamp xml:id="ts0" timeString="2019-06-01T06:28:46.756"/>
-    </inkml:context>
-    <inkml:brush xml:id="br0">
-      <inkml:brushProperty name="width" value="0.1" units="cm"/>
-      <inkml:brushProperty name="height" value="0.1" units="cm"/>
-      <inkml:brushProperty name="color" value="#AE198D"/>
-      <inkml:brushProperty name="inkEffects" value="galaxy"/>
-      <inkml:brushProperty name="anchorX" value="-37461.91406"/>
-      <inkml:brushProperty name="anchorY" value="-25553.09375"/>
-      <inkml:brushProperty name="scaleFactor" value="0.5"/>
-    </inkml:brush>
-  </inkml:definitions>
-  <inkml:trace contextRef="#ctx0" brushRef="#br0">140 75 4224,'0'0'0,"1"0"1920,0 0-1942,1 0 1116,0 0-961,-1 0 43,-1 2-171,-1 3 502,-4 12-384,-3 8-129,-2 9 44,-1 10-38,0 10-187,0 9 166,2 4 53,1 1-16,1-3 1061,2-6-896,1-10 694,-1-9-678,1-11 790,0-12-763,3-17-203,1 1 0,0-1 0,0 0-1,0 1 1,0-1 0,0 0 0,-1 1 0,1-1 0,0 0-1,0 1 1,-1-1 0,1 0 0,0 0 0,0 1 0,-1-1 0,1 0-1,0 0 1,-1 1 0,1-1 0,0 0 0,-1 0 0,1 0-21,0 0 5,-1 0-1,1 0 1,0 0 0,0 0 0,-1 0 0,1 0 0,0 0 0,-1 0 0,1 0 0,0 0 0,0 0 0,-1-1-1,1 1 1,0 0 0,0 0 0,0 0 0,-1 0 0,1-1 0,0 1 0,0 0 0,0 0 0,-1-1-1,1 1 1,0 0 0,0-1-5,-6-12 646,0-10-502,0-10 832,0-10-763,1-8 432,3-9-501,3-5-16,4-4-85,5-1-224,7 2 165,5 5-363,5 8 326,-20 43-494,1 0 0,7-9 547,-9 15-49,0-1 0,0 1-1,1 0 1,2-1 49,-5 4-140,1-1 1,0 1-1,0 1 1,0-1-1,0 1 1,0-1 139,-1 2-26,-1 0 0,1 0 0,0 0 0,-1 1 0,1-1 0,0 1 0,0 0 0,0 0 26,-1 0-55,0 1-1,0-1 1,0 1 0,0 0 0,0 0 0,0 0 0,0 0 0,0 0 0,1 1 55,0 0-15,-1 1 1,1-1-1,-1 1 1,1 0-1,-1 0 1,0 0-1,0 0 15,2 2-50,-1 0-1,0 0 0,-1 1 1,4 5 50,10 27-48,-6 3-219,-4-2 219,-4-4-2421,-2-6 2074,-1-8-4837,0-8 2528</inkml:trace>
-</inkml:ink>
-</file>
-
-<file path=ppt/ink/ink42.xml><?xml version="1.0" encoding="utf-8"?>
-<inkml:ink xmlns:inkml="http://www.w3.org/2003/InkML">
-  <inkml:definitions>
-    <inkml:context xml:id="ctx0">
-      <inkml:inkSource xml:id="inkSrc0">
-        <inkml:traceFormat>
-          <inkml:channel name="X" type="integer" min="-2.14748E9" max="2.14748E9" units="cm"/>
-          <inkml:channel name="Y" type="integer" min="-2.14748E9" max="2.14748E9" units="cm"/>
-          <inkml:channel name="F" type="integer" max="32767" units="dev"/>
-        </inkml:traceFormat>
-        <inkml:channelProperties>
-          <inkml:channelProperty channel="X" name="resolution" value="1000" units="1/cm"/>
-          <inkml:channelProperty channel="Y" name="resolution" value="1000" units="1/cm"/>
-          <inkml:channelProperty channel="F" name="resolution" value="0" units="1/dev"/>
-        </inkml:channelProperties>
-      </inkml:inkSource>
-      <inkml:timestamp xml:id="ts0" timeString="2019-06-01T06:28:48.550"/>
-    </inkml:context>
-    <inkml:brush xml:id="br0">
-      <inkml:brushProperty name="width" value="0.1" units="cm"/>
-      <inkml:brushProperty name="height" value="0.1" units="cm"/>
-      <inkml:brushProperty name="color" value="#AE198D"/>
-      <inkml:brushProperty name="inkEffects" value="galaxy"/>
-      <inkml:brushProperty name="anchorX" value="-38292.36719"/>
-      <inkml:brushProperty name="anchorY" value="-26392.17578"/>
-      <inkml:brushProperty name="scaleFactor" value="0.5"/>
-    </inkml:brush>
-  </inkml:definitions>
-  <inkml:trace contextRef="#ctx0" brushRef="#br0">562 168 4896,'0'0'0,"2"-13"2208,1-11-2240,0-2 714,0 1-639,1 2 58,0 3-69,-1 4-32,-1 2 230,-2 7-182,-4 9 176,-3 13-160,-6 12-102,-5 14 28,-4 14-60,-3 11 12,1 8-6,1 7 0,4 2 224,3-2-139,3-7 91,1-8-59,2-9 353,0-11-289,0-9 288,-1-9-303,1-8 239,-2-7-261,0-5 485,0-5-442,-2-3-80,-1-3-17,-4-2-20,-5-1-6,-4-1 149,-5-1-117,-4-1 677,1 0-602,1 0 656,6 1-598,8 1 70,11 0-139,9 7-99,1 0 1,0 0 0,0 0 0,0 0 0,0 0 0,0-1 0,0 1 0,0 0-1,-1 0 1,1 0 0,0 0 0,0-1 0,0 1 0,0 0 0,0 0-1,0 0 1,0-1 0,0 1 0,0 0 0,0 0 0,0 0 0,0-1 0,0 1-1,0 0 1,0 0 0,0 0 0,1 0 0,-1-1 0,0 1 0,0 0-1,0 0 1,0 0 0,0 0 0,0-1 0,0 1 2,12-6 0,9-2 75,10-1-65,8 0-10,8-3 43,3 0-54,3-2 17,0-1-6,-2-2 0,-2-1-672,-5 0 565,-6 1-1136,-4-1 993,-5 0-961,-4 0 950,-4-1-1627,-5 0 1525,-6-1-2095,-5 0 1988,-7 1-2191,-6-2 2176,-7 0-139,1 3 293</inkml:trace>
-</inkml:ink>
-</file>
-
-<file path=ppt/ink/ink43.xml><?xml version="1.0" encoding="utf-8"?>
-<inkml:ink xmlns:inkml="http://www.w3.org/2003/InkML">
-  <inkml:definitions>
-    <inkml:context xml:id="ctx0">
-      <inkml:inkSource xml:id="inkSrc0">
-        <inkml:traceFormat>
-          <inkml:channel name="X" type="integer" min="-2.14748E9" max="2.14748E9" units="cm"/>
-          <inkml:channel name="Y" type="integer" min="-2.14748E9" max="2.14748E9" units="cm"/>
-          <inkml:channel name="F" type="integer" max="32767" units="dev"/>
-        </inkml:traceFormat>
-        <inkml:channelProperties>
-          <inkml:channelProperty channel="X" name="resolution" value="1000" units="1/cm"/>
-          <inkml:channelProperty channel="Y" name="resolution" value="1000" units="1/cm"/>
-          <inkml:channelProperty channel="F" name="resolution" value="0" units="1/dev"/>
-        </inkml:channelProperties>
-      </inkml:inkSource>
       <inkml:timestamp xml:id="ts0" timeString="2019-06-01T06:28:48.690"/>
     </inkml:context>
     <inkml:brush xml:id="br0">
@@ -1324,7 +1234,7 @@
 </inkml:ink>
 </file>
 
-<file path=ppt/ink/ink44.xml><?xml version="1.0" encoding="utf-8"?>
+<file path=ppt/ink/ink41.xml><?xml version="1.0" encoding="utf-8"?>
 <inkml:ink xmlns:inkml="http://www.w3.org/2003/InkML">
   <inkml:definitions>
     <inkml:context xml:id="ctx0">
@@ -1356,7 +1266,7 @@
 </inkml:ink>
 </file>
 
-<file path=ppt/ink/ink45.xml><?xml version="1.0" encoding="utf-8"?>
+<file path=ppt/ink/ink42.xml><?xml version="1.0" encoding="utf-8"?>
 <inkml:ink xmlns:inkml="http://www.w3.org/2003/InkML">
   <inkml:definitions>
     <inkml:context xml:id="ctx0">
@@ -1388,7 +1298,7 @@
 </inkml:ink>
 </file>
 
-<file path=ppt/ink/ink46.xml><?xml version="1.0" encoding="utf-8"?>
+<file path=ppt/ink/ink43.xml><?xml version="1.0" encoding="utf-8"?>
 <inkml:ink xmlns:inkml="http://www.w3.org/2003/InkML">
   <inkml:definitions>
     <inkml:context xml:id="ctx0">
@@ -1420,7 +1330,7 @@
 </inkml:ink>
 </file>
 
-<file path=ppt/ink/ink47.xml><?xml version="1.0" encoding="utf-8"?>
+<file path=ppt/ink/ink44.xml><?xml version="1.0" encoding="utf-8"?>
 <inkml:ink xmlns:inkml="http://www.w3.org/2003/InkML">
   <inkml:definitions>
     <inkml:context xml:id="ctx0">
@@ -1452,7 +1362,7 @@
 </inkml:ink>
 </file>
 
-<file path=ppt/ink/ink48.xml><?xml version="1.0" encoding="utf-8"?>
+<file path=ppt/ink/ink45.xml><?xml version="1.0" encoding="utf-8"?>
 <inkml:ink xmlns:inkml="http://www.w3.org/2003/InkML">
   <inkml:definitions>
     <inkml:context xml:id="ctx0">
@@ -1484,7 +1394,7 @@
 </inkml:ink>
 </file>
 
-<file path=ppt/ink/ink49.xml><?xml version="1.0" encoding="utf-8"?>
+<file path=ppt/ink/ink46.xml><?xml version="1.0" encoding="utf-8"?>
 <inkml:ink xmlns:inkml="http://www.w3.org/2003/InkML">
   <inkml:definitions>
     <inkml:context xml:id="ctx0">
@@ -1516,39 +1426,7 @@
 </inkml:ink>
 </file>
 
-<file path=ppt/ink/ink5.xml><?xml version="1.0" encoding="utf-8"?>
-<inkml:ink xmlns:inkml="http://www.w3.org/2003/InkML">
-  <inkml:definitions>
-    <inkml:context xml:id="ctx0">
-      <inkml:inkSource xml:id="inkSrc0">
-        <inkml:traceFormat>
-          <inkml:channel name="X" type="integer" min="-2.14748E9" max="2.14748E9" units="cm"/>
-          <inkml:channel name="Y" type="integer" min="-2.14748E9" max="2.14748E9" units="cm"/>
-          <inkml:channel name="F" type="integer" max="32767" units="dev"/>
-        </inkml:traceFormat>
-        <inkml:channelProperties>
-          <inkml:channelProperty channel="X" name="resolution" value="1000" units="1/cm"/>
-          <inkml:channelProperty channel="Y" name="resolution" value="1000" units="1/cm"/>
-          <inkml:channelProperty channel="F" name="resolution" value="0" units="1/dev"/>
-        </inkml:channelProperties>
-      </inkml:inkSource>
-      <inkml:timestamp xml:id="ts0" timeString="2019-06-01T06:27:58.487"/>
-    </inkml:context>
-    <inkml:brush xml:id="br0">
-      <inkml:brushProperty name="width" value="0.1" units="cm"/>
-      <inkml:brushProperty name="height" value="0.1" units="cm"/>
-      <inkml:brushProperty name="color" value="#AE198D"/>
-      <inkml:brushProperty name="inkEffects" value="galaxy"/>
-      <inkml:brushProperty name="anchorX" value="-4080.08862"/>
-      <inkml:brushProperty name="anchorY" value="-3649.1167"/>
-      <inkml:brushProperty name="scaleFactor" value="0.5"/>
-    </inkml:brush>
-  </inkml:definitions>
-  <inkml:trace contextRef="#ctx0" brushRef="#br0">4 2443 2560,'0'0'0,"-2"0"1152,1 0-1157,0 1 554,1-1-490,4 2 554,3-1-501,6 0 346,4-2-362,8 1 102,9-1-150,11 0 69,13 0-101,14 0 176,13-1-165,13-1 351,10-4-324,8-4-6,5-6-75,1-6 379,0-5-341,-3-4 602,-6-4-506,-4-2 351,-8-2-362,-10-2 512,-10-2-490,-11-2 826,-10 0-726,-42 30 721,13-17-939,-19 19 104,0-1 0,3-7-104,-6 8 363,0-1-1,3-10-362,-5 8 78,0 0-1,0-6-77,8-38 539,-8-3-385,-5-3 182,-5-4-245,-3-1 474,-2-1-442,-1 0 330,-1 2-357,0 2 27,1 0-91,-1 1-27,1-1 1,0 1-6,0-3 0,0-12-150,-2-2 118,1 1-42,-2-7 308,0 7-495,1 9 234,0 12 219,2 12-186,0 12-262,2 9-182,2 8 364,2 8-134,2 6 160,3 4 192,1 1-123,3 1 16,3-2 1,1-1 106,1-2-107,1-2 0,0-1 1,0-1-156,1-1 118,-1 0-192,-1 1 166,-1 2-913,-2 1 747,-2 2-2987,-3 1 2566,-1 1-9428</inkml:trace>
-</inkml:ink>
-</file>
-
-<file path=ppt/ink/ink50.xml><?xml version="1.0" encoding="utf-8"?>
+<file path=ppt/ink/ink47.xml><?xml version="1.0" encoding="utf-8"?>
 <inkml:ink xmlns:inkml="http://www.w3.org/2003/InkML">
   <inkml:definitions>
     <inkml:context xml:id="ctx0">
@@ -1580,7 +1458,7 @@
 </inkml:ink>
 </file>
 
-<file path=ppt/ink/ink51.xml><?xml version="1.0" encoding="utf-8"?>
+<file path=ppt/ink/ink48.xml><?xml version="1.0" encoding="utf-8"?>
 <inkml:ink xmlns:inkml="http://www.w3.org/2003/InkML">
   <inkml:definitions>
     <inkml:context xml:id="ctx0">
@@ -1612,7 +1490,7 @@
 </inkml:ink>
 </file>
 
-<file path=ppt/ink/ink52.xml><?xml version="1.0" encoding="utf-8"?>
+<file path=ppt/ink/ink49.xml><?xml version="1.0" encoding="utf-8"?>
 <inkml:ink xmlns:inkml="http://www.w3.org/2003/InkML">
   <inkml:definitions>
     <inkml:context xml:id="ctx0">
@@ -1644,7 +1522,39 @@
 </inkml:ink>
 </file>
 
-<file path=ppt/ink/ink53.xml><?xml version="1.0" encoding="utf-8"?>
+<file path=ppt/ink/ink5.xml><?xml version="1.0" encoding="utf-8"?>
+<inkml:ink xmlns:inkml="http://www.w3.org/2003/InkML">
+  <inkml:definitions>
+    <inkml:context xml:id="ctx0">
+      <inkml:inkSource xml:id="inkSrc0">
+        <inkml:traceFormat>
+          <inkml:channel name="X" type="integer" min="-2.14748E9" max="2.14748E9" units="cm"/>
+          <inkml:channel name="Y" type="integer" min="-2.14748E9" max="2.14748E9" units="cm"/>
+          <inkml:channel name="F" type="integer" max="32767" units="dev"/>
+        </inkml:traceFormat>
+        <inkml:channelProperties>
+          <inkml:channelProperty channel="X" name="resolution" value="1000" units="1/cm"/>
+          <inkml:channelProperty channel="Y" name="resolution" value="1000" units="1/cm"/>
+          <inkml:channelProperty channel="F" name="resolution" value="0" units="1/dev"/>
+        </inkml:channelProperties>
+      </inkml:inkSource>
+      <inkml:timestamp xml:id="ts0" timeString="2019-06-01T06:28:00.526"/>
+    </inkml:context>
+    <inkml:brush xml:id="br0">
+      <inkml:brushProperty name="width" value="0.1" units="cm"/>
+      <inkml:brushProperty name="height" value="0.1" units="cm"/>
+      <inkml:brushProperty name="color" value="#AE198D"/>
+      <inkml:brushProperty name="inkEffects" value="galaxy"/>
+      <inkml:brushProperty name="anchorX" value="-7959.83398"/>
+      <inkml:brushProperty name="anchorY" value="-2299.22412"/>
+      <inkml:brushProperty name="scaleFactor" value="0.5"/>
+    </inkml:brush>
+  </inkml:definitions>
+  <inkml:trace contextRef="#ctx0" brushRef="#br0">2 401 4736,'0'0'0,"-2"-9"2144,3-3-2166,1 2 172,4 4-182,2 9-363,5 17 347,2 21-80,2 29 139,-1 32-1782,-4 37 1489,-4 31-2508,-4 23 7611,2 29-4607,3 7 2106,1-9-1771,1-22-309,-1-29-123,0-35-1109,-2-26 315,-2-29 624,-1-26 79,-1-21-47,-1-17 1072,-2-14-1047,-1-1 0,0 1 0,0-1 0,0 0 1,0 0-1,0 0 0,0 0 0,0 1 0,0-1 1,0 0-1,0 0 0,1 0 0,-1 0 0,0 0 0,0 1 1,0-1-1,0 0 0,0 0 0,0 0 0,1 0 0,-1 0 1,0 0-1,0 0 0,0 0 0,0 0 0,1 1 1,-1-1-1,0 0 0,0 0 0,0 0 0,1 0 0,-1 0 1,0 0-1,0 0 0,0 0 0,0 0 0,1-1-4,9-2 955,7-6-784,13-4 378,17-1-458,19-3 191,21-1-218,21-2-21,19-1 0,17-1-161,15 0 118,11-2-5,9-2 0,5-1 714,3-1-576,0-1 731,1 2-688,0 1-48,-3 3-106,-1 4 68,-6 3-74,-7 3 96,-10 1-101,-11 2 181,-13 0-165,-12 0-59,-16 1 16,-15-1 96,-16 0-70,-14-1-234,-14-3 182,-13-2-108,-32 13 141,-1 1-1,0-1 0,1-1 1,-2 1-1,3-2 10,-3 2 11,-1 1 0,0-1-1,0 0 1,0 0 0,0 0-1,0 0 1,0-1-11,-1 1 1,0-1 0,0 0 0,0 1-1,0-1 1,0 1 0,0-4-1,-2-27 262,-7-7-220,-10-19 785,-7-11-672,-8-12 5,-5-14 74,-3-12-164,0-10 452,1-11-394,3-7 507,5-4-518,5 1-213,5 7 91,5 8-400,3 11 362,3 13-906,0 15 821,1 16-1131,1 15 1035,1 12-736,1 14 779,1 8-369,3 9 460,1 4-44,1 5 140,1 2 127,-2 1-101,-4 2 267,-6 1-262,-9 2 198,-12 1-171,-14 1 309,-15 1-314,-16 0 138,-19 1-154,-17-1-38,-20 0 43,-18-2-395,-17-2 299,-18 0-218,-15-1 207,-16 0-133,-9 3 117,-5 4 939,3 4-714,9 5 79,16 5-122,19 4-2833,21 3 2289,24 1-6245,38-5 3178</inkml:trace>
+</inkml:ink>
+</file>
+
+<file path=ppt/ink/ink50.xml><?xml version="1.0" encoding="utf-8"?>
 <inkml:ink xmlns:inkml="http://www.w3.org/2003/InkML">
   <inkml:definitions>
     <inkml:context xml:id="ctx0">
@@ -1676,7 +1586,7 @@
 </inkml:ink>
 </file>
 
-<file path=ppt/ink/ink54.xml><?xml version="1.0" encoding="utf-8"?>
+<file path=ppt/ink/ink51.xml><?xml version="1.0" encoding="utf-8"?>
 <inkml:ink xmlns:inkml="http://www.w3.org/2003/InkML">
   <inkml:definitions>
     <inkml:context xml:id="ctx0">
@@ -1708,263 +1618,7 @@
 </inkml:ink>
 </file>
 
-<file path=ppt/ink/ink55.xml><?xml version="1.0" encoding="utf-8"?>
-<inkml:ink xmlns:inkml="http://www.w3.org/2003/InkML">
-  <inkml:definitions>
-    <inkml:context xml:id="ctx0">
-      <inkml:inkSource xml:id="inkSrc0">
-        <inkml:traceFormat>
-          <inkml:channel name="X" type="integer" min="-2.14748E9" max="2.14748E9" units="cm"/>
-          <inkml:channel name="Y" type="integer" min="-2.14748E9" max="2.14748E9" units="cm"/>
-          <inkml:channel name="F" type="integer" max="32767" units="dev"/>
-        </inkml:traceFormat>
-        <inkml:channelProperties>
-          <inkml:channelProperty channel="X" name="resolution" value="1000" units="1/cm"/>
-          <inkml:channelProperty channel="Y" name="resolution" value="1000" units="1/cm"/>
-          <inkml:channelProperty channel="F" name="resolution" value="0" units="1/dev"/>
-        </inkml:channelProperties>
-      </inkml:inkSource>
-      <inkml:timestamp xml:id="ts0" timeString="2019-06-01T06:28:57.518"/>
-    </inkml:context>
-    <inkml:brush xml:id="br0">
-      <inkml:brushProperty name="width" value="0.1" units="cm"/>
-      <inkml:brushProperty name="height" value="0.1" units="cm"/>
-      <inkml:brushProperty name="color" value="#AE198D"/>
-      <inkml:brushProperty name="inkEffects" value="galaxy"/>
-      <inkml:brushProperty name="anchorX" value="-41958.74609"/>
-      <inkml:brushProperty name="anchorY" value="-32079.30469"/>
-      <inkml:brushProperty name="scaleFactor" value="0.5"/>
-    </inkml:brush>
-  </inkml:definitions>
-  <inkml:trace contextRef="#ctx0" brushRef="#br0">2 289 5728,'0'0'0,"-1"-15"2592,0-16-2614,2-3 1494,3-3-1296,4-1-26,7 0-118,5 3-54,-14 30-13,-1-1 0,1 1 0,0 0 0,-1 0-1,2 1 36,-2 0-6,2 0-1,0 0 0,0 1 1,7-3 6,-8 4-121,1 0 1,0 0-1,0 1 1,0-1-1,1 2 121,-3-1-28,1 1 1,0 0-1,0 1 0,0-1 0,6 2 28,-7 0-118,0-1 0,0 1 0,-1 0 0,1 0-1,0 0 1,2 2 118,-3-1-29,0 0-1,1 0 1,-1 1 0,-1-1-1,1 1 1,1 2 29,-2-2-13,1 0-1,-1 1 1,0-1 0,-1 1-1,1 0 1,-1 1 13,0-2-5,0 2-1,-1-1 1,0 1 0,0-1-1,1 6 6,-2-5 65,0 1 1,0 0-1,0 0 0,-1-1 0,0 1-65,0 0 13,-1 1 0,0-1 1,-1 1-1,-1 2-13,1-3 11,-1 0-1,0 1 1,0-1 0,-1 0-11,0 1-9,-1-1 0,-1 0 0,-2 3 9,-23 17-731,-2-7 603,0-6-3279,7-6-1195</inkml:trace>
-</inkml:ink>
-</file>
-
-<file path=ppt/ink/ink56.xml><?xml version="1.0" encoding="utf-8"?>
-<inkml:ink xmlns:inkml="http://www.w3.org/2003/InkML">
-  <inkml:definitions>
-    <inkml:context xml:id="ctx0">
-      <inkml:inkSource xml:id="inkSrc0">
-        <inkml:traceFormat>
-          <inkml:channel name="X" type="integer" min="-2.14748E9" max="2.14748E9" units="cm"/>
-          <inkml:channel name="Y" type="integer" min="-2.14748E9" max="2.14748E9" units="cm"/>
-          <inkml:channel name="F" type="integer" max="32767" units="dev"/>
-        </inkml:traceFormat>
-        <inkml:channelProperties>
-          <inkml:channelProperty channel="X" name="resolution" value="1000" units="1/cm"/>
-          <inkml:channelProperty channel="Y" name="resolution" value="1000" units="1/cm"/>
-          <inkml:channelProperty channel="F" name="resolution" value="0" units="1/dev"/>
-        </inkml:channelProperties>
-      </inkml:inkSource>
-      <inkml:timestamp xml:id="ts0" timeString="2019-06-01T06:28:58.050"/>
-    </inkml:context>
-    <inkml:brush xml:id="br0">
-      <inkml:brushProperty name="width" value="0.1" units="cm"/>
-      <inkml:brushProperty name="height" value="0.1" units="cm"/>
-      <inkml:brushProperty name="color" value="#AE198D"/>
-      <inkml:brushProperty name="inkEffects" value="galaxy"/>
-      <inkml:brushProperty name="anchorX" value="-42703.21484"/>
-      <inkml:brushProperty name="anchorY" value="-32756.14063"/>
-      <inkml:brushProperty name="scaleFactor" value="0.5"/>
-    </inkml:brush>
-  </inkml:definitions>
-  <inkml:trace contextRef="#ctx0" brushRef="#br0">12 0 4064,'0'0'0,"-2"4"1824,0 5-1830,0 5 860,-1 5-769,1 5-21,2 6-43,1 4-15,2 5 143,1-1-117,0-6 1909,2-9-1626,0-10 725,-6-13-1032,1 0 0,-1 0 1,0 0-1,0 1 0,0-1 0,1 0 0,-1 0 0,0 0 1,0 0-1,0 0 0,1 1 0,-1-1 0,0 0 1,0 0-1,1 0 0,-1 0 0,0 0 0,1 0 0,-1 0 1,0 0-1,0 0 0,1 0 0,-1 0 0,0 0 0,0 0 1,1 0-1,-1 0 0,0 0 0,0-1 0,1 1-8,7-8 139,0-7-38,2-8 379,1-3-384,1-2 134,3-1-188,3 1 81,3 3-107,5 5-11,3 5 38,3 8-315,2 7 240,1 8 27,0 5 26,-1 6 80,-4 2-90,-2-1-6,-4-2 38,-3-3-1547,-3-8 1264,-1-6-5194,-4-4 725</inkml:trace>
-</inkml:ink>
-</file>
-
-<file path=ppt/ink/ink57.xml><?xml version="1.0" encoding="utf-8"?>
-<inkml:ink xmlns:inkml="http://www.w3.org/2003/InkML">
-  <inkml:definitions>
-    <inkml:context xml:id="ctx0">
-      <inkml:inkSource xml:id="inkSrc0">
-        <inkml:traceFormat>
-          <inkml:channel name="X" type="integer" min="-2.14748E9" max="2.14748E9" units="cm"/>
-          <inkml:channel name="Y" type="integer" min="-2.14748E9" max="2.14748E9" units="cm"/>
-          <inkml:channel name="F" type="integer" max="32767" units="dev"/>
-        </inkml:traceFormat>
-        <inkml:channelProperties>
-          <inkml:channelProperty channel="X" name="resolution" value="1000" units="1/cm"/>
-          <inkml:channelProperty channel="Y" name="resolution" value="1000" units="1/cm"/>
-          <inkml:channelProperty channel="F" name="resolution" value="0" units="1/dev"/>
-        </inkml:channelProperties>
-      </inkml:inkSource>
-      <inkml:timestamp xml:id="ts0" timeString="2019-06-01T06:28:58.550"/>
-    </inkml:context>
-    <inkml:brush xml:id="br0">
-      <inkml:brushProperty name="width" value="0.1" units="cm"/>
-      <inkml:brushProperty name="height" value="0.1" units="cm"/>
-      <inkml:brushProperty name="color" value="#AE198D"/>
-      <inkml:brushProperty name="inkEffects" value="galaxy"/>
-      <inkml:brushProperty name="anchorX" value="-43838.80469"/>
-      <inkml:brushProperty name="anchorY" value="-33565.69922"/>
-      <inkml:brushProperty name="scaleFactor" value="0.5"/>
-    </inkml:brush>
-  </inkml:definitions>
-  <inkml:trace contextRef="#ctx0" brushRef="#br0">1 196 4384,'0'0'0,"3"0"2016,3 0-2054,1 3 849,2 2-742,0 6 70,3 6-107,1 9-213,5 20 202,-1 9 0,-1 8 75,-3 2-85,-2-1 1002,-3-6-847,-2-7 1007,-2-10-917,-1-9 395,-3-11-459,-1-11 0,1-10-191,0 0 0,0 0 0,0 0-1,0 0 1,0 0 0,0 0 0,0 0 0,0 0 0,0 0 0,0 0 0,0 1 0,0-1 0,0 0 0,0 0 0,0 0 0,-1 0 0,1 0 0,0 0 0,0 0 0,0 0 0,0 0 0,0 0 0,0 0 0,0 0 0,0 0-1,0 0 1,0 0 0,0 0 0,0 0 0,0 0 0,0 0 0,0 0 0,-1 0 0,1 0 0,0 0 0,0 0 0,0 0 0,0 0 0,0 0 0,0 0 0,0 0 0,0 0 0,0 0 0,0 0 0,0 0 0,0 0 0,0-1 0,0 1-1,0 0 1,0 0 0,0 0 0,0 0 0,-1 0 0,1 0 0,0 0 0,0 0 0,0 0 0,0 0 0,0 0 0,0 0 0,0 0 0,0 0 0,0 0 0,0 0 0,0-1 0,0 1 0,0 0-1,-4-10 117,-3-8-101,-2-8 101,-2-5-106,-1-7 330,1-4-282,0-8 693,3-8-608,5-10 389,4-7-447,8-2-28,6 3-79,-8 51-224,9-20 245,-10 28-22,2-1 1,6-9 21,-9 17-263,0 0 1,2 0-1,-1 0 0,2-1 263,-4 6-29,0-1 0,0 1 0,0-1 0,1 1 1,-1 0-1,1 1 0,0-1 29,-3 2-114,1 0 1,1-1 0,-1 1 0,0 0 0,1 1 0,-1-1-1,1 1 1,-1-1 0,2 1 113,-3 0-19,1 0 0,0 1-1,0-1 1,0 1 0,-1-1 0,1 1 0,0 0-1,-1 0 1,1 0 0,2 2 19,-3-2-134,1 2 0,1-1 0,-2 0 0,1 1 0,0-1 0,0 1 0,-1 0 0,2 1 134,-1 0-34,0 1 0,0 0 0,0 1 0,0-1-1,1 5 35,-2-3-64,1 1 0,-1 1 0,0-1 0,-1 2 64,3 35-69,-7 0 133,-4-4-59,-2-7-2618,0-9-4586</inkml:trace>
-</inkml:ink>
-</file>
-
-<file path=ppt/ink/ink58.xml><?xml version="1.0" encoding="utf-8"?>
-<inkml:ink xmlns:inkml="http://www.w3.org/2003/InkML">
-  <inkml:definitions>
-    <inkml:context xml:id="ctx0">
-      <inkml:inkSource xml:id="inkSrc0">
-        <inkml:traceFormat>
-          <inkml:channel name="X" type="integer" min="-2.14748E9" max="2.14748E9" units="cm"/>
-          <inkml:channel name="Y" type="integer" min="-2.14748E9" max="2.14748E9" units="cm"/>
-          <inkml:channel name="F" type="integer" max="32767" units="dev"/>
-        </inkml:traceFormat>
-        <inkml:channelProperties>
-          <inkml:channelProperty channel="X" name="resolution" value="1000" units="1/cm"/>
-          <inkml:channelProperty channel="Y" name="resolution" value="1000" units="1/cm"/>
-          <inkml:channelProperty channel="F" name="resolution" value="0" units="1/dev"/>
-        </inkml:channelProperties>
-      </inkml:inkSource>
-      <inkml:timestamp xml:id="ts0" timeString="2019-06-01T06:28:59.331"/>
-    </inkml:context>
-    <inkml:brush xml:id="br0">
-      <inkml:brushProperty name="width" value="0.1" units="cm"/>
-      <inkml:brushProperty name="height" value="0.1" units="cm"/>
-      <inkml:brushProperty name="color" value="#AE198D"/>
-      <inkml:brushProperty name="inkEffects" value="galaxy"/>
-      <inkml:brushProperty name="anchorX" value="-44787.95703"/>
-      <inkml:brushProperty name="anchorY" value="-34303.19922"/>
-      <inkml:brushProperty name="scaleFactor" value="0.5"/>
-    </inkml:brush>
-  </inkml:definitions>
-  <inkml:trace contextRef="#ctx0" brushRef="#br0">1 206 6464,'0'0'0,"0"-22"3328,0-14-3024,0-2 304,1 0-459,0 5-138,0 6-481,3 16-26,-4 11 495,0 0 0,0 0 1,0 0-1,0 0 0,1 0 0,-1 0 0,0 0 0,0 1 0,0-1 0,0 0 0,1 0 0,-1 0 0,0 0 0,0 0 0,0 0 0,0 0 0,0 1 1,0-1-1,1 0 0,-1 0 0,0 0 0,0 0 0,0 1 0,0-1 0,0 0 0,0 0 0,0 0 0,0 0 0,0 1 0,0-1 0,0 0 0,0 0 1,0 0-1,0 0 0,0 1 0,0-1 0,0 0 0,0 0 0,0 0 0,0 1 1,2 23-272,-2 17 203,-1 12 181,0 9-86,0 3 342,2-1-314,3-4 479,4-7-437,4-9-309,-9-38 209,-1 0 0,1 0 0,0 0 0,3 3 4,-4-7-448,0 1 0,0 0 0,0-1 0,1 1 0,-1-1 0,1 1 0,1 0 448,-2-2-60,0 0 0,0 1 0,1-1 0,-1 0 1,0 0-1,1 0 0,-1-1 0,0 1 0,2 0 60,-1-1-321,0 1 1,0-1-1,0 0 0,0 0 0,0 0 1,0 0-1,2-1 321,21-7-507,-2-4 347,-2-3 22,-3-1 543,-5 1-378,-4 2 26,-4 3-80,-3 4 43,-2 5-21,-1 4 229,0 5-176,2 2 997,2 4-842,4 0 741,3 0-768,6-2 522,5-3-538,4-3 374,10-7 1263,0-4-1520,-2-3 1611,-3-3-1520,-5-1 1462,-6 0-1484,-7 1 817,-7 2-928,-5 1 170,-7 2-299,-5 4-468,-3 3 341,-4 4-1521,-1 2 1286,-1 3-3093,1 2 2709,3 0-4075,5-2 3820,7-4-2295,3-2 1622</inkml:trace>
-</inkml:ink>
-</file>
-
-<file path=ppt/ink/ink59.xml><?xml version="1.0" encoding="utf-8"?>
-<inkml:ink xmlns:inkml="http://www.w3.org/2003/InkML">
-  <inkml:definitions>
-    <inkml:context xml:id="ctx0">
-      <inkml:inkSource xml:id="inkSrc0">
-        <inkml:traceFormat>
-          <inkml:channel name="X" type="integer" min="-2.14748E9" max="2.14748E9" units="cm"/>
-          <inkml:channel name="Y" type="integer" min="-2.14748E9" max="2.14748E9" units="cm"/>
-          <inkml:channel name="F" type="integer" max="32767" units="dev"/>
-        </inkml:traceFormat>
-        <inkml:channelProperties>
-          <inkml:channelProperty channel="X" name="resolution" value="1000" units="1/cm"/>
-          <inkml:channelProperty channel="Y" name="resolution" value="1000" units="1/cm"/>
-          <inkml:channelProperty channel="F" name="resolution" value="0" units="1/dev"/>
-        </inkml:channelProperties>
-      </inkml:inkSource>
-      <inkml:timestamp xml:id="ts0" timeString="2019-06-01T06:28:59.706"/>
-    </inkml:context>
-    <inkml:brush xml:id="br0">
-      <inkml:brushProperty name="width" value="0.1" units="cm"/>
-      <inkml:brushProperty name="height" value="0.1" units="cm"/>
-      <inkml:brushProperty name="color" value="#AE198D"/>
-      <inkml:brushProperty name="inkEffects" value="galaxy"/>
-      <inkml:brushProperty name="anchorX" value="-45823.33594"/>
-      <inkml:brushProperty name="anchorY" value="-35245.14453"/>
-      <inkml:brushProperty name="scaleFactor" value="0.5"/>
-    </inkml:brush>
-  </inkml:definitions>
-  <inkml:trace contextRef="#ctx0" brushRef="#br0">84 0 5152,'0'0'0,"-1"2"2336,-5 4-2390,-1 2 609,-1 2-544,-1 4-881,2 1 721,4 0-1803,4-1 1552,6-3 155,6-5 144,6-3 1237,5-5-987,5-4 661,2-3-628,2-1 58,-2 1-182,0 4 65,-27 7-77,0-2 1,0 0-1,0 1 0,0 0 0,0 0 0,4 1-46,-6 0 7,2 0-1,-1-1 0,1 1 0,-1 1 0,0-1 0,0 0 0,2 2-6,-3 0-11,1 0 1,0 0-1,0 0 0,0 0 1,-1 0-1,2 4 11,-1-1-7,-1 0-1,0 0 1,0 1-1,0-1 1,-1 1 7,0 5 78,0 0 0,-1 0 0,0 4-78,-2 2 0,0 0 0,-3 7 0,0-5 864,-1 0 0,-2 3-864,0-2 304,-11 19-304,9-21 478,-2-1-1,0 0-477,1-4 109,0-1 1,-7 7-110,8-11-342,-1 1 1,-12 8 341,13-12-14,-1 0 0,0 0-1,-4 1 15,5-3-1013,0-1 0,0 0-1,-8 1 1014,9-2-174,-1-1 0,0 0 0,-9-1 174,-19 1-7178</inkml:trace>
-</inkml:ink>
-</file>
-
-<file path=ppt/ink/ink6.xml><?xml version="1.0" encoding="utf-8"?>
-<inkml:ink xmlns:inkml="http://www.w3.org/2003/InkML">
-  <inkml:definitions>
-    <inkml:context xml:id="ctx0">
-      <inkml:inkSource xml:id="inkSrc0">
-        <inkml:traceFormat>
-          <inkml:channel name="X" type="integer" min="-2.14748E9" max="2.14748E9" units="cm"/>
-          <inkml:channel name="Y" type="integer" min="-2.14748E9" max="2.14748E9" units="cm"/>
-          <inkml:channel name="F" type="integer" max="32767" units="dev"/>
-        </inkml:traceFormat>
-        <inkml:channelProperties>
-          <inkml:channelProperty channel="X" name="resolution" value="1000" units="1/cm"/>
-          <inkml:channelProperty channel="Y" name="resolution" value="1000" units="1/cm"/>
-          <inkml:channelProperty channel="F" name="resolution" value="0" units="1/dev"/>
-        </inkml:channelProperties>
-      </inkml:inkSource>
-      <inkml:timestamp xml:id="ts0" timeString="2019-06-01T06:27:59.174"/>
-    </inkml:context>
-    <inkml:brush xml:id="br0">
-      <inkml:brushProperty name="width" value="0.1" units="cm"/>
-      <inkml:brushProperty name="height" value="0.1" units="cm"/>
-      <inkml:brushProperty name="color" value="#AE198D"/>
-      <inkml:brushProperty name="inkEffects" value="galaxy"/>
-      <inkml:brushProperty name="anchorX" value="-6605.6875"/>
-      <inkml:brushProperty name="anchorY" value="-1840.97583"/>
-      <inkml:brushProperty name="scaleFactor" value="0.5"/>
-    </inkml:brush>
-  </inkml:definitions>
-  <inkml:trace contextRef="#ctx0" brushRef="#br0">1 177 2400,'0'0'0,"0"0"1088,2 1-1120,0-1 432,3 1-379,1 0 294,2-2-278,4-1 795,6-2-714,7-1 687,9-2-645,10-2 266,10-4-346,9-1 86,7-4-113,4-2-128,1 0 70,-5-1-1973,-7 3 1642,-9 2-2528,-14 5 1344</inkml:trace>
-</inkml:ink>
-</file>
-
-<file path=ppt/ink/ink60.xml><?xml version="1.0" encoding="utf-8"?>
-<inkml:ink xmlns:inkml="http://www.w3.org/2003/InkML">
-  <inkml:definitions>
-    <inkml:context xml:id="ctx0">
-      <inkml:inkSource xml:id="inkSrc0">
-        <inkml:traceFormat>
-          <inkml:channel name="X" type="integer" min="-2.14748E9" max="2.14748E9" units="cm"/>
-          <inkml:channel name="Y" type="integer" min="-2.14748E9" max="2.14748E9" units="cm"/>
-          <inkml:channel name="F" type="integer" max="32767" units="dev"/>
-        </inkml:traceFormat>
-        <inkml:channelProperties>
-          <inkml:channelProperty channel="X" name="resolution" value="1000" units="1/cm"/>
-          <inkml:channelProperty channel="Y" name="resolution" value="1000" units="1/cm"/>
-          <inkml:channelProperty channel="F" name="resolution" value="0" units="1/dev"/>
-        </inkml:channelProperties>
-      </inkml:inkSource>
-      <inkml:timestamp xml:id="ts0" timeString="2019-06-01T06:29:00.113"/>
-    </inkml:context>
-    <inkml:brush xml:id="br0">
-      <inkml:brushProperty name="width" value="0.1" units="cm"/>
-      <inkml:brushProperty name="height" value="0.1" units="cm"/>
-      <inkml:brushProperty name="color" value="#AE198D"/>
-      <inkml:brushProperty name="inkEffects" value="galaxy"/>
-      <inkml:brushProperty name="anchorX" value="-45104.82031"/>
-      <inkml:brushProperty name="anchorY" value="-35228.14063"/>
-      <inkml:brushProperty name="scaleFactor" value="0.5"/>
-    </inkml:brush>
-  </inkml:definitions>
-  <inkml:trace contextRef="#ctx0" brushRef="#br0">309 1 5824,'0'0'0,"-3"2"2624,-6 3-2651,-3 1 347,-5 4-336,-4 3-149,-4 3 95,-2 6 38,-1 12 27,4 7 0,7 4-182,14-33 176,1 0 1,-2 11 10,1 21-118,6-2 65,2-3-16,1-2 5,-5 1 74,-7-4-692,5-29 660,-1-1 1,0 1 0,0-1-1,0 1 1,-2 1 21,2-2-344,0-1 0,0 0 0,-1 0 0,0 0 0,0 0 0,-1 1 344,1-2-65,0 0 0,0 0 1,0 0-1,0 0 0,0 0 0,-2 0 65,-18 4-2603,21-5 2535,-1-1-1,1 0 1,0 0-1,-1-1 0,1 1 1,-1 0-1,-1-1 69,4 0-93,-2 1-1,1-1 1,0 1-1,-1-1 0,1 1 1,0-1-1,0 0 1,0 0-1,0 0 1,0 0-1,-1 0 94,-7-10-549</inkml:trace>
-</inkml:ink>
-</file>
-
-<file path=ppt/ink/ink61.xml><?xml version="1.0" encoding="utf-8"?>
-<inkml:ink xmlns:inkml="http://www.w3.org/2003/InkML">
-  <inkml:definitions>
-    <inkml:context xml:id="ctx0">
-      <inkml:inkSource xml:id="inkSrc0">
-        <inkml:traceFormat>
-          <inkml:channel name="X" type="integer" min="-2.14748E9" max="2.14748E9" units="cm"/>
-          <inkml:channel name="Y" type="integer" min="-2.14748E9" max="2.14748E9" units="cm"/>
-          <inkml:channel name="F" type="integer" max="32767" units="dev"/>
-        </inkml:traceFormat>
-        <inkml:channelProperties>
-          <inkml:channelProperty channel="X" name="resolution" value="1000" units="1/cm"/>
-          <inkml:channelProperty channel="Y" name="resolution" value="1000" units="1/cm"/>
-          <inkml:channelProperty channel="F" name="resolution" value="0" units="1/dev"/>
-        </inkml:channelProperties>
-      </inkml:inkSource>
-      <inkml:timestamp xml:id="ts0" timeString="2019-06-01T06:29:00.613"/>
-    </inkml:context>
-    <inkml:brush xml:id="br0">
-      <inkml:brushProperty name="width" value="0.1" units="cm"/>
-      <inkml:brushProperty name="height" value="0.1" units="cm"/>
-      <inkml:brushProperty name="color" value="#AE198D"/>
-      <inkml:brushProperty name="inkEffects" value="galaxy"/>
-      <inkml:brushProperty name="anchorX" value="-44161.23047"/>
-      <inkml:brushProperty name="anchorY" value="-35119.51172"/>
-      <inkml:brushProperty name="scaleFactor" value="0.5"/>
-    </inkml:brush>
-  </inkml:definitions>
-  <inkml:trace contextRef="#ctx0" brushRef="#br0">190 1 7392,'0'0'0,"1"-1"3360,0 2-3435,1 1 832,0 1-746,-2 2-608,-2 1 485,-1 1-566,-8 3 641,-2 0 69,-3 0 816,-2 0-683,-2-1 70,-1 1-166,0 1-170,1 2 106,1 3-85,4 4 22,3 1-678,8 1 602,6-1-1743,6-5 1578,-6-14-19,-1-1 0,1 1 0,-1-1 0,1 0 0,-1 0 0,1 0 0,0 1 0,1-1 318,17 4-479,3-7-652,1-6 875,1-5 443,-1-3-235,-3-2 506,-3 0-426,-1 3 848,-2 2-768,-1 4 1035,-1 4-934,2 4 1264,2 3-1151,2 0 2303,4-1-405,0-3-2000,1-3 293,0-3-394,0-2-2352,2-1 1877,4 0-7109,-4 3 3541</inkml:trace>
-</inkml:ink>
-</file>
-
-<file path=ppt/ink/ink62.xml><?xml version="1.0" encoding="utf-8"?>
+<file path=ppt/ink/ink52.xml><?xml version="1.0" encoding="utf-8"?>
 <inkml:ink xmlns:inkml="http://www.w3.org/2003/InkML">
   <inkml:definitions>
     <inkml:context xml:id="ctx0">
@@ -1996,86 +1650,14 @@
   <inkml:trace contextRef="#ctx0" brushRef="#br0" timeOffset="3055.662">2731 269 3648,'5'6'128,"5"5"124,0 0 1,-1 1-1,0 0 1,-1 0-1,-1 1 1,5 10-253,9 23 216,-2 2-1,-1 3-215,26 124 2582,-42-163-1501,0 0 0,-1 0 0,-1-1 0,0 7-1081,0-12 812,-1-2-34,-1-4-137,1-10 382,20-109 630,4-18-196,-17 111-1382,1 1-1,1 0 1,2 0-1,3-6-74,39-71-1160,-29 63-2441,0 1 0,25-28 3601,-35 51-1251,1 0 0,0 0 1,1 2-1,1 0 1,0 0-1,16-8 1251,-6 6-1920</inkml:trace>
   <inkml:trace contextRef="#ctx0" brushRef="#br0" timeOffset="3383.625">3377 587 8384,'39'58'3104,"-13"-32"-2400,22 2-224,-22-17-1376</inkml:trace>
   <inkml:trace contextRef="#ctx0" brushRef="#br0" timeOffset="4196.087">2911 510 3712,'-3'-5'622,"0"-1"0,0 1-1,-1 0 1,0 0 0,-3-3-622,6 7 453,7 6 289,17 6 169,14 8 940,28 18-1851,2 8 143,-3 3-1,-2 3 0,48 52-142,-90-81 127,-2 1 1,-1 0-1,8 15-127,17 23-457,-34-53-1052,-3-7 400</inkml:trace>
-  <inkml:trace contextRef="#ctx0" brushRef="#br0" timeOffset="62229.773">3748 507 3648,'6'-9'1221,"-5"8"-1134,0 0 1,-1 1 0,1-1-1,0 0 1,-1 0-1,1 0 1,-1 0 0,1 0-1,-1 0 1,0 0 0,1-1-1,-1 1 1,0 0 0,0 0-1,0 0 1,0 0 0,0 0-1,0 0 1,0-1-1,0 1 1,0 0-88,-3-7 193,1 0 1,-1 1-1,0-1 0,-1 1 0,0 0 1,0 0-1,0 0 0,-1 1 1,0 0-1,-2-2-193,0 0 155,-1 0 0,1 1 0,-2 0 0,1 1 0,-1 0 1,1 0-1,-8-3-155,7 5 61,0 1 1,0 0-1,0 0 1,0 1-1,0 0 1,-1 0-1,1 1 1,-1 1 0,1 0-1,-1 0 1,1 1-1,0 0 1,-7 1-62,13-1 24,0 0 1,1-1 0,-1 1-1,1 0 1,0 1 0,-1-1-1,1 0 1,0 1 0,0-1-1,-1 1 1,1 0 0,0 0-1,1-1 1,-1 1 0,0 0-1,1 1 1,-1-1 0,1 0-1,-1 0 1,1 1 0,-1 1-25,1-1 30,1 0 1,-1 1 0,0-1-1,1 1 1,0-1-1,0 1 1,0-1 0,0 0-1,1 1 1,-1-1 0,1 1-1,0-1 1,0 0-1,0 0 1,0 1 0,1 0-31,8 19 164,-2-6-76,-1-1-1,0 1 0,2 14-87,-8-25 87,1 1-1,-2 0 0,1 0 1,-1 0-1,0 1 0,0-1 0,-1 0 1,0 0-1,0 0 0,-1-1 1,-1 6-87,-3 3 361,0 0 0,-1 0 1,-1-1-1,0 0 1,-1 0-1,0-1 0,-8 8-361,-4 3 752,-1-1-1,0-2 0,-15 11-751,17-17 154,-1 0 0,0-1 0,-12 5-154,21-13-284,-1 0 0,0 0 0,0-2 1,-1 1-1,1-2 0,-1 0 0,0 0 284,8-3-624,1 1 0,-1-1 0,1 0 0,-1 0 0,-5-1 624,-17-9-2202</inkml:trace>
+  <inkml:trace contextRef="#ctx0" brushRef="#br0" timeOffset="62229.772">3748 507 3648,'6'-9'1221,"-5"8"-1134,0 0 1,-1 1 0,1-1-1,0 0 1,-1 0-1,1 0 1,-1 0 0,1 0-1,-1 0 1,0 0 0,1-1-1,-1 1 1,0 0 0,0 0-1,0 0 1,0 0 0,0 0-1,0 0 1,0-1-1,0 1 1,0 0-88,-3-7 193,1 0 1,-1 1-1,0-1 0,-1 1 0,0 0 1,0 0-1,0 0 0,-1 1 1,0 0-1,-2-2-193,0 0 155,-1 0 0,1 1 0,-2 0 0,1 1 0,-1 0 1,1 0-1,-8-3-155,7 5 61,0 1 1,0 0-1,0 0 1,0 1-1,0 0 1,-1 0-1,1 1 1,-1 1 0,1 0-1,-1 0 1,1 1-1,0 0 1,-7 1-62,13-1 24,0 0 1,1-1 0,-1 1-1,1 0 1,0 1 0,-1-1-1,1 0 1,0 1 0,0-1-1,-1 1 1,1 0 0,0 0-1,1-1 1,-1 1 0,0 0-1,1 1 1,-1-1 0,1 0-1,-1 0 1,1 1 0,-1 1-25,1-1 30,1 0 1,-1 1 0,0-1-1,1 1 1,0-1-1,0 1 1,0-1 0,0 0-1,1 1 1,-1-1 0,1 1-1,0-1 1,0 0-1,0 0 1,0 1 0,1 0-31,8 19 164,-2-6-76,-1-1-1,0 1 0,2 14-87,-8-25 87,1 1-1,-2 0 0,1 0 1,-1 0-1,0 1 0,0-1 0,-1 0 1,0 0-1,0 0 0,-1-1 1,-1 6-87,-3 3 361,0 0 0,-1 0 1,-1-1-1,0 0 1,-1 0-1,0-1 0,-8 8-361,-4 3 752,-1-1-1,0-2 0,-15 11-751,17-17 154,-1 0 0,0-1 0,-12 5-154,21-13-284,-1 0 0,0 0 0,0-2 1,-1 1-1,1-2 0,-1 0 0,0 0 284,8-3-624,1 1 0,-1-1 0,1 0 0,-1 0 0,-5-1 624,-17-9-2202</inkml:trace>
   <inkml:trace contextRef="#ctx0" brushRef="#br0" timeOffset="64076.36">2398 752 2240,'72'-20'1605,"-71"20"-1554,-1-1 0,1 1-1,-1 0 1,1 0 0,-1 0-1,1-1 1,-1 1 0,1 0-1,-1 0 1,1-1 0,-1 1-1,0 0 1,1-1 0,-1 1-1,1-1 1,-1 1 0,0 0-1,1-1 1,-1 1 0,0-1 0,0 1-1,0-1 1,1 1 0,-1-1-1,0 1 1,0-1 0,0 1-1,0-1 1,0 1 0,0-1-1,0 0 1,0 1 0,0-1-1,0 1 1,0-1 0,0 1-1,0-1 1,0 1 0,0-1-1,-1 1 1,1-1-51,-11-23 2393,9 21-2251,-1-2 15,0 1 0,-1-1 0,1 1-1,-1-1 1,0 1 0,0 1-1,-1-1 1,1 0 0,-1 1 0,0 0-1,0 0 1,-4-1-157,0-1 112,-1 1-1,-1 0 0,1 1 1,-1 1-1,1 0 1,-4-1-112,0 1 51,0 1 0,0 1 0,-1 0 0,1 0-1,0 1 1,0 1 0,0 1 0,-14 3-51,21-3 14,-1-1-1,1 1 1,-1 1-1,1-1 1,0 1-1,0 1 1,1-1-1,-1 1 1,1 0 0,0 1-1,1-1 1,-1 1-1,1 0 1,0 1-1,0-1 1,-1 4-14,5-7-2,-1 0 1,1-1-1,0 1 1,0 0 0,0 0-1,0 0 1,0 0 0,1 1-1,0-1 1,-1 0-1,1 0 1,0 0 0,0 0-1,1 0 1,-1 0-1,1 1 1,-1-1 0,1 0-1,0 0 1,0 0 0,1-1-1,-1 1 1,1 0-1,-1 0 1,1-1 0,0 1-1,0-1 1,0 1-1,0-1 1,0 0 0,1 1 1,1 0 39,0 1 0,-1-1 0,1-1 1,0 1-1,1-1 0,-1 1 0,0-1 0,1-1 1,-1 1-1,1 0 0,-1-1 0,1 0 0,0 0 1,-1-1-1,1 1 0,0-1 0,0 0 1,0 0-1,-1-1 0,3 0-39,1-1 116,0 0 0,0-1 0,-1 0 1,1 0-1,-1 0 0,0-1 0,0-1 0,2-1-116,4-4 587,-1-1-1,0 0 0,7-9-586,-18 19 29,-1 1 1,1-1 0,0 0-1,0 0 1,0 0-1,-1 0 1,1 1-1,0-1 1,0 0-1,0 1 1,0-1 0,0 0-1,1 1 1,-1-1-1,0 1 1,0 0-1,0-1 1,0 1-1,0 0 1,0 0 0,1 0-1,-1 0 1,1 0-30,0 1-6,0 0 0,1 0 0,-1 0-1,0 1 1,0-1 0,0 0 0,0 1 0,0 0 0,-1-1 0,1 1 0,0 0 6,42 48 248,-27-30-732,0-1 0,11 9 484,-25-26-218,-1 0-1,1 1 1,0-1 0,0 0-1,0-1 1,0 1 0,0 0-1,0-1 1,0 0-1,0 0 1,0 0 0,1 0-1,-1 0 1,0 0 0,1-1-1,-1 0 1,1 0-1,-1 0 1,3 0 218,12-7-3637</inkml:trace>
   <inkml:trace contextRef="#ctx0" brushRef="#br0" timeOffset="64841.985">1674 242 4480,'0'-1'46,"0"1"0,0 0 0,0 0 0,0 0 0,0 0 1,0 0-1,0-1 0,0 1 0,0 0 0,0 0 0,0 0 0,0 0 0,0 0 0,0-1 1,0 1-1,0 0 0,0 0 0,-1 0 0,1 0 0,0 0 0,0 0 0,0 0 0,0-1 1,0 1-1,0 0 0,0 0 0,-1 0 0,1 0 0,0 0 0,0 0 0,0 0 0,0 0 1,0 0-1,-1 0 0,1 0 0,0 0 0,0 0 0,0 0 0,0 0 0,0 0 0,-1 0 1,1 0-1,0 0 0,0 0 0,0 0-46,0 8 391,5 17-617,66 229 92,1 42 350,-48-186 592,-19-100-967,-3-8-542,-2-7-668,-4-5-1420</inkml:trace>
-  <inkml:trace contextRef="#ctx0" brushRef="#br0" timeOffset="65216.995">1565 496 8128,'61'-9'3008,"-13"6"-2336,47-13-160,-30 4-32,25-7-352,9-4-1024,5-7 480,-10-5-5760</inkml:trace>
+  <inkml:trace contextRef="#ctx0" brushRef="#br0" timeOffset="65216.994">1565 496 8128,'61'-9'3008,"-13"6"-2336,47-13-160,-30 4-32,25-7-352,9-4-1024,5-7 480,-10-5-5760</inkml:trace>
 </inkml:ink>
 </file>
 
-<file path=ppt/ink/ink63.xml><?xml version="1.0" encoding="utf-8"?>
-<inkml:ink xmlns:inkml="http://www.w3.org/2003/InkML">
-  <inkml:definitions>
-    <inkml:context xml:id="ctx0">
-      <inkml:inkSource xml:id="inkSrc0">
-        <inkml:traceFormat>
-          <inkml:channel name="X" type="integer" min="-2.14748E9" max="2.14748E9" units="cm"/>
-          <inkml:channel name="Y" type="integer" min="-2.14748E9" max="2.14748E9" units="cm"/>
-          <inkml:channel name="F" type="integer" max="32767" units="dev"/>
-        </inkml:traceFormat>
-        <inkml:channelProperties>
-          <inkml:channelProperty channel="X" name="resolution" value="1000" units="1/cm"/>
-          <inkml:channelProperty channel="Y" name="resolution" value="1000" units="1/cm"/>
-          <inkml:channelProperty channel="F" name="resolution" value="0" units="1/dev"/>
-        </inkml:channelProperties>
-      </inkml:inkSource>
-      <inkml:timestamp xml:id="ts0" timeString="2019-06-01T06:32:39.596"/>
-    </inkml:context>
-    <inkml:brush xml:id="br0">
-      <inkml:brushProperty name="width" value="0.05" units="cm"/>
-      <inkml:brushProperty name="height" value="0.05" units="cm"/>
-    </inkml:brush>
-  </inkml:definitions>
-  <inkml:trace contextRef="#ctx0" brushRef="#br0">794 279 2656,'-1'0'46,"1"-1"-1,0 1 1,0-1-1,0 1 1,-1-1 0,1 1-1,0-1 1,0 1-1,0-1 1,0 1 0,0-1-1,0 0 1,0 1-1,0-1 1,0 1 0,0-1-1,1 1 1,-1-1 0,0 1-1,0-1 1,0 1-1,1-1 1,-1 1 0,0-1-1,1 1 1,-1-1-1,0 1 1,1-1-46,0 0 52,1-1 0,0 1 1,-1 0-1,1 0 0,0-1 0,0 1 1,0 0-1,1 0-52,7-3 213,0 1 0,1 0 1,1 0-214,-11 3 28,65-12 3495,60-4-3523,70 3 2249,-127 9-1766,1101-69 4195,-936 58-4049,213-7 373,-82 5-399,-43 6-530,-109 10-3095,-202 1 2607,-9-1 95,1 1-1,0 0 1,0 0-1,0 0 0,0 0 1,-1 1-1,1-1 1,0 1-1,0 0 1,-1-1-1,1 1 1,0 1 320,-3-2-61,0 0 1,0 0-1,1 0 1,-1 0-1,0 1 1,0-1 0,0 0-1,0 0 1,0 0-1,1 0 1,-1 1-1,0-1 1,0 0-1,0 0 1,0 0 0,0 1-1,0-1 1,0 0-1,0 0 1,0 0-1,0 1 1,0-1-1,0 0 1,0 0 0,0 0-1,0 1 1,0-1-1,0 0 1,0 0-1,0 1 1,0-1 0,0 0-1,0 0 1,-1 0-1,1 0 1,0 1-1,0-1 1,0 0-1,0 0 61,-10 11-4042</inkml:trace>
-  <inkml:trace contextRef="#ctx0" brushRef="#br0" timeOffset="1609.341">548 378 6560,'-22'-43'2117,"21"42"-2065,1 0 1,-1 1-1,1-1 1,-1 0-1,1 0 1,-1 0-1,1 0 0,0 0 1,-1 0-1,1 0 1,0 0-1,0 0 1,0 0-1,0 0 0,0 0 1,0 0-1,0 0 1,0 0-1,0 0 1,0 0-1,1 0 0,-1 0 1,0 0-53,1 1 10,-1 0 1,1 0-1,-1 0 0,0 0 1,1 0-1,-1-1 1,1 1-1,-1 1 0,1-1 1,-1 0-1,0 0 0,1 0 1,-1 0-1,1 0 0,-1 0 1,1 0-1,-1 1 1,0-1-1,1 0 0,-1 0 1,0 0-1,1 1 0,-1-1 1,0 0-1,1 1 1,-1-1-1,0 0 0,0 1 1,1-1-1,-1 0 0,0 1 1,0-1-1,1 0 1,-1 1-1,0-1 0,0 1 1,0-1-1,0 1-10,7 12-351,-2 1 0,0 0-1,0 0 1,-1 0 0,-1 1 0,0-1-1,-1 5 352,4 35-1029,-2 0 0,-2 1 0,-3-1 0,-8 52 1029,-11 31-1963,-15 46 1963,-111 393 2175,96-391-900,-153 500 3023,203-684-4297,-43 125 246,14-42-206,-11 57-41,38-135 126,1-1 1,0 1 0,1 0-1,-1 0 1,1-1-1,0 1 1,1 2-127,-1-7 61,0 0 1,0 1 0,1-1-1,-1 0 1,0 1-1,1-1 1,-1 0-1,1 0 1,0 0-1,-1 1 1,1-1-1,0 0 1,0 0 0,0 0-1,-1 0 1,1 0-1,0 0 1,0 0-1,1-1 1,-1 1-1,0 0 1,0-1-1,0 1 1,0 0 0,1-1-1,-1 0 1,0 1-1,1-1 1,-1 0-1,0 1 1,1-1-1,-1 0 1,1 0-62,24 0 304,0-2 0,0 0 0,0-2 0,12-4-304,2 1 192,482-61 2580,-457 61-2584,225-16 361,1 12 0,23 13-549,583 60 416,260 97 200,-661-85-586,-447-67 32,571 66 116,-596-71-146,52 2 185,10-3-217,-64-1 38,0-2-1,1-1 1,-1 0-1,0-2 1,0 0-1,2-2-37,-18 4 17,1 1-1,-1-1 0,0 0 1,0-1-1,0 0 0,0 0 1,-1 0-1,0 0 0,0-1 1,0 0-1,0 0 0,-1 0 1,1-1-1,-1 0 0,1-2-16,0-1 3,-1-1 0,0 0 0,0 0 0,-1 0 0,0 0 0,-1-1 0,0 1 0,-1 0 0,1-10-3,5-371 229,0-7 342,71-412-160,-25 532-514,15 6-40,-47 192 170,-4 3-336,-2-1 0,3-75 309,-17 146-114,-1 0 0,0-1 1,0 1-1,-1 0 1,1 0-1,-2 0 0,1 0 1,-1 0-1,-1-3 114,1 5-47,0 1 0,-1-1-1,0 1 1,1-1 0,-1 1-1,-1 0 1,1 0 0,-1 0 0,1 1-1,-1-1 1,0 1 0,-1 0-1,-1-1 48,-19-12-119,-2 1 0,0 2 0,-14-5 119,-89-30-127,110 41 83,-80-24-529,0 5 0,-34-3 573,-209-24-757,225 36 789,-133-14-265,-172 3 233,133 27-3975,152 8 1169,8 4-2340</inkml:trace>
-  <inkml:trace contextRef="#ctx0" brushRef="#br0" timeOffset="3390.638">975 612 4160,'1'-3'384,"-1"3"-326,0 0 0,0-1 0,0 1 0,0 0 0,0-1 0,1 1 0,-1-1-1,0 1 1,0 0 0,0-1 0,1 1 0,-1 0 0,0 0 0,0-1 0,1 1 0,-1 0 0,0-1 0,1 1 0,-1 0 0,0 0-1,1 0 1,-1-1 0,0 1 0,1 0 0,-1 0 0,0 0 0,1 0 0,-1 0 0,1 0-58,-2 21-75,-32 362-426,32-241 3066,5-146-2186,-2 0-253,-1-1 0,0 0 0,0 0 0,0 0 0,-1 0 0,1 1 0,-1-1 0,0 0 0,-1 0 0,0-2-126,1-11 494,-12-220 2865,3 88-2366,8-8-769,1 157-264,0-1 0,0 0 0,0 1 0,0-1 0,0 1 0,0-1 0,1 0 0,-1 1 0,1-1 0,-1 1 0,1-1 0,-1 1 0,1-1 0,0 1 0,0 0 0,0-1 0,0 1 0,0 0 0,0 0 0,0 0 0,0-1 0,2 0 40,-1 1-39,0 0 1,0 1-1,1-1 1,-1 0 0,0 1-1,1-1 1,-1 1 0,0-1-1,1 1 1,-1 0 0,1 0-1,-1 0 1,1 1 0,-1-1-1,2 1 39,7 1-154,0 1 0,1 0 0,-1 0 1,0 2-1,-1-1 0,1 1 0,-1 1 0,0 0 0,0 0 0,9 8 154,-8-4-160,0 0-1,-1 1 1,0 0 0,0 1 0,-1 0-1,-1 1 1,0-1 0,2 8 160,-1-2 82,-1 1 0,0 0 0,-2 0 0,0 0 0,-2 1 0,0 0 0,-1 0 0,0 0 0,-2 0 1,-1 0-1,0 0 0,-2 0 0,-2 12-82,3-25 14,-1 0-1,0 0 1,0 0 0,0 0 0,-1 0 0,0-1 0,-1 0 0,1 1-1,-3 1-13,4-5-94,-1 0 0,0 0 0,0 0 0,0 0 0,0 0 0,0 0 0,-1-1-1,1 0 1,-1 0 0,1 0 0,-1 0 0,0 0 0,0-1 0,0 1-1,0-1 1,-3 0 94,-1 0-532,0-1-1,0 1 0,0-2 1,0 1-1,0-1 0,0-1 1,0 1-1,0-1 0,0-1 1,1 1-1,-1-1 1,1-1-1,0 1 0,0-1 1,0 0-1,-1-1 533,-11-14-1200</inkml:trace>
-  <inkml:trace contextRef="#ctx0" brushRef="#br0" timeOffset="3968.774">1393 938 3488,'0'1'56,"0"-1"-1,-1 0 1,1 1 0,0-1 0,0 0 0,-1 1-1,1-1 1,0 0 0,0 1 0,0-1 0,0 0-1,-1 1 1,1-1 0,0 1 0,0-1 0,0 0-1,0 1 1,0-1 0,0 1 0,0-1 0,0 0-1,0 1 1,0-1 0,1 0 0,-1 1 0,0-1-1,0 1 1,0-1 0,0 0 0,0 1 0,1-1-56,0 1 23,-1-1 0,1 0 0,0 1 0,-1-1 0,1 0 0,0 0 0,0 0 0,-1 1-1,1-1 1,0 0 0,0 0 0,-1 0 0,1 0 0,0 0 0,0 0-23,27-6-245,-9 0 989,-1-1 0,1-1 1,15-9-745,-30 15 197,0-1 1,0 1 0,0-1-1,-1 1 1,1-1 0,-1 0-1,0 0 1,0-1 0,0 1 0,0-1-1,-1 1 1,1-1 0,-1 0-1,0 0 1,0 0 0,0 0 0,-1 0-1,1 0 1,-1-1 0,0-1-198,-1 4 103,1-1-1,-1 1 1,0 0 0,-1-1 0,1 1 0,0-1 0,-1 1 0,1 0 0,-1 0 0,0-1 0,0 1 0,0 0 0,0 0 0,0 0-1,0 0 1,0 0 0,-1 0 0,0-1-103,-1 0 50,0 0 0,-1 0-1,1 0 1,-1 0 0,0 1 0,1 0 0,-1 0-1,0 0 1,-4-2-50,-1 1 1,0 1 0,0-1 0,0 1 0,0 1 0,0-1 0,-1 2 0,1-1 0,0 1 0,-5 1-1,8 0 20,0 0 0,0 1 1,1-1-1,-1 1 0,1 0 0,-1 0 1,1 1-1,0 0 0,0 0 0,0 0 0,0 0 1,1 1-1,-1 0 0,1 0 0,0 0 1,0 0-1,0 1 0,1 0 0,-2 1-20,3-1 10,-1-1 0,1 1 0,0-1 0,1 1 0,-1-1 0,1 1 0,-1 0 0,2 0 0,-1 0-1,0 0 1,1 0 0,0 0 0,0 0 0,0 0 0,1 0 0,0-1 0,0 1 0,0 0 0,0 0 0,1 0 0,0-1 0,1 4-10,3 1-341,-1 0 1,1-1-1,1 1 1,0-1-1,0-1 1,0 1 0,1-1-1,0 0 1,1-1-1,0 0 1,-1 0-1,2-1 1,-1 0-1,1-1 1,-1 0 0,1 0-1,0-1 1,3 0 340,21 5-2336</inkml:trace>
-  <inkml:trace contextRef="#ctx0" brushRef="#br0" timeOffset="4449.833">1817 455 7136,'-3'-11'852,"-14"-36"1263,16 44-2007,-1-1 0,0 1 0,0 0 0,0-1 0,0 1 0,0 0 0,-1 0-1,1 0 1,-1 1 0,0-1 0,-1 0-108,4 2 6,-1 1-1,0-1 0,1 1 0,-1 0 0,1 0 1,-1-1-1,1 1 0,-1 0 0,0 0 0,1-1 1,-1 1-1,1 0 0,-1 0 0,0 0 0,1 0 1,-1 0-1,0 0 0,1 0 0,-1 0 0,0 0 1,1 0-1,-1 1 0,1-1 0,-1 0 1,0 0-1,0 1-5,0 0-3,0-1 0,0 1-1,0 0 1,1 0 0,-1 0 0,0 0 0,0 0 0,0 1 0,1-1 0,-1 0 0,1 0-1,-1 0 1,1 1 3,-3 7-61,1-1-1,0 1 0,0 0 0,1 2 62,0-4-29,-6 58-321,3-1 0,2 1 0,4 1 350,-1 17-129,-2-24-49,0-17-200,1 0 0,3 0 0,1 0 0,4 14 378,-3-41-1568,3-10-1936</inkml:trace>
-  <inkml:trace contextRef="#ctx0" brushRef="#br0" timeOffset="4856.057">2010 843 5984,'-9'14'1419,"-2"0"0,-5 6-1419,-12 16-1324,26-34 1032,0 1 0,0-1-1,1 1 1,-1 0 0,1 0-1,0 0 1,-1 0-1,1-1 1,1 2 0,-1-1-1,0 0 1,1 0-1,-1 0 1,1 0 0,0 0-1,0 0 1,0 1 292,0-4-11,0 0-1,0 1 1,0-1-1,1 0 1,-1 1 0,0-1-1,0 1 1,0-1 0,0 0-1,0 1 1,0-1 0,1 0-1,-1 0 1,0 1-1,0-1 1,0 0 0,1 1-1,-1-1 1,0 0 0,0 0-1,1 1 1,-1-1-1,0 0 1,1 0 0,-1 0-1,0 1 1,1-1 0,-1 0-1,0 0 1,1 0 0,-1 0-1,0 0 1,1 0-1,-1 0 1,0 0 0,1 0-1,-1 0 1,1 0 11,7-1 416,1 0 0,-1-1 0,0 0 0,0 0 0,0-1 0,0 0 0,6-4-416,-4 3 847,0-1 0,0-1 0,-1 0 0,0 0 0,0-1 0,3-3-847,-7 4 774,0 1-1,0-1 0,-1 0 1,3-4-774,3 31 485,-8-19-744,-1 0-1,1 0 1,-1 0-1,1 0 1,0 0 0,0 0-1,0-1 1,0 1-1,0-1 1,0 1 0,2 0 259,14 3-1472</inkml:trace>
-  <inkml:trace contextRef="#ctx0" brushRef="#br0" timeOffset="5331.601">2239 751 5216,'2'9'474,"-1"0"-1,1 0 1,1 0 0,0 0 0,2 4-474,-4-11-93,0 1 1,1-1-1,-1 1 0,1-1 1,-1 0-1,1 0 1,0 0-1,0 0 1,0 0-1,0 0 0,1 0 1,-1-1-1,0 1 1,1-1-1,-1 1 0,1-1 1,-1 0-1,1 0 1,0 0-1,1 0 93,6 1 24,0-1 0,0 0-1,1 0 1,-1-1 0,0 0-1,0-1 1,0 0 0,9-2-24,-7 0 620,0-1 1,0 0-1,0-1 1,0 0-1,0-1 1,-1 0-1,0 0 1,-1-1-1,1-1 1,6-6-621,-17 14 17,0 0 1,0 0 0,0 0-1,0 0 1,0 0 0,0 0-1,0 0 1,0 0-1,0 0 1,0 0 0,0 0-1,0 0 1,0 0 0,0 0-1,0 0 1,0 0 0,0 0-1,0 0 1,0 0 0,0 0-1,0 0 1,0 0-1,0 0 1,0 0 0,0 0-1,0 0 1,1 0 0,-1 0-1,0 0-17,-5 7 71,-10 14-360,-53 58-736,-3-2 0,-46 34 1025,4-2 855,77-74-1484,8-7-2160</inkml:trace>
-  <inkml:trace contextRef="#ctx0" brushRef="#br0" timeOffset="5890.875">2705 927 3808,'0'-1'143,"1"0"0,-1-1 0,0 1 0,1 0 0,-1 0-1,1 0 1,-1 0 0,1 1 0,-1-1 0,1 0 0,0 0 0,0 0 0,-1 0 0,1 0 0,0 1 0,0-1 0,0 0 0,0 1-1,0-1 1,0 1 0,0-1 0,0 1 0,0-1 0,0 1 0,0 0 0,0-1 0,1 1-143,11-6 1074,-13 5-1046,9-4 530,0-1 0,-1 0 0,0 0 0,0-1 0,0 0 0,5-8-558,-12 15 60,-1-1-1,1 1 1,-1-1-1,0 1 1,1-1-1,-1 1 1,0-1 0,1 0-1,-1 1 1,0-1-1,0 1 1,1-1 0,-1 0-1,0 1 1,0-1-1,0 0 1,0 1-1,0-1 1,0 0 0,0 1-1,0-1 1,0 0-1,0 0-59,-1 1 23,1 0 0,0-1-1,-1 1 1,1 0 0,-1 0 0,1-1-1,-1 1 1,1 0 0,-1 0-1,1 0 1,-1-1 0,1 1-1,-1 0 1,1 0 0,-1 0-1,1 0 1,-1 0 0,1 0 0,-1 0-1,1 0 1,-1 0 0,0 1-23,-4 0 29,0 0 0,-1 0 0,1 1 1,0 0-1,-2 1-29,-9 6-5,1 0-1,0 0 1,1 2 0,0 0-1,0 0 1,1 1 0,1 1-1,0 0 1,1 1 0,-1 3 5,8-13-86,1 1 0,1-1 0,-1 1 0,1 0 1,0 0-1,0 0 0,0 0 0,0 0 0,1 0 1,0 0-1,0 1 0,1-1 0,-1 1 86,1-4-178,1 0 0,-1 0 0,0 0 0,0 0 0,1 0 0,0 0 0,-1 0 0,1 0 0,0 0 0,0 0 0,0 0 0,0 0 0,0-1 0,0 1 0,1 0 0,-1-1 0,0 1 0,1-1 0,-1 1 0,1-1 0,0 0 0,-1 0 0,1 0 0,0 0 0,0 0 0,0 0 0,0 0 0,0-1 0,0 1 0,0 0 0,0-1 0,0 0 0,0 0 0,2 1 178,6-1-1044,1 0-1,-1 0 1,0-1 0,0 0 0,4-1 1044,27-5-1147</inkml:trace>
-  <inkml:trace contextRef="#ctx0" brushRef="#br0" timeOffset="6299.674">3213 835 6976,'-9'4'579,"0"0"0,1 0 1,-1 1-1,1 0 0,0 1 1,-7 5-580,-9 8 268,2-3-345,1 1 1,0 1-1,2 1 1,0 0-1,1 2 1,-3 6 76,20-26 0,-3 3 2,1 1-1,0-1 0,0 0 1,1 1-1,-1-1 1,1 1-1,0 0 1,0 0-1,0 0 1,1 0-1,-1 4-1,2-8 9,0-1-1,0 1 1,0-1 0,0 1-1,0-1 1,0 1 0,0-1-1,0 1 1,1-1 0,-1 1-1,0-1 1,0 0 0,0 1-1,1-1 1,-1 1-1,0-1 1,0 0 0,1 1-1,-1-1 1,0 1 0,1-1-1,-1 0 1,1 0 0,-1 1-1,0-1 1,1 0 0,-1 0-1,1 1 1,-1-1 0,1 0-1,-1 0 1,1 0-9,1 1 48,0-1-1,-1 0 1,1 0-1,0 0 1,0 0-1,0 0 1,0-1-1,0 1 1,1-1-48,4-1 228,-1 0 0,0 0 0,0-1 0,0 0 0,3-1-228,3-5 279,0 0 0,0-1 0,-1-1-1,0 1 1,-1-2 0,0 1 0,-1-2 0,0 1-1,-1-1 1,-1 0 0,2-5-279,13-30 555,-2-1 1,7-32-556,-20 61 132,12-47 852,-4 0 0,1-21-984,17-70 703,-29 145-1203,-4 19 95,-4 23 68,-10 58-47,0 60 384,12-103-325,2 0-1,2 0 1,3 0 0,2 12 325,-3-39-944,0 0 0,0 0 0,2 0 0,0-1 0,9 16 944,9 8-2400</inkml:trace>
-  <inkml:trace contextRef="#ctx0" brushRef="#br0" timeOffset="7256.026">1329 1702 6304,'0'-1'63,"0"1"0,0-1-1,0 1 1,1-1 0,-1 1 0,0-1 0,0 1 0,0-1 0,1 1-1,-1-1 1,0 1 0,0 0 0,1-1 0,-1 1 0,0-1 0,1 1 0,-1 0-1,0-1 1,1 1 0,-1 0 0,1-1 0,-1 1 0,1 0 0,-1 0-1,1-1 1,-1 1 0,1 0 0,-1 0 0,1 0 0,-1 0 0,1 0-1,-1-1 1,1 1 0,-1 0 0,1 0 0,-1 1 0,1-1 0,-1 0 0,1 0-1,-1 0 1,1 0 0,-1 0 0,1 0 0,-1 1 0,1-1 0,-1 0-1,1 0 1,-1 1 0,0-1 0,1 0 0,-1 1 0,1-1 0,-1 0-1,0 1 1,1 0-63,1 0 77,-1 1 0,1 1 0,0-1-1,-1 0 1,0 0 0,1 0 0,-1 1-1,0-1 1,0 1 0,0-1 0,-1 1-1,1 0-76,1 11-77,-1 1-1,-1 0 0,0-1 0,-1 1 1,-2 10 77,-16 76-675,18-94 661,-24 100-152,5-24-524,3 0-1,2 22 691,14-98-224,1-6-11,-1 1 1,1 0-1,0 0 0,0 0 1,0 0-1,0 0 1,0 0-1,0 0 0,1 0 235,-5-8-2426</inkml:trace>
-  <inkml:trace contextRef="#ctx0" brushRef="#br0" timeOffset="7657.173">1027 1639 10464,'9'-3'3872,"4"-1"-3008,25-3-224,-12 3-1056,13-8 96,13-3-1984,8-5 1280,-8-2-3008,3-1 2272,-2-4-1728</inkml:trace>
-  <inkml:trace contextRef="#ctx0" brushRef="#br0" timeOffset="8058.222">1653 1859 5568,'-1'-1'77,"1"0"-1,-1 1 1,1-1 0,-1 0 0,0 1-1,1-1 1,-1 1 0,0 0 0,1-1-1,-1 1 1,0-1 0,0 1 0,1 0-1,-1 0 1,0-1 0,0 1 0,0 0-1,0 0 1,1 0 0,-1 0 0,0 0-1,0 0 1,0 0 0,0 0 0,1 0-1,-1 0 1,0 1 0,0-1 0,0 0-1,1 0 1,-1 1 0,0-1 0,0 1-1,1-1 1,-1 1 0,0-1 0,0 1-77,-4 3-93,-1 0 0,1 0 1,0 0-1,-2 3 93,-2 2 120,0 0 0,1 1 0,1 0 0,0 0 0,0 1 0,1 0 0,0 0 0,1 0 0,0 1 0,-2 10-120,5-15 48,1-1 1,0 1-1,0 0 0,0 0 0,1-1 1,0 1-1,0 0 0,1 0 1,1 4-49,-1-6 2,0 0 0,1 0 0,0-1 1,0 1-1,0 0 0,0-1 0,1 0 1,0 1-1,-1-1 0,2 0 1,-1-1-1,0 1 0,4 3-2,-3-4 31,0 0-1,0 0 1,1 0-1,-1-1 1,1 0 0,0 0-1,-1 0 1,1 0-1,0 0 1,0-1-1,0 0 1,0 0 0,0-1-1,0 1 1,0-1-1,1 0 1,-1-1 0,0 1-1,0-1 1,0 0-1,0 0 1,0 0-1,0-1 1,3-1-31,5-3 444,0 0 1,-1 0-1,0-1 0,0-1 0,-1 0 0,0 0 1,0-1-1,6-8-444,-6 5 413,-2-1 0,1 0 0,-1-1 0,-1 0 0,-1 0 0,0-1 0,0 0 0,-2 0 0,3-12-413,-8 31-143,0-1 1,0 0-1,0 1 0,1-1 0,-1 1 0,1-1 0,0 0 1,0 0-1,0 1 0,0-1 0,0 0 0,2 2 143,-2-2-296,0 0 0,1-1-1,-1 1 1,1-1 0,0 1-1,-1-1 1,1 0 0,1 1-1,-1-1 1,0 0 0,0 0-1,1-1 1,-1 1-1,1 0 1,-1-1 0,1 0-1,2 2 297,0-3-674,1 1-1,-1-1 1,1 0-1,-1 0 1,0 0-1,1-1 1,-1 0-1,1 0 0,-1 0 1,0-1-1,0 0 1,0 0-1,1-1 675,-4 3-52,20-8-1249</inkml:trace>
-  <inkml:trace contextRef="#ctx0" brushRef="#br0" timeOffset="8428.353">2239 1686 8064,'-13'23'2976,"5"-8"-2304,-1 17-192,0-11-352,0 11-160,1 2-1024,-1 8 576,0 0 192,1 0 192,-1-3 96,-4-8 0,1-1 64,-1-7-32,0-7-96,0-4 32,4-9-1312,9 1 736,5-16-4064</inkml:trace>
-  <inkml:trace contextRef="#ctx0" brushRef="#br0" timeOffset="8860.392">2368 1387 9632,'5'-20'2330,"0"1"1,2-6-2331,-6 24-715,-1 4-245,-4 75-5168,-9 52 6128,0-8-917,11-98 731,-7 131 1154,9-122 688,1 0-1,2-1 1,4 23-1656,-6-52 216,-1 0-1,1 0 1,0 0-1,0 0 1,0 0-1,1 0 1,0 2-216,-1-4 42,-1-1 0,0 1 0,0-1 0,1 0 0,-1 1 0,0-1 0,1 0 0,-1 0 0,0 1 0,1-1 1,-1 0-1,0 0 0,1 0 0,-1 1 0,1-1 0,-1 0 0,0 0 0,1 0 0,-1 0 0,1 0 0,-1 0 0,1 0 0,-1 0-42,1 0 42,0 0 0,0 0-1,0-1 1,-1 1-1,1 0 1,0-1-1,0 1 1,-1-1 0,1 1-1,0-1 1,-1 0-1,1 1 1,0-1-1,-1 0 1,1 1 0,0-1-42,5-8 112,0-1 0,0 1 1,-1-1-1,0 0 1,1-4-113,20-57 40,-15 35-24,58-169-1546,-46 136-1241,-3-1 0,1-22 2771,-16 62-1354</inkml:trace>
-  <inkml:trace contextRef="#ctx0" brushRef="#br0" timeOffset="9310.712">2498 1927 4896,'21'42'1824,"-7"-22"-1440</inkml:trace>
-  <inkml:trace contextRef="#ctx0" brushRef="#br0" timeOffset="9678.474">2885 1494 9312,'-4'3'639,"-11"6"733,1 1 1,1 0 0,-3 4-1373,8-6-3,0 0 0,1 0 0,1 1 0,-1 0 0,0 2 3,4-5-232,0-1 0,1 1 0,0 0 0,0 0 1,0 0-1,0 0 0,1 0 0,0 1 1,0 3 231,0 69-1523,1-45 1047,-1 1 0,-3 19 476,-1-26 535,-1 0 0,-1 0 0,-1-1 0,-2 0 1,-1 0-1,-13 24-535,3-16 657,14-24-1232,0 0 1,1 1-1,-3 6 575,9-17-187,0-1 1,0 0 0,0 0-1,0 0 1,0 1-1,0-1 1,0 0-1,-1 0 1,1 1-1,0-1 1,0 0-1,0 0 1,0 1-1,1-1 1,-1 0-1,0 0 1,0 0-1,0 1 1,0-1-1,0 0 1,0 0-1,0 0 1,0 1-1,0-1 1,0 0-1,1 0 1,-1 0-1,0 1 1,0-1-1,0 0 1,1 0 186</inkml:trace>
-  <inkml:trace contextRef="#ctx0" brushRef="#br0" timeOffset="10512.562">3226 1969 5312,'2'-6'289,"-1"0"1,1 0-1,0 0 1,1 1-1,-1-1 1,1 1-1,0-1 0,0 1 1,1 0-1,0 0 1,2-2-290,-6 6 6,0 1 1,0 0-1,1 0 0,-1 0 1,0 0-1,0 0 0,0-1 1,0 1-1,0 0 1,1 0-1,-1 0 0,0 0 1,0 0-1,0 0 0,0 0 1,0 0-1,1 0 1,-1 0-1,0-1 0,0 1 1,0 0-1,1 0 1,-1 0-1,0 0 0,0 0 1,0 0-1,1 0 0,-1 0 1,0 0-1,0 1 1,0-1-1,0 0 0,1 0 1,-1 0-1,0 0 1,0 0-1,0 0 0,0 0 1,1 0-1,-1 0 0,0 0 1,0 1-1,0-1 1,0 0-7,4 11 152,-3 15-121,-10 46-539,3-37-115,1 17 623,4-39-146,0 3 339,1-1 1,1 11-194,-1-23 150,0 1 1,1-1 0,0 0 0,-1 1 0,1-1 0,0 0-1,0 0 1,1 0 0,-1 0 0,1 0 0,0 0-1,-1 0 1,1 0 0,2 1-151,-3-3 72,0 0 0,0 0 0,1 0 0,-1 0 0,0 0 0,1 0 0,-1 0 0,1-1 0,-1 1 0,1-1 0,-1 1 0,1-1 0,-1 1 0,1-1 0,0 0 0,-1 0 0,1 0 0,0 0 0,1 0-72,0 0 64,0-1 1,1 0-1,-1 0 1,1 0-1,-1 0 1,0-1-1,0 1 0,0-1 1,2 0-65,3-4 41,0 0 1,0-1 0,0 0-1,0 0 1,-1-1-1,0 0-41,1-3 172,0-1 0,0 0 0,-1-1 0,0 0 1,-1 0-1,-1-1 0,1-3-172,3-14 547,-1 0 0,2-21-547,-10 59-117,1-1-1,-1 1 1,1 0 0,0 0 0,1 0-1,-1-1 1,1 1 0,1 0 117,-2-3 63,1 1 0,-1-1 0,1 0 1,0 0-1,1 1 0,-1-1 1,1 0-1,0-1 0,0 1 0,0-1 1,0 1-1,0-1 0,1 0 0,0 0 1,2 2-64,-2-3 105,0 0 0,1-1 1,-1 1-1,0-1 0,1 0 1,-1 0-1,0 0 0,1-1 1,-1 1-1,1-1 0,-1 0 1,1-1-1,-1 1 0,3-1-105,-1-1 84,0 1-1,0-1 1,0-1-1,-1 1 1,1-1-1,-1 0 1,0 0-1,0-1 1,0 1 0,0-1-84,6-6 57,0-1 1,0-1 0,-1 0 0,-1 0 0,0 0 0,-1-1 0,0-1 0,-1 0-58,36-77-904,-17 29-3521,-22 52 3205,4-9-3580</inkml:trace>
-  <inkml:trace contextRef="#ctx0" brushRef="#br0" timeOffset="10967.119">4176 1873 6656,'-12'66'3264,"-7"19"-3264,-3-17-1252,-2-1 1,-30 54 1251,8-18-89,38-83 665,-2 5 731,-1-2-1,-3 4-1306,13-26 60,1 0-1,-1 0 1,1 0 0,-1-1-1,1 1 1,-1 0-1,0 0 1,0-1 0,1 1-1,-1 0 1,0-1-1,0 1 1,-1 0-60,2-1 29,0 0-1,-1 0 1,1 0-1,0 0 0,-1 0 1,1 1-1,0-1 1,-1 0-1,1 0 1,0-1-1,-1 1 1,1 0-1,-1 0 1,1 0-1,0 0 1,-1 0-1,1 0 0,0 0 1,-1 0-1,1-1 1,0 1-1,-1 0 1,1 0-1,0 0 1,0-1-29,-2 0 54,1-1 1,0 1-1,0 0 1,1-1 0,-1 1-1,0-1 1,0 0-1,1 1 1,-1-1-1,1 0 1,-1 1-1,1-1 1,0 0 0,0 0-55,-2-33 434,1 1 0,2-1 0,1 1 0,7-32-434,1 14 436,3 0 0,15-40-436,-17 62 21,1 0-1,2 1 1,1 0 0,1 1 0,15-18-21,-21 32-16,1 0-1,0 1 0,1 0 0,0 1 0,1 1 1,0 0-1,1 1 0,0 0 0,1 1 0,0 0 1,7-1 16,-19 8-36,0 1 0,0 0 0,1 0 0,-1 0 0,0 1 0,1-1 0,-1 1 0,0 0 0,1 0 0,-1 0 0,1 0 0,-1 1 0,0-1 0,1 1 0,-1 0 0,1 0 36,-2 0-9,-1 0-1,1-1 0,-1 1 0,1 0 0,-1 0 0,0 0 1,1 0-1,-1 1 0,0-1 0,0 0 0,0 1 0,0-1 1,0 0-1,0 1 0,0-1 0,0 1 0,-1 0 0,1-1 1,0 1-1,-1-1 0,0 1 0,1 0 0,-1 0 0,0-1 1,0 1-1,0 0 0,0-1 0,0 1 0,0 0 0,0 0 1,-1 1 9,-1 3 49,1 1 1,-2 0 0,1-1 0,-1 0-1,0 1 1,0-1 0,0 0 0,-1-1 0,0 1-1,0 0 1,-1-1 0,-4 5-50,-5 3-112,-1 0 0,0 0 0,-16 8 112,18-12-911,0-2 0,-1 1 0,0-2 0,0 0 0,-4 1 911,14-6-580,0 0 0,-1 0 0,1 0-1,0 0 1,-5 0 580,6-1-675,0-1-1,0 1 1,0-1-1,0 1 0,0-1 1,-2-1 675</inkml:trace>
-</inkml:ink>
-</file>
-
-<file path=ppt/ink/ink64.xml><?xml version="1.0" encoding="utf-8"?>
-<inkml:ink xmlns:inkml="http://www.w3.org/2003/InkML">
-  <inkml:definitions>
-    <inkml:context xml:id="ctx0">
-      <inkml:inkSource xml:id="inkSrc0">
-        <inkml:traceFormat>
-          <inkml:channel name="X" type="integer" min="-2.14748E9" max="2.14748E9" units="cm"/>
-          <inkml:channel name="Y" type="integer" min="-2.14748E9" max="2.14748E9" units="cm"/>
-          <inkml:channel name="F" type="integer" max="32767" units="dev"/>
-        </inkml:traceFormat>
-        <inkml:channelProperties>
-          <inkml:channelProperty channel="X" name="resolution" value="1000" units="1/cm"/>
-          <inkml:channelProperty channel="Y" name="resolution" value="1000" units="1/cm"/>
-          <inkml:channelProperty channel="F" name="resolution" value="0" units="1/dev"/>
-        </inkml:channelProperties>
-      </inkml:inkSource>
-      <inkml:timestamp xml:id="ts0" timeString="2019-06-01T06:32:55.499"/>
-    </inkml:context>
-    <inkml:brush xml:id="br0">
-      <inkml:brushProperty name="width" value="0.05" units="cm"/>
-      <inkml:brushProperty name="height" value="0.05" units="cm"/>
-    </inkml:brush>
-  </inkml:definitions>
-  <inkml:trace contextRef="#ctx0" brushRef="#br0">73 4027 1312,'-42'38'421,"39"-35"-392,0 0-1,0 1 0,1-1 1,-1 0-1,1 1 0,0-1 1,0 1-1,0 0 0,0 0 1,1 0-1,-1 0 0,1 0 1,0 0-1,0 0 1,1 0-1,-1 0 0,1 1 1,0-1-1,0 2-28,0-2 76,1 1-1,-1-1 1,1 1 0,0-1-1,0 1 1,0-1 0,0 1-1,1-1 1,0 0 0,0 0-1,0 0 1,0 0 0,2 2-76,1-1 94,-1 0 0,0 0 0,1 0 0,0-1 0,0 1 0,1-2 0,-1 1 0,6 3-94,1-1 130,-1-1 0,1 0 0,0-1 0,1 0 0,-1-1 0,0-1 0,1 0 0,0 0 1,5-1-131,0-1 173,0-2 1,0 0-1,0 0 1,-1-2-1,1 0 1,-1-1-1,0-1 1,0-1-1,0 0 1,3-3-174,25-15 578,0-1-1,36-31-577,-13 6 372,-2-3 0,-3-3 0,-2-2 0,26-36-372,-51 52 76,-3-1 0,-1-2 0,-3-1 1,-1-2-1,-3 0 0,-2-2 0,7-24-76,26-121 167,-38 123 434,4 1-1,2 0 0,5 0-600,-25 62 140,1 0-1,1 0 0,-1 1 0,2-1 0,0 1-139,-4 5 62,1 0 1,0 0-1,0 0 0,1 0 0,-1 1 0,1 0 0,0 0 0,0 0 0,0 0 1,4-1-63,14-3 50,0 1 0,1 1 0,0 1 1,0 1-1,0 1 0,4 1-50,52-6-227,-32 0-717,0-1 0,44-15 944,-76 18-454,1 0-1,-1-2 1,-1 0 0,0-1-1,0 0 1,0-1 0,-1-1-1,0 0 1,-1-1-1,2-3 455,4-6-1909,-1-2 0,1-3 1909</inkml:trace>
-  <inkml:trace contextRef="#ctx0" brushRef="#br0" timeOffset="1109.271">590 3824 1984,'11'-17'291,"1"1"-1,1 1 1,0 0 0,5-4-291,81-78 2106,-58 58-1628,-2-2-1,-2-1 0,-2-2 1,18-30-478,112-201 1034,-43 43-865,-9-5 0,-11-4 0,33-136-169,-100 260-3,2-41 3,16-119-16,5-22-24,-44 236-8,3 1 0,6-9 48,-13 46-34,0 0 1,2 1-1,1 1 0,0-1 0,2 2 0,10-11 34,-2 6-18,1 2-1,2 0 0,0 2 0,3 0 19,119-83 256,-73 55-127,190-147-444,-218 159-766,-2-3-1,-1-1 1,-3-2 0,15-24 1081,-23 21-2287,2-7 2287,-35 55-1</inkml:trace>
-</inkml:ink>
-</file>
-
-<file path=ppt/ink/ink65.xml><?xml version="1.0" encoding="utf-8"?>
+<file path=ppt/ink/ink53.xml><?xml version="1.0" encoding="utf-8"?>
 <inkml:ink xmlns:inkml="http://www.w3.org/2003/InkML">
   <inkml:definitions>
     <inkml:context xml:id="ctx0">
@@ -2101,16 +1683,16 @@
   <inkml:trace contextRef="#ctx0" brushRef="#br0">0 1011 1664,'3'-2'115,"-1"1"0,1 0 1,-1 1-1,1-1 0,-1 0 0,1 1 0,-1-1 1,1 1-1,-1 0 0,1 0 0,0 0 0,-1 0 1,1 0-1,1 1-115,15-1 510,335-44 5178,-212 24-4219,50-7-692,362-42-1592,-492 62-3633,-62 7 1030</inkml:trace>
   <inkml:trace contextRef="#ctx0" brushRef="#br0" timeOffset="1480.746">1234 370 3968,'10'17'381,"-1"0"0,-1 1 0,-1 0 0,0 0 0,0 4-381,0-1 111,0 2-118,-1-1 0,-2 1 0,0 0 0,1 23 7,-4-36-20,8 116-529,-5 1 1,-12 99 548,-39 254-1050,9-127 1384,23-160 3423,8 129-3757,10-243 590,3 1 0,4-1 1,4-1-1,3 0 1,13 35-591,-21-84-51,-5-14-16,1 0-1,0 0 1,1-1-1,0 0 1,1 0 0,0-1-1,4 4 68,-10-16 24,0 0-1,0 0 1,0 0 0,0 0-1,0-1 1,0 1-1,0 0 1,0-1 0,0 1-1,0-1 1,1 1 0,-1-1-1,0 1 1,0-1-1,1 0 1,-1 0 0,0 1-1,1-1 1,-1 0 0,0 0-1,1 0 1,-1-1-1,0 1 1,1 0-24,4-2 131,1 1-1,-1-1 1,0 0-1,4-2-130,2-1 170,37-13 155,20-7-144,1 3 1,30-4-182,465-63 120,8 30 25,-471 49-74,1077-79 1912,3 29 1335,340 22-1372,-1171 39-1743,-36 6-107,-44 3-107,-42-2-239,-199-7 56,176 2-844,-129-5-1783,48-9 2821,-108 10-580,0-2 1,0 0 0,-1-1 0,1 0 0,-1-2 0,0 0 0,2-1 579,-11 3-390,0-1-1,0 0 0,-1 1 1,2-4 390</inkml:trace>
   <inkml:trace contextRef="#ctx0" brushRef="#br0" timeOffset="2308.865">1722 565 2560,'-8'-6'457,"-2"-3"645,11 5-496,9 0-30,31-4 1319,11 0-1895,-7 1 564,376-51 2006,-211 28-1647,1513-176 3514,405 32-1431,-1702 141-2193,-373 28-745,130-6 421,-137 10-304,1 2 1,39 7-186,-76-7-18,0 1 1,-1 0 0,1 0-1,-1 1 1,0 1 0,0-1-1,5 4 18,-8-4-34,-1 1 0,0 0-1,1 0 1,-2 0 0,1 1-1,0-1 1,-1 1 0,0 0-1,0 1 1,0-1 0,-1 1-1,1 0 35,3 8-92,0 1 0,-1 1 0,-1-1 0,0 1 1,-1 0-1,0 0 0,-2 1 92,5 37-393,-2 30 393,-4-63-73,7 192-263,6 112 323,-3-189 442,13 48-429,3-41 1156,45 136-1156,-38-174 441,6-1-1,45 86-440,-55-131-464,32 46 464,-50-87-445,1 0 0,1-1 0,0-1 0,1 0 0,1-1 1,0 0-1,12 7 445,-19-17-526,1 0 0,-1 0 0,0-1 0,1 0 0,0-1 0,0 0 0,0-1 0,9 1 526,18 2-1701</inkml:trace>
-  <inkml:trace contextRef="#ctx0" brushRef="#br0" timeOffset="4308.877">1989 899 2240,'0'0'41,"0"-1"0,1 1 0,-1 0 0,0-1-1,0 1 1,0 0 0,1 0 0,-1-1 0,0 1 0,0 0 0,0-1 0,0 1 0,0 0-1,0-1 1,0 1 0,0 0 0,0-1 0,0 1 0,0 0 0,0-1 0,0 1 0,0 0-1,0-1 1,0 1 0,0 0 0,0-1 0,-1 1 0,1 0 0,0 0 0,0-1 0,0 1 0,0 0-1,-1-1 1,1 1 0,0 0 0,0 0 0,-1 0 0,1-1 0,0 1 0,0 0 0,-1 0-1,1 0 1,0-1 0,-1 1 0,1 0-41,-20-10 627,12 6-75,2 1-356,-1 0 1,1 0 0,-1 1-1,0 0 1,0 0 0,0 0 0,1 1-1,-2 0 1,1 0 0,0 1 0,0 0-1,-5 1-196,4 0 17,-1 1 0,1 0 0,-1 0-1,1 1 1,0 0 0,0 1-1,0-1 1,0 2 0,1-1-1,-4 3-16,-19 16-81,0 2 0,2 0 0,1 2 0,1 1 0,-20 27 81,32-35-115,-1 1 0,2 0 0,1 0-1,1 2 1,0 0 115,6-10 62,0 0-1,1 0 1,0 0 0,1 0-1,1 1 1,0-1 0,1 1-1,0-1 1,1 13-62,1-21 40,-1-1 0,1 1 0,0 0 0,0-1 0,0 1 0,1-1 0,0 0 0,0 1 0,0-1 0,0 0 0,0 0 0,1 0 0,0-1 0,3 4-40,-4-4 49,1-1 0,0 0-1,-1 0 1,1 0 0,0 0 0,0-1-1,0 1 1,0-1 0,1 0 0,-1 0 0,0 0-1,0 0 1,1 0 0,-1-1 0,1 1 0,-1-1-1,0 0 1,1 0 0,-1-1 0,4 1-49,-1-2 162,0 1-1,0-1 1,0 0 0,-1 0 0,1-1 0,0 0 0,-1 0-1,0 0 1,1-1 0,-2 1 0,1-1 0,0-1 0,-1 1-1,1 0 1,-1-1 0,0 0 0,-1 0 0,1 0 0,-1-1-1,0 1 1,-1-1 0,1 0 0,-1 1 0,0-1 0,0 0-1,-1 0 1,0-1 0,0 1 0,0-3-162,-1 9 8,0-1 0,0 1 0,-1 0 0,1 0 0,0 0 1,0-1-1,0 1 0,0 0 0,0 0 0,0-1 0,0 1 0,0 0 0,0 0 0,0 0 0,0-1 1,1 1-1,-1 0 0,0 0 0,0 0 0,0-1 0,0 1 0,0 0 0,0 0 0,0 0 0,0-1 1,1 1-1,-1 0 0,0 0 0,0 0 0,0 0 0,0 0 0,1-1 0,-1 1 0,0 0 0,0 0 1,0 0-1,1 0 0,-1 0 0,0 0 0,0 0 0,0 0 0,1 0 0,-1 0 0,0 0 0,0 0 1,0 0-1,1 0 0,-1 0 0,0 0-8,11 6-11,-5-2 105,-2-3-182,0 0-1,0 0 1,0 0-1,0-1 1,0 0 0,0 0-1,0 0 1,0 0 0,-1 0-1,1-1 1,0 0 0,0 0-1,0 0 1,0 0 0,-1 0-1,1-1 1,0 0 0,-1 0 88,11-5-1460,-1-1 1,0-1 0,11-8 1459,-6 1-2245</inkml:trace>
-  <inkml:trace contextRef="#ctx0" brushRef="#br0" timeOffset="4961.903">2076 1137 3712,'-20'47'1752,"8"-16"-3605,-2 14 1853,8-22-675,1 0 0,0 8 675,2 20 2646,4-39-680,-1-11-1922,0-1 1,1 0-1,-1 0 1,0 0-1,0 0 1,0 0-1,0 0 1,0 0-1,0 0 1,0 0-1,0 0 1,0 0-1,1 0 0,-1 0 1,0 0-1,0 0 1,0 0-1,0 0 1,0 0-1,0 0 1,0 0-1,0 0 1,0 0-1,1 0 1,-1 0-1,0 0 0,0 0 1,0 0-1,0 0 1,0 0-1,0 0 1,0 0-1,0-1 1,0 1-1,0 0 1,0 0-1,1 0 1,-1 0-1,0 0 1,0 0-1,0 0 0,0 0 1,0 0-1,0 0 1,0-1-1,0 1 1,0 0-1,0 0 1,0 0-1,0 0 1,0 0-1,0 0-44,8-22 2308,-1-12-382,13-32-1926,-16 54-3,1 0 0,1 0-1,0 1 1,0 0 0,1 0 0,1 0 0,0 1 3,26-28-3632,4-1 3632,2-2-6800,-30 32 4955</inkml:trace>
+  <inkml:trace contextRef="#ctx0" brushRef="#br0" timeOffset="4308.876">1989 899 2240,'0'0'41,"0"-1"0,1 1 0,-1 0 0,0-1-1,0 1 1,0 0 0,1 0 0,-1-1 0,0 1 0,0 0 0,0-1 0,0 1 0,0 0-1,0-1 1,0 1 0,0 0 0,0-1 0,0 1 0,0 0 0,0-1 0,0 1 0,0 0-1,0-1 1,0 1 0,0 0 0,0-1 0,-1 1 0,1 0 0,0 0 0,0-1 0,0 1 0,0 0-1,-1-1 1,1 1 0,0 0 0,0 0 0,-1 0 0,1-1 0,0 1 0,0 0 0,-1 0-1,1 0 1,0-1 0,-1 1 0,1 0-41,-20-10 627,12 6-75,2 1-356,-1 0 1,1 0 0,-1 1-1,0 0 1,0 0 0,0 0 0,1 1-1,-2 0 1,1 0 0,0 1 0,0 0-1,-5 1-196,4 0 17,-1 1 0,1 0 0,-1 0-1,1 1 1,0 0 0,0 1-1,0-1 1,0 2 0,1-1-1,-4 3-16,-19 16-81,0 2 0,2 0 0,1 2 0,1 1 0,-20 27 81,32-35-115,-1 1 0,2 0 0,1 0-1,1 2 1,0 0 115,6-10 62,0 0-1,1 0 1,0 0 0,1 0-1,1 1 1,0-1 0,1 1-1,0-1 1,1 13-62,1-21 40,-1-1 0,1 1 0,0 0 0,0-1 0,0 1 0,1-1 0,0 0 0,0 1 0,0-1 0,0 0 0,0 0 0,1 0 0,0-1 0,3 4-40,-4-4 49,1-1 0,0 0-1,-1 0 1,1 0 0,0 0 0,0-1-1,0 1 1,0-1 0,1 0 0,-1 0 0,0 0-1,0 0 1,1 0 0,-1-1 0,1 1 0,-1-1-1,0 0 1,1 0 0,-1-1 0,4 1-49,-1-2 162,0 1-1,0-1 1,0 0 0,-1 0 0,1-1 0,0 0 0,-1 0-1,0 0 1,1-1 0,-2 1 0,1-1 0,0-1 0,-1 1-1,1 0 1,-1-1 0,0 0 0,-1 0 0,1 0 0,-1-1-1,0 1 1,-1-1 0,1 0 0,-1 1 0,0-1 0,0 0-1,-1 0 1,0-1 0,0 1 0,0-3-162,-1 9 8,0-1 0,0 1 0,-1 0 0,1 0 0,0 0 1,0-1-1,0 1 0,0 0 0,0 0 0,0-1 0,0 1 0,0 0 0,0 0 0,0 0 0,0-1 1,1 1-1,-1 0 0,0 0 0,0 0 0,0-1 0,0 1 0,0 0 0,0 0 0,0 0 0,0-1 1,1 1-1,-1 0 0,0 0 0,0 0 0,0 0 0,0 0 0,1-1 0,-1 1 0,0 0 0,0 0 1,0 0-1,1 0 0,-1 0 0,0 0 0,0 0 0,0 0 0,1 0 0,-1 0 0,0 0 0,0 0 1,0 0-1,1 0 0,-1 0 0,0 0-8,11 6-11,-5-2 105,-2-3-182,0 0-1,0 0 1,0 0-1,0-1 1,0 0 0,0 0-1,0 0 1,0 0 0,-1 0-1,1-1 1,0 0 0,0 0-1,0 0 1,0 0 0,-1 0-1,1-1 1,0 0 0,-1 0 88,11-5-1460,-1-1 1,0-1 0,11-8 1459,-6 1-2245</inkml:trace>
+  <inkml:trace contextRef="#ctx0" brushRef="#br0" timeOffset="4961.902">2076 1137 3712,'-20'47'1752,"8"-16"-3605,-2 14 1853,8-22-675,1 0 0,0 8 675,2 20 2646,4-39-680,-1-11-1922,0-1 1,1 0-1,-1 0 1,0 0-1,0 0 1,0 0-1,0 0 1,0 0-1,0 0 1,0 0-1,0 0 1,0 0-1,1 0 0,-1 0 1,0 0-1,0 0 1,0 0-1,0 0 1,0 0-1,0 0 1,0 0-1,0 0 1,0 0-1,1 0 1,-1 0-1,0 0 0,0 0 1,0 0-1,0 0 1,0 0-1,0 0 1,0 0-1,0-1 1,0 1-1,0 0 1,0 0-1,1 0 1,-1 0-1,0 0 1,0 0-1,0 0 0,0 0 1,0 0-1,0 0 1,0-1-1,0 1 1,0 0-1,0 0 1,0 0-1,0 0 1,0 0-1,0 0-44,8-22 2308,-1-12-382,13-32-1926,-16 54-3,1 0 0,1 0-1,0 1 1,0 0 0,1 0 0,1 0 0,0 1 3,26-28-3632,4-1 3632,2-2-6800,-30 32 4955</inkml:trace>
   <inkml:trace contextRef="#ctx0" brushRef="#br0" timeOffset="5524.432">2516 1121 3904,'-1'-1'70,"-1"0"1,1-1-1,0 1 0,-1 0 0,1 1 1,0-1-1,-1 0 0,0 0 1,1 1-1,-1-1 0,1 1 1,-1-1-1,0 1 0,1-1 1,-1 1-1,0 0 0,1 0 1,-1 0-1,0 0 0,1 0 1,-1 1-1,0-1 0,1 0 1,-1 1-1,0-1 0,-1 1-70,-7 3-222,1-1 0,-1 1 0,-7 6 222,15-10 22,-8 6-75,0 0 0,0 0 1,0 1-1,1 1 0,0-1 0,0 2 0,-3 4 53,7-8 1,1 1-1,0-1 1,0 1 0,0 0-1,1 0 1,0 1-1,0-1 1,1 1-1,0-1 1,0 1-1,0 0 1,1 0-1,0 3 0,0-8 32,1 0 1,0 0-1,0 0 0,0 0 0,0 1 1,1-1-1,-1 0 0,0 0 0,1 0 0,-1 0 1,1 0-1,0 0 0,0 0 0,0 0 0,0 0 1,0 0-1,0 0 0,1 0 0,-1-1 1,0 1-1,1-1 0,0 1 0,-1-1 0,2 1-32,-1 0 56,0-1-1,1 0 0,-1 0 1,1 0-1,0 0 0,-1-1 1,1 1-1,-1-1 0,1 0 0,0 1 1,0-1-1,-1 0 0,1 0 1,0-1-1,-1 1 0,1-1 1,0 1-1,-1-1 0,2 0-55,6-3 327,0-1 1,0 1-1,-1-2 0,0 1 0,0-1 1,0-1-1,-1 0 0,1 0 0,-2 0 0,1-1 1,-1 0-1,0-1 0,-1 0 0,5-8-327,-11 17 9,0-1-1,0 1 0,0 0 1,0 0-1,1 0 0,-1 0 1,0-1-1,0 1 0,0 0 0,0 0 1,0 0-1,0 0 0,0 0 1,1-1-1,-1 1 0,0 0 1,0 0-1,0 0 0,0 0 1,1 0-1,-1 0 0,0 0 1,0 0-1,0 0 0,0-1 1,1 1-1,-1 0 0,0 0 0,0 0 1,0 0-1,1 0 0,-1 0 1,0 0-1,0 0 0,0 0 1,0 1-1,1-1 0,-1 0 1,0 0-1,0 0 0,0 0 1,0 0-1,1 0 0,-1 0 1,0 0-1,0 0 0,0 1 0,0-1 1,0 0-1,1 0 0,-1 0 1,0 0-1,0 0 0,0 1 1,0-1-1,0 0 0,0 0 1,0 0-1,0 0 0,0 1 1,0-1-1,0 0 0,1 0-8,3 13-44,-4-12 50,2 4-266,0 1 0,0-1 1,0 0-1,1 0 0,-1 0 0,1 0 1,0-1-1,1 1 0,-1-1 1,1 0-1,0 0 0,0 0 0,0 0 1,1-1-1,-1 1 0,1-1 1,0-1-1,0 1 0,0 0 0,0-1 1,0 0-1,0-1 0,1 1 1,-1-1-1,1 0 0,-1 0 0,1 0 1,-1-1-1,1 0 0,0 0 1,-1 0-1,1-1 0,3-1 260,17-5-1669</inkml:trace>
   <inkml:trace contextRef="#ctx0" brushRef="#br0" timeOffset="5993.143">2890 1106 5408,'-19'37'2417,"-5"11"-2417,5 0-1117,-11 39 1117,8-7-1780,-10 72 1780,29-134 97,-3 12 904,2-1-1,1 1 0,1 1-1000,2-21 170,0-8-137,-1 1-1,1-1 1,0 0-1,0 0 1,0 0-1,1 1 1,-1-1-1,0 0 1,1 0-1,0 0 0,-1 0 1,1 0-1,1 2-32,-2-4 0,0 1 0,0-1-1,0 0 1,0 0-1,1 0 1,-1 0 0,0 0-1,0 0 1,0 1-1,0-1 1,1 0-1,-1 0 1,0 0 0,0 0-1,0 0 1,0 0-1,1 0 1,-1 0 0,0 0-1,0 0 1,0 0-1,1 0 1,-1 0-1,0 0 1,0 0 0,0 0-1,1 0 1,-1 0-1,0 0 1,0 0 0,0 0-1,0 0 1,1 0-1,-1-1 1,0 1-1,0 0 1,0 0 0,0 0-1,1 0 1,-1 0-1,0 0 1,0-1 0,0 1-1,0 0 1,0 0-1,0 0 1,0 0 0,1-1-1,-1 1 1,0 0-1,0 0 1,0 0-1,0-1 1,0 1 0,0 0-1,0 0 1,0 0 0,5-15 39,-1-5 393,-2 0-1,0-1 1,-1 1-1,0-1 1,-2 0-432,2-51 1234,4 20-319,1 0 0,4-1-915,-4 25 45,1 0 1,2 0-1,1 1 0,6-12-45,-12 30-46,1 0 0,0 1-1,1-1 1,0 1 0,0 0 0,1 0 0,0 1-1,3-3 47,-8 8-61,1 0 0,-1 0 0,0 0-1,1 1 1,-1-1 0,1 1-1,0-1 1,0 1 0,0 0 0,-1 0-1,1 0 1,0 0 0,0 0 0,0 1-1,1 0 1,-1-1 0,0 1-1,0 0 1,0 1 0,0-1 0,0 0-1,0 1 1,0 0 0,0-1-1,0 1 1,0 0 0,-1 1 0,4 0 61,-4 0-94,1 0 1,0 0 0,-1 0-1,1 0 1,-1 1 0,0-1 0,0 1-1,0-1 1,0 1 0,0 0-1,-1 0 1,1 0 0,-1 0-1,0 0 1,0 0 0,0 0 0,0 0-1,0 1 1,-1-1 0,1 0-1,-1 0 1,0 1 0,0-1-1,-1 2 94,0 10-128,-1 1 0,0 0 0,-1-1 0,-4 10 128,2-7-64,4-14-134,0-1 0,1 1 1,-1-1-1,1 1 1,0-1-1,-1 1 0,2 0 1,-1 1 197,0-4-127,0-1-1,0 1 1,0-1 0,1 1 0,-1-1 0,0 1 0,0-1-1,1 1 1,-1-1 0,0 1 0,1-1 0,-1 0 0,0 1-1,1-1 1,-1 1 0,1-1 0,-1 0 0,0 1 0,1-1-1,-1 0 1,1 0 0,-1 1 127,2-1-192,-1 0 1,0 0-1,0 0 1,0 1-1,0-1 0,1 0 1,-1-1-1,0 1 1,0 0-1,0 0 0,0 0 1,0-1-1,1 1 1,-1-1 191,23-9-1435</inkml:trace>
   <inkml:trace contextRef="#ctx0" brushRef="#br0" timeOffset="6399.374">3223 768 6560,'1'-9'579,"-1"4"-225,0 1-1,1-1 1,0 0-1,0 0 1,0 0 0,1 1-1,-1-1 1,3-3-354,-4 8 13,0 0-1,0 0 1,0 0 0,0 0 0,0 0 0,0 0 0,0 0 0,0 1 0,0-1-1,0 0 1,0 0 0,0 0 0,0 0 0,0 0 0,0 0 0,0 0 0,0 0 0,0 1-1,0-1 1,0 0 0,0 0 0,0 0 0,0 0 0,0 0 0,0 0 0,0 0-1,0 0 1,0 0 0,1 1 0,-1-1 0,0 0 0,0 0 0,0 0 0,0 0-1,0 0 1,0 0 0,0 0 0,0 0 0,0 0 0,0 0 0,1 0 0,-1 0-1,0 0 1,0 0 0,0 0 0,0 0 0,0 0 0,0 0 0,0 0 0,0 0 0,1 0-1,-1 0 1,0 0 0,0 0 0,0 0 0,0 0 0,0 0 0,0 0 0,0 0-1,0 0 1,0 0 0,1 0 0,-1 0 0,0 0 0,0-1 0,0 1 0,0 0-1,0 0 1,0 0 0,0 0-13,2 9-87,-2-8 115,1 17-183,0 0 0,-1-1-1,-1 1 1,0 0-1,-2 0 1,0 0-1,-2 4 156,-12 37-534,-12 27 534,8-24-20,20-61 22,-26 89 609,23-74-171,1 0 0,0 1 0,1-1 0,0 9-440,2-23 22,0-1-1,0 0 1,0 0 0,0 0-1,0 0 1,0 1 0,0-1-1,0 0 1,0 0 0,1 0-1,-1 0 1,0 0 0,1 1-1,-1-1 1,1 0 0,-1 0-1,1 0 1,0 0 0,-1 0-1,1 0 1,0-1 0,0 1-1,0 0 1,0 0 0,-1 0-1,1-1 1,0 1 0,0-1-1,0 1 1,1 0 0,-1-1-1,0 0 1,0 1 0,0-1-1,0 0 1,0 1 0,0-1-1,1 0 1,-1 0 0,0 0-1,0 0 1,0 0 0,0 0-1,1-1 1,-1 1-22,6-1-76,1-1-1,-1 0 1,0-1 0,0 1 0,0-1-1,2-2 77,23-11 79,1 2 1,8-1-80,-30 11 72,0 1 0,0 1 0,1-1 0,-1 2 1,1 0-1,-1 0 0,1 1 0,10 1-72,-19-1 0,0 1 0,0-1 0,0 1 0,0 0 0,1 0 0,-1 0-1,0 0 1,-1 1 0,1-1 0,0 1 0,0 0 0,-1 0 0,1 0 0,-1 0-1,1 0 1,1 3 0,1 2-318,0 0-1,0 0 1,-1 1-1,0 0 1,1 4 318,-4-9-335,0 0 1,0 0 0,0 0 0,1-1-1,-1 1 1,1 0 0,0-1-1,0 0 1,0 1 0,0-1 0,0 0-1,0 0 1,1 0 0,-1 0-1,1-1 1,-1 1 0,1 0 0,0-1-1,-1 0 1,1 0 0,0 0-1,0 0 1,0 0 0,0 0 0,2-1 334,27 1-1723</inkml:trace>
   <inkml:trace contextRef="#ctx0" brushRef="#br0" timeOffset="8727.569">3745 726 3232,'5'-27'1035,"-1"17"-564,-3 10-458,-1 0 0,0 0 0,0 0-1,0 0 1,0 0 0,1 0 0,-1 0-1,0 0 1,0 0 0,0 0-1,0 0 1,1 0 0,-1 0 0,0 0-1,0 0 1,0 0 0,0 0 0,1 0-1,-1 0 1,0 1 0,0-1 0,0 0-1,0 0 1,0 0 0,1 0-1,-1 0 1,0 0 0,0 0 0,0 1-1,0-1 1,0 0 0,0 0 0,0 0-1,0 0-12,7 18 306,-5 2-422,0-1 0,-1 1 0,-1-1 0,-1 1 0,-1 3 116,-7 36-1131,-2 2 1131,4-24-214,-8 40 959,4 2 0,3-1-1,3 24-744,7-12 939,0 0-4613,-2-85 1967</inkml:trace>
-  <inkml:trace contextRef="#ctx0" brushRef="#br0" timeOffset="9071.465">3503 915 5824,'-13'-28'2144,"13"17"-1664,0-8-128,0 11 928,4-3-768,1-1 0,8-4-320,4 2-544,5-2 160,4 1-416,4-1 352,4 2-992,1-2 672,-5 4-1984,1 5 1440,-2 7-1376</inkml:trace>
+  <inkml:trace contextRef="#ctx0" brushRef="#br0" timeOffset="9071.464">3503 915 5824,'-13'-28'2144,"13"17"-1664,0-8-128,0 11 928,4-3-768,1-1 0,8-4-320,4 2-544,5-2 160,4 1-416,4-1 352,4 2-992,1-2 672,-5 4-1984,1 5 1440,-2 7-1376</inkml:trace>
   <inkml:trace contextRef="#ctx0" brushRef="#br0" timeOffset="9524.373">4012 1121 3136,'-5'1'171,"0"-1"0,-1 2-1,1-1 1,0 0 0,0 1 0,0 0 0,0 0 0,0 1-1,-2 1-170,-3 1 138,4-2-114,0 1 1,0 0 0,0 0 0,0 1 0,1-1-1,-1 1 1,1 0 0,1 1 0,-1-1 0,1 1-1,-1 1-24,3-5-41,0 1-1,0 0 0,1 0 0,-1 1 0,1-1 1,0 0-1,0 0 0,0 1 0,0-1 1,0 1-1,1-1 0,0 1 0,-1-1 1,1 1-1,0-1 0,1 1 0,-1-1 0,1 0 1,-1 1-1,1-1 0,0 1 0,1-1 1,-1 0 41,0-1-2,0 0 1,0 0 0,0 0-1,1 0 1,-1-1 0,1 1-1,-1-1 1,1 1 0,-1-1-1,1 1 1,0-1 0,0 0 0,0 0-1,0 0 1,-1 0 0,1 0-1,2 0 2,0 0 69,0 0-1,0 0 0,0-1 1,1 1-1,-1-1 0,0 0 1,1 0-1,-1-1 0,0 1-68,6-2 473,0 0 0,-1 0 0,1-1 0,-1 0 0,0-1 0,0 0 0,6-4-473,40-26 3846,-55 34-3828,1 0 1,-1 0-1,0 0 1,0 0 0,0 0-1,0 0 1,1 0-1,-1 0 1,0 0-1,0 0 1,0 0 0,0 0-1,0 0 1,1 1-1,-1-1 1,0 0 0,0 0-1,0 0 1,0 0-1,0 0 1,0 0 0,1 0-1,-1 0 1,0 0-1,0 1 1,0-1-1,0 0 1,0 0 0,0 0-1,0 0 1,0 0-1,0 0 1,0 1 0,1-1-1,-1 0 1,0 0-1,0 0 1,0 0-1,0 1 1,0-1 0,0 0-1,0 0 1,0 0-1,0 0 1,0 1-19,2 12 96,1 7-447,-1-17 176,-1 0 1,0 0-1,1-1 0,0 1 1,-1 0-1,1-1 0,0 0 0,0 1 1,0-1-1,1 0 0,-1 0 1,1 0-1,-1 0 0,1 0 1,-1-1-1,1 1 0,0-1 1,0 0-1,0 0 0,0 0 1,0 0-1,0 0 0,0-1 1,0 1-1,0-1 0,0 0 1,0 0-1,1 0 0,-1 0 0,0 0 1,0-1-1,2 0 175,8-2-874,0-1 1,0 0-1,0-1 1,-1 0-1,1-1 0,9-7 874,9-6-912,-1-1 459</inkml:trace>
   <inkml:trace contextRef="#ctx0" brushRef="#br0" timeOffset="9883.808">4396 1029 5632,'-8'-1'510,"0"-1"-1,0 1 1,0 0 0,0 1-1,0-1 1,0 2 0,0-1-1,-3 2-509,9-2-10,0 0 1,0 1-1,-1-1 0,1 1 0,0-1 0,0 1 0,0 0 0,0 0 0,-1 0 1,2 0-1,-1 1 0,0-1 0,0 0 0,0 1 0,0 0 0,1-1 0,-1 1 1,1 0-1,-1-1 0,1 1 0,0 0 0,0 0 0,0 0 0,0 0 0,0 1 1,0-1-1,0 0 0,1 0 0,-1 0 0,1 1 10,0 1-75,0 0-1,0 0 1,1 0-1,0 0 1,-1 0-1,1-1 1,1 1-1,-1 0 1,0-1-1,1 1 1,1 2 75,24 37-243,-24-38 239,15 21-7,-8-13 77,-1 0 1,-1 0 0,0 1 0,0 0-1,-2 0 1,1 1 0,-2 0-1,0 1-66,-1 6 222,-4-18-383,1 1 1,0 0 0,0 0-1,0 0 1,0-1 0,1 1 0,0 0-1,0-1 1,2 5 160,4-4-2197</inkml:trace>
-  <inkml:trace contextRef="#ctx0" brushRef="#br0" timeOffset="10211.867">4577 868 4480,'0'-1'148,"1"-20"1025,2 12-644,-3 9-519,0 0 0,0 0 0,0 0 0,0 0 0,0 0 0,0 0 0,0 0 0,0 0 0,1 0 0,-1-1 0,0 1 0,0 0 0,0 0 0,0 0 0,0 0 0,0 0 0,1 0 0,-1 0 0,0 0 0,0 0 0,0 0 0,0 0 0,0 0-1,1 0 1,-1 0 0,0 0 0,0 0 0,0 0 0,0 0 0,0 0 0,0 0 0,1 0 0,-1 1 0,0-1 0,0 0 0,0 0 0,0 0 0,0 0 0,0 0 0,0 0 0,0 0 0,0 0 0,1 0 0,-1 1 0,0-1 0,0 0-10,1 2 28,1 0 0,-1 0 0,0 0 0,0 0 0,0 0 0,0 1 0,0-1 0,0 0 0,-1 1 0,1-1 0,-1 0-1,0 1 1,0 0-28,3 9-16,0 10-151,0-1-1,-1 1 1,-1 0 0,-2 16 167,-11 91 562,2-41 1801,8-66-1570,0-14-122,1-12 526,0-77 304,2-68-48,1 114-1321,1 0-1,2 0 1,3-6-132,0 4 64,27-107-2282,-31 133 1108,-1 0 1,1 1 0,3-4 1109,2-3-3776</inkml:trace>
+  <inkml:trace contextRef="#ctx0" brushRef="#br0" timeOffset="10211.866">4577 868 4480,'0'-1'148,"1"-20"1025,2 12-644,-3 9-519,0 0 0,0 0 0,0 0 0,0 0 0,0 0 0,0 0 0,0 0 0,0 0 0,1 0 0,-1-1 0,0 1 0,0 0 0,0 0 0,0 0 0,0 0 0,0 0 0,1 0 0,-1 0 0,0 0 0,0 0 0,0 0 0,0 0 0,0 0-1,1 0 1,-1 0 0,0 0 0,0 0 0,0 0 0,0 0 0,0 0 0,0 0 0,1 0 0,-1 1 0,0-1 0,0 0 0,0 0 0,0 0 0,0 0 0,0 0 0,0 0 0,0 0 0,0 0 0,1 0 0,-1 1 0,0-1 0,0 0-10,1 2 28,1 0 0,-1 0 0,0 0 0,0 0 0,0 0 0,0 1 0,0-1 0,0 0 0,-1 1 0,1-1 0,-1 0-1,0 1 1,0 0-28,3 9-16,0 10-151,0-1-1,-1 1 1,-1 0 0,-2 16 167,-11 91 562,2-41 1801,8-66-1570,0-14-122,1-12 526,0-77 304,2-68-48,1 114-1321,1 0-1,2 0 1,3-6-132,0 4 64,27-107-2282,-31 133 1108,-1 0 1,1 1 0,3-4 1109,2-3-3776</inkml:trace>
   <inkml:trace contextRef="#ctx0" brushRef="#br0" timeOffset="10539.998">4835 915 4384,'0'49'1632,"5"-26"-1248,-1 12-128,0-9 1536,5 2-1024,9 2 544,8 1-768,9 4-864,8-5 128,-1-7-1504,10-4 928,1-12-1696,2-7 1408,-3-7-1184</inkml:trace>
   <inkml:trace contextRef="#ctx0" brushRef="#br0" timeOffset="11383.779">4526 987 7136,'21'-35'2656,"-8"12"-2080,13-19-160,-13 19-128,4-15-256,5-4-640,4-7 320,-6 2-800,2 5 608,0 0-256,-5 3 416,1 1-1696,-5 8 1088,-4 6-1472</inkml:trace>
   <inkml:trace contextRef="#ctx0" brushRef="#br0" timeOffset="12071.258">4509 1048 6560,'0'-19'2432,"0"19"-1888,13 5-160,-1 2-288,9 5-128,10 6 32,8-2 0,5 6-352,6 1 192,-2-4-640,4 5 448,4-1-1344,-8-4 960,-9 4 640,-6-12 64,-2-3 64,-5-4-64,-9 0-3072</inkml:trace>
@@ -2120,7 +1702,7 @@
 </inkml:ink>
 </file>
 
-<file path=ppt/ink/ink7.xml><?xml version="1.0" encoding="utf-8"?>
+<file path=ppt/ink/ink54.xml><?xml version="1.0" encoding="utf-8"?>
 <inkml:ink xmlns:inkml="http://www.w3.org/2003/InkML">
   <inkml:definitions>
     <inkml:context xml:id="ctx0">
@@ -2136,23 +1718,113 @@
           <inkml:channelProperty channel="F" name="resolution" value="0" units="1/dev"/>
         </inkml:channelProperties>
       </inkml:inkSource>
-      <inkml:timestamp xml:id="ts0" timeString="2019-06-01T06:28:00.526"/>
+      <inkml:timestamp xml:id="ts0" timeString="2019-06-10T13:45:06.634"/>
     </inkml:context>
     <inkml:brush xml:id="br0">
-      <inkml:brushProperty name="width" value="0.1" units="cm"/>
-      <inkml:brushProperty name="height" value="0.1" units="cm"/>
-      <inkml:brushProperty name="color" value="#AE198D"/>
-      <inkml:brushProperty name="inkEffects" value="galaxy"/>
-      <inkml:brushProperty name="anchorX" value="-7959.83398"/>
-      <inkml:brushProperty name="anchorY" value="-2299.22412"/>
-      <inkml:brushProperty name="scaleFactor" value="0.5"/>
+      <inkml:brushProperty name="width" value="0.05" units="cm"/>
+      <inkml:brushProperty name="height" value="0.05" units="cm"/>
     </inkml:brush>
   </inkml:definitions>
-  <inkml:trace contextRef="#ctx0" brushRef="#br0">2 401 4736,'0'0'0,"-2"-9"2144,3-3-2166,1 2 172,4 4-182,2 9-363,5 17 347,2 21-80,2 29 139,-1 32-1782,-4 37 1489,-4 31-2508,-4 23 7611,2 29-4607,3 7 2106,1-9-1771,1-22-309,-1-29-123,0-35-1109,-2-26 315,-2-29 624,-1-26 79,-1-21-47,-1-17 1072,-2-14-1047,-1-1 0,0 1 0,0-1 0,0 0 1,0 0-1,0 0 0,0 0 0,0 1 0,0-1 1,0 0-1,0 0 0,1 0 0,-1 0 0,0 0 0,0 1 1,0-1-1,0 0 0,0 0 0,0 0 0,1 0 0,-1 0 1,0 0-1,0 0 0,0 0 0,0 0 0,1 1 1,-1-1-1,0 0 0,0 0 0,0 0 0,1 0 0,-1 0 1,0 0-1,0 0 0,0 0 0,0 0 0,1-1-4,9-2 955,7-6-784,13-4 378,17-1-458,19-3 191,21-1-218,21-2-21,19-1 0,17-1-161,15 0 118,11-2-5,9-2 0,5-1 714,3-1-576,0-1 731,1 2-688,0 1-48,-3 3-106,-1 4 68,-6 3-74,-7 3 96,-10 1-101,-11 2 181,-13 0-165,-12 0-59,-16 1 16,-15-1 96,-16 0-70,-14-1-234,-14-3 182,-13-2-108,-32 13 141,-1 1-1,0-1 0,1-1 1,-2 1-1,3-2 10,-3 2 11,-1 1 0,0-1-1,0 0 1,0 0 0,0 0-1,0 0 1,0-1-11,-1 1 1,0-1 0,0 0 0,0 1-1,0-1 1,0 1 0,0-4-1,-2-27 262,-7-7-220,-10-19 785,-7-11-672,-8-12 5,-5-14 74,-3-12-164,0-10 452,1-11-394,3-7 507,5-4-518,5 1-213,5 7 91,5 8-400,3 11 362,3 13-906,0 15 821,1 16-1131,1 15 1035,1 12-736,1 14 779,1 8-369,3 9 460,1 4-44,1 5 140,1 2 127,-2 1-101,-4 2 267,-6 1-262,-9 2 198,-12 1-171,-14 1 309,-15 1-314,-16 0 138,-19 1-154,-17-1-38,-20 0 43,-18-2-395,-17-2 299,-18 0-218,-15-1 207,-16 0-133,-9 3 117,-5 4 939,3 4-714,9 5 79,16 5-122,19 4-2833,21 3 2289,24 1-6245,38-5 3178</inkml:trace>
+  <inkml:trace contextRef="#ctx0" brushRef="#br0">2 1477 3712,'-1'1'50,"1"-1"1,0 0-1,0 1 0,0-1 0,0 0 1,0 1-1,0-1 0,0 0 1,0 1-1,0-1 0,0 1 1,0-1-1,0 0 0,0 1 1,0-1-1,0 0 0,0 1 1,0-1-1,1 0 0,-1 1 1,0-1-1,0 0 0,0 1 0,1-1 1,-1 0-1,0 0 0,0 1 1,1-1-1,-1 0 0,0 0 1,0 1-1,1-1 0,-1 0 1,0 0-1,1 0 0,-1 1-50,1-2 9,0 1 0,0-1 0,0 1 0,0-1 0,-1 1 0,1-1 0,0 1 0,0-1 0,-1 0 0,1 1 0,-1-1 0,1 0 0,0 0-9,18-30-184,32-79 2666,14-28 1132,11 2-2344,30-59 1241,-76 137-2350,84-179 2834,-86 171-2405,-3-1 0,10-48-590,2-18 83,13-52-513,-49 176 323,-3 13 564,0 3-386,1-5-87,1-2 59,0 0-78,-1 0 16,0 1-1,1 0 1,-1 0 0,0 0-1,1-1 1,-1 1 0,1 0-1,-1 0 1,1 0 0,-1 0-1,1 0 1,0 0-1,-1 0 1,1 0 0,0 0 19,-8 38-350,1 0 0,2 0 1,1 5 349,0 5-295,-8 33 295,-16 28 83,-36 91-83,40-129-249,-40 101 220,49-135 48,-15 34-89,-5 1 70,-8 17 118,24-48-166,-77 183 1765,92-214-1593,-5 13-63,-2 1-1,-12 21-60,22-45-234,1-1-401,0 0-37,-8-12-1941,6 6 2040,0 0 1,1-1 0,0 1-1,0-1 1,0 1-1,1-1 1,0 1-1,0-3 573,0 7-151,3-46-4291</inkml:trace>
 </inkml:ink>
 </file>
 
-<file path=ppt/ink/ink8.xml><?xml version="1.0" encoding="utf-8"?>
+<file path=ppt/ink/ink55.xml><?xml version="1.0" encoding="utf-8"?>
+<inkml:ink xmlns:inkml="http://www.w3.org/2003/InkML">
+  <inkml:definitions>
+    <inkml:context xml:id="ctx0">
+      <inkml:inkSource xml:id="inkSrc0">
+        <inkml:traceFormat>
+          <inkml:channel name="X" type="integer" min="-2.14748E9" max="2.14748E9" units="cm"/>
+          <inkml:channel name="Y" type="integer" min="-2.14748E9" max="2.14748E9" units="cm"/>
+          <inkml:channel name="F" type="integer" max="32767" units="dev"/>
+        </inkml:traceFormat>
+        <inkml:channelProperties>
+          <inkml:channelProperty channel="X" name="resolution" value="1000" units="1/cm"/>
+          <inkml:channelProperty channel="Y" name="resolution" value="1000" units="1/cm"/>
+          <inkml:channelProperty channel="F" name="resolution" value="0" units="1/dev"/>
+        </inkml:channelProperties>
+      </inkml:inkSource>
+      <inkml:timestamp xml:id="ts0" timeString="2019-06-10T13:45:14.084"/>
+    </inkml:context>
+    <inkml:brush xml:id="br0">
+      <inkml:brushProperty name="width" value="0.05" units="cm"/>
+      <inkml:brushProperty name="height" value="0.05" units="cm"/>
+    </inkml:brush>
+  </inkml:definitions>
+  <inkml:trace contextRef="#ctx0" brushRef="#br0">259 0 2496,'-30'5'650,"16"-3"-433,-1 0 0,1 1 0,-7 3-217,-118 38 2837,137-44-2763,1 1-1,-1-1 0,1 1 0,-1 0 0,1 0 0,0 0 1,-1 0-1,1 0 0,0 0 0,0 0 0,0 0 1,0 0-1,0 0 0,0 1 0,0-1 0,0 0 0,0 1 1,1-1-1,-1 1 0,0-1 0,1 1 0,-1-1 0,1 1 1,0-1-1,0 1 0,-1-1 0,1 1 0,0 0 0,0-1 1,0 1-1,1-1 0,-1 1 0,0 0 0,1-1 0,-1 1 1,1 0-74,2 6 225,0 0-1,0 0 1,1 0 0,0 0 0,0-1 0,2 2-225,14 19 511,1-1-1,1-1 1,2-1-1,0-1 1,1-1-1,2-1 1,0-1 0,24 12-511,47 25 2684,105 44-2684,-121-62 207,-29-14-179,240 108 797,3-27-147,-215-75-669,26 16-9,-44-19 78,1-2 0,42 10-78,42-1-93,20-3 93,29 6 61,-140-28-1,-7-1 51,28 11-111,68 20 149,-137-39-161,0 0 0,0-1 0,-1 1 0,1-2 0,0 1 0,0-1 0,0-1 1,0 0-1,0 0 12,11-3 34,-1 0 0,1-2 0,6-3-34,0 3 91,-20 5-58,-1 0 0,0 0 0,1-1 0,-1 0 0,1 0-33,-2 1 134,-4 1-128,0 0 1,1 0-1,-1 0 0,0 0 0,1 0 1,-1 0-1,0 0 0,1 0 1,-1 0-1,0 0 0,1 0 0,-1 0 1,1 0-1,-1 0 0,0 0 1,1 0-1,-1-1 0,0 1 0,1 0 1,-1 0-1,0 0 0,0-1 1,1 1-1,-1 0 0,0 0 0,0-1 1,1 1-1,-1 0 0,0-1 1,0 1-1,0 0 0,1-1 0,-1 1 1,0 0-1,0-1 0,0 1 1,0 0-1,0-1 0,0 1 0,0 0 1,0-1-1,0 1 0,0-1 1,0 1-1,0 0 0,0-1 0,0 1 1,0 0-1,0-1 0,0 1 1,0 0-1,-1-1 0,1 1 0,0 0 1,0-1-7,-3-3 16,0 0 1,0 1 0,0-1 0,0 1-1,-1 0 1,0 0 0,1 0 0,-1 0-1,0 1 1,0-1 0,0 1 0,-1 0-1,1 0 1,-1 1 0,-2-2-17,-12-2-143,0 1 0,0 1 0,-5 0 143,-1-1 92,-21-3-26,-185-31-774,156 22 611,1-3-1,-5-5 98,-235-90-267,153 60 253,78 28 39,-13-10-25,-26-12 85,-80-18-85,114 42 139,-1 4 0,-70-5-139,55 12 10,0-4 1,-6-7-11,89 19-253,2-1 1,-1-1-1,1-1 1,0-1-1,-9-5 253,19 8-539,0 0 0,0 0-1,0-1 1,1 0 0,0-1 0,1 1-1,0-1 1,0-1 0,1 1 0,0-1 0,-3-6 539,-22-51-2336</inkml:trace>
+</inkml:ink>
+</file>
+
+<file path=ppt/ink/ink56.xml><?xml version="1.0" encoding="utf-8"?>
+<inkml:ink xmlns:inkml="http://www.w3.org/2003/InkML">
+  <inkml:definitions>
+    <inkml:context xml:id="ctx0">
+      <inkml:inkSource xml:id="inkSrc0">
+        <inkml:traceFormat>
+          <inkml:channel name="X" type="integer" min="-2.14748E9" max="2.14748E9" units="cm"/>
+          <inkml:channel name="Y" type="integer" min="-2.14748E9" max="2.14748E9" units="cm"/>
+          <inkml:channel name="F" type="integer" max="32767" units="dev"/>
+        </inkml:traceFormat>
+        <inkml:channelProperties>
+          <inkml:channelProperty channel="X" name="resolution" value="1000" units="1/cm"/>
+          <inkml:channelProperty channel="Y" name="resolution" value="1000" units="1/cm"/>
+          <inkml:channelProperty channel="F" name="resolution" value="0" units="1/dev"/>
+        </inkml:channelProperties>
+      </inkml:inkSource>
+      <inkml:timestamp xml:id="ts0" timeString="2019-06-10T13:45:36.373"/>
+    </inkml:context>
+    <inkml:brush xml:id="br0">
+      <inkml:brushProperty name="width" value="0.05" units="cm"/>
+      <inkml:brushProperty name="height" value="0.05" units="cm"/>
+    </inkml:brush>
+  </inkml:definitions>
+  <inkml:trace contextRef="#ctx0" brushRef="#br0">69 0 8320,'-4'0'479,"-1"0"1,0 0-1,1 1 1,-1 0-1,0-1 1,1 1 0,-2 1-480,4-1 47,1 0 0,-1-1 1,1 1-1,-1 0 0,1 0 1,-1 0-1,1 1 0,0-1 1,-1 0-1,1 1 0,0-1 1,0 0-1,0 1 0,0-1 1,0 1-1,0 0 1,0-1-1,1 1 0,-1 0 1,0 1-48,-1 8-246,0-1 0,1 1 1,1 0-1,-1 0 0,2-1 0,-1 1 1,1 0-1,1 0 0,3 9 246,-3-6-247,17 77-1276,3 0 1523,13 50-701,5 76 884,0 93-183,-5 225 3940,-37-151-833,-20-2-1653,-2 93-1184,22-345-298,8 33 28,0-97 223,2-1 0,4 0-1,9 28-222,-13-67 205,0 0-1,2 0 0,1-1 1,1-1-1,1 1 0,1-2 0,1 0 1,2-1-1,3 3-204,-5-7 246,2-1 1,0-1-1,1-1 1,1 0 0,0-1-1,1-2 1,0 0-1,1 0 1,0-2-1,18 5-246,-5-3 211,1-3-1,0-1 0,0-1 1,1-2-1,21 0-210,34-2 234,54-7-234,77-11-65,108-3-1502,-250 16 65,3-4 1502,-53 3-1311,1-2-1,-1-1 1,1-2 0,5-2 1311,23-15-2394</inkml:trace>
+  <inkml:trace contextRef="#ctx0" brushRef="#br0" timeOffset="1279.779">2480 2716 6048,'51'363'3002,"-42"-261"-3402,-4 43 400,-9 93 1275,-11-1 0,-44 226-1275,31-295 1103,-26 170 1129,17 2-965,34-295-1226,2 1 0,2-1 0,2 1 0,7 36-41,-6-63 29,1 1 1,0-2-1,1 1 1,1 0-1,1-1 1,0-1-1,2 1 1,0-1-1,1-1 1,0 0-1,1 0 1,8 6-30,-5-8 48,0-1 1,1 0 0,0-1 0,1-1-1,1-1 1,-1 0 0,2-1 0,-1-1-1,1-1 1,4 1-49,28 6 205,0-2 1,1-2-1,22 0-205,80 5 429,48-5-429,160-9 163,-266-2-83,16 1-28,912 0-88,974 23 2276,-1215 9-1786,-489-4-838,185 46 384,-407-60-31,153 29 51,65-2-20,-251-38-80,39-2 80,-74-1-1,-1 0 0,0 0 0,1-1 0,-1 1 0,1-1 1,-1 0-1,0 0 0,0 0 0,1 0 0,-1 0 0,0-1 0,0 0 0,0 1 0,-1-1 0,2-1 1,-2 1 23,-1 0 1,0 0-1,1 0 0,-1 0 0,0 0 0,0 0 0,0 0 1,0 0-1,0 0 0,0-1 0,-1 1 0,1 0 0,-1-1 1,0 1-1,0 0 0,1-1 0,-1 1 0,-1-1 1,1 1-1,0 0 0,-1-1 0,0-1-23,-9-37 188,-2 1-1,-11-25-187,-15-47 494,15 14 60,3-1-1,-4-86-553,4-201 227,24-263 34,48-237-261,-38 743 33,8-111-460,-19 189 59,-4 1-1,-7-59 369,6 106-145,-2 0-1,0 0 0,0 0 0,-2 0 1,0 1-1,-1-2 146,2 8-146,0 0-1,-1 0 1,0 1-1,-1-1 1,1 1 0,-2 1-1,0-1 1,0 1-1,-7-6 147,7 9-47,-1 0 0,1 0-1,-1 1 1,0 0 0,0 1-1,0 0 1,0 0 0,-8-1 47,-16-2 490,-29-1-490,-57 0 49,-49 7-49,-12-1 133,-578-39 1019,480 23-1184,-710-6 549,215 51-78,-15 21 39,130 0-342,-229 14 27,167-47-2552,641-17 821,1-4 0,1-3 0,-9-6 1568,-26-14-2090,111 28 2079</inkml:trace>
+  <inkml:trace contextRef="#ctx0" brushRef="#br0" timeOffset="2624.147">3451 4782 8320,'19'-9'1311,"-11"5"-910,-1 1 0,0-1 0,0 0 0,-1 0 0,0-1 0,1 0-401,6-7 129,-1-1 1,0 0 0,-1-1-1,0-1 1,-1 0-1,-1 0 1,2-4-130,10-25-160,-3-1 0,-1-1 1,-2-1-1,1-10 160,35-196 118,-34 160-13,51-269-111,-66 350-342,1-1 0,0 1 0,1 0 0,2-4 348,-6 15-44,0 1-1,0-1 1,0 1-1,0-1 1,0 1-1,0-1 1,1 1-1,-1 0 1,0-1-1,0 1 1,1-1 0,-1 1-1,0 0 1,1-1-1,-1 1 1,0 0-1,1-1 1,-1 1-1,0 0 1,1 0-1,-1-1 1,1 1-1,-1 0 1,0 0-1,1 0 1,-1 0-1,1-1 1,-1 1-1,1 0 45,0 1-52,-1-1 0,1 1-1,0 0 1,-1-1-1,1 1 1,-1 0 0,1 0-1,-1-1 1,1 1 0,-1 0-1,1 0 1,-1 0-1,0 0 1,1-1 0,-1 1-1,0 0 53,7 22-409,-1 0 0,-2 1 0,0 1 409,6 27 166,-8-39-148,3 11 516,1 0 0,1 0 1,7 17-535,-10-34 199,-1 0 1,1 0-1,0 0 0,0-1 1,1 0-1,3 4-199,-6-7 82,1-1 0,0 1 0,1 0 1,-1-1-1,0 1 0,1-1 0,0 0 0,-1 0 0,1 0 0,0-1 1,0 0-1,1 1-82,-1-1 34,0-1 0,0 1 1,0-1-1,0 0 1,0 0-1,0 0 0,0 0 1,0-1-1,0 0 1,0 0-1,0 0 0,-1 0 1,1 0-1,0-1 1,0 0-1,-1 1 0,0-2 1,2 0-35,6-5 15,0 0-1,-1-1 1,-1 0 0,1-1 0,-1 0-15,20-25 13,-2 0-1,-1-2 1,0-5-13,19-37-22,-1-5 22,56-145 385,-54 117-151,-44 108-228,2-6 31,0-1-1,1 1 0,1 0 0,-1 0 0,2 0 1,4-5-37,-10 14 2,-1 0 1,1 1-1,-1-1 1,1 0 0,-1 1-1,1-1 1,0 1-1,-1-1 1,1 1-1,0-1 1,0 1 0,-1-1-1,1 1 1,0 0-1,0-1 1,0 1 0,0 0-1,-1 0 1,1 0-1,0-1 1,0 1-1,0 0 1,0 0 0,0 0-1,0 1-2,0-1-1,0 1 0,0 0 0,0 0 0,1 0 0,-1 0 0,0 0 0,0 0 0,0 0 0,-1 0 0,1 0 0,0 0 0,0 1 1,-1-1-1,1 0 0,-1 1 0,1-1 0,-1 0 1,8 22 28,-2-1 1,-1 1 0,-1 0 0,-1 0 0,0 5-29,12 154 1666,-8 1 1,-11 75-1667,1-142-1054,-7 106-5631,6-177 1827</inkml:trace>
+  <inkml:trace contextRef="#ctx0" brushRef="#br0" timeOffset="3015.649">5031 4457 6880,'10'8'595,"-6"-5"-438,-1 0 0,0-1 0,1 1 0,-1-1 0,1 1 1,0-1-1,0-1 0,0 1 0,0 0 0,0-1 0,0 0 0,1 0 1,-1 0-1,0 0 0,0-1 0,5 0-157,5 0 379,1-2 1,-1 0-1,1 0 1,-1-2-1,0 1 1,0-2-1,6-3-379,-1 1 542,-1-2-1,0-1 1,0 0-1,-1-1 1,-1-1 0,0 0-1,0-1 1,-1-1-1,8-10-541,-20 20 166,0 1-1,0-1 0,-1 0 0,1 0 0,-1 0 1,0-1-1,-1 1 0,1-1 0,-1 1 0,1-1 1,-1 1-1,0-2-165,-1 3 50,0 1 0,0-1 0,0 1-1,-1-1 1,1 1 0,0-1 0,-1 1 0,0-1 0,0 1 0,1-1 0,-1 1 0,-1 0 0,1 0 0,0-1 0,-1 1 0,1 0-1,-1 0 1,1 0 0,-1 1 0,0-1 0,0 0 0,0 1 0,-2-2-50,-7-4-120,0 0 1,-1 1-1,1 0 0,-2 1 1,1 1-1,0 0 0,-1 0 0,0 1 1,0 1-1,-12-1 120,-4 1-847,0 1-1,0 2 1,0 1 0,-13 3 847,-7 3-3934,-8 5 3934,-33 6-5074,83-18 4399,0 0 0,0 0 1,0-1-1,-6 0 675,11-1-260,0 1 1,1 0-1,-1-1 0,0 0 1,0 1-1,0-1 0,0 0 0,1 0 1,-1 0-1,-1-1 260</inkml:trace>
+  <inkml:trace contextRef="#ctx0" brushRef="#br0" timeOffset="3379.958">5785 3413 6880,'2'5'306,"0"0"1,0 0-1,-1 0 1,0 0-1,0 1 1,0-1-1,-1 0 1,0 1 0,0-1-1,0 0 1,-1 1-1,1-1 1,-2 4-307,-3 11 101,-1 0 0,-8 19-101,0-3-123,-7 27-305,-67 213-459,66-193 1475,3 0 0,0 34-588,17-105 125,0 1 1,1-1-1,1 0 0,0 1 1,1-1-1,2 10-125,-3-20-3,0-1 0,1 1 1,-1-1-1,0 0 0,1 1 0,-1-1 0,1 0 1,-1 1-1,1-1 0,0 0 0,-1 0 0,1 0 1,0 0-1,0 0 0,0 1 0,0-2 0,0 1 1,0 0-1,0 0 3,0 0-20,0-1 1,0 0-1,0 0 0,0 0 1,0 1-1,0-1 0,0 0 1,0 0-1,0 0 0,-1 0 1,1-1-1,0 1 0,0 0 1,0 0-1,0 0 0,0-1 1,0 1-1,-1-1 0,1 1 1,0 0-1,0-1 20,5-3-164,-1 0 0,0-1-1,0 1 1,-1-1 0,1 0-1,-1 0 1,2-4 164,25-36-1675,6-12 513</inkml:trace>
+  <inkml:trace contextRef="#ctx0" brushRef="#br0" timeOffset="3739.873">5952 4146 8640,'1'1'155,"-1"0"0,1 0 0,-1 0-1,1 0 1,0 0 0,-1 0 0,1 0 0,0-1 0,-1 1 0,1 0 0,0 0 0,0-1 0,0 1 0,0 0 0,0-1 0,0 1 0,0-1-1,0 1 1,0-1 0,0 0 0,0 1 0,0-1 0,0 0 0,0 0 0,1 0 0,-1 0 0,0 0 0,0 0 0,0 0 0,0 0 0,0 0-155,2-1 108,-1 0 1,0 0 0,0 0-1,0-1 1,0 1 0,0-1 0,0 1-1,0-1 1,-1 1 0,1-1 0,0 0-1,-1 0 1,0 0 0,2-2-109,10-17 364,-1-1 0,-1 0 0,5-16-364,22-71 306,-3 7-142,155-407-2041,5 35-5922,-173 424 6857,0-1-366,-3-1-1,-2-1 1,3-20 1308,-10 21-1120</inkml:trace>
+  <inkml:trace contextRef="#ctx0" brushRef="#br0" timeOffset="4090.156">6173 3509 8736,'48'123'3232,"-22"-55"-2528,16 44-192,-11-54 1408,12 3-1152,17-3-512,5-4-192,8-12-1952,-4-16 1024,-8-14-2432,-10-17 1856</inkml:trace>
+  <inkml:trace contextRef="#ctx0" brushRef="#br0" timeOffset="4760.064">6070 3221 7040,'-4'-20'2224,"-2"0"0,-6-17-2224,4 15 328,2 0 0,-2-11-328,3 11-91,2 0 0,1-1-1,1-3 92,1 18 24,0 0-1,0 0 0,1 0 0,1 0 0,-1 0 0,1 0 0,1 0 0,-1 1 0,1-1 0,4-5-23,2-2 908,-6 12 9,-4 9 154,-20 54-1158,4 1 1,2 0-1,1 13 87,-20 189 239,14-6 658,4-35-2706,15-209 1381,0 3-841,-1-1 0,-3 14 1269,-3-8-3258</inkml:trace>
+  <inkml:trace contextRef="#ctx0" brushRef="#br0" timeOffset="5620.086">5694 3700 6720,'1'-1'119,"-1"0"1,1 1-1,0-1 1,-1 0 0,1 0-1,-1 0 1,1-1-1,-1 1 1,0 0-1,1 0 1,-1 0-1,0 0 1,0 0-1,0 0 1,1-1-1,-1 1 1,-1 0 0,1 0-1,0 0 1,0 0-1,0 0 1,-1 0-1,1-1 1,0 1-1,-1 0 1,1 0-1,-1 0 1,1 0 0,-1 0-1,0 0 1,1 0-1,-1 1 1,0-1-1,0 0 1,1 0-1,-1 0 1,0 1-1,0-1 1,0 0 0,-1 1-120,0-2-29,0 1 0,-1 0 0,0 1 1,1-1-1,-1 0 0,1 1 0,-1-1 1,0 1-1,0 0 0,1 0 0,-1 0 1,0 0-1,1 1 0,-1-1 0,0 1 1,1-1-1,-3 2 29,-2 1-23,0 1 1,1 0-1,-1 0 1,1 0-1,0 1 1,0 0-1,0 0 1,1 0-1,0 1 1,0 0-1,0 0 1,1 0-1,0 0 1,0 1-1,0 0 1,0 1 22,-1 4 192,0 0 1,0 1 0,1 0 0,1-1 0,0 1 0,1 0 0,0 1 0,1-1 0,0 1-193,2-4 248,0 0-1,0 0 1,1 0-1,0 0 1,1-1-1,0 1 1,0-1-1,1 0 1,0 0-1,1 0 1,0 0 0,0-1-1,1 0 1,0 0-1,1-1 1,0 1-1,0-1 1,0-1-1,8 6-247,-9-7-203,0 0-1,1-1 1,0 0-1,0-1 1,0 0-1,0 0 1,0 0-1,0-1 1,1 0-1,-1 0 1,1-1-1,0 0 1,-1 0-1,1-1 1,0 0-1,0 0 1,-1-1-1,1 0 1,0 0-1,-1-1 1,1 0-1,-1 0 1,0-1-1,0 0 1,7-3 203,-7 2-452,0-1-1,0 0 1,0-1-1,0 1 1,-1-1-1,1-1 453,10-13-5002,10-15 5002</inkml:trace>
+</inkml:ink>
+</file>
+
+<file path=ppt/ink/ink57.xml><?xml version="1.0" encoding="utf-8"?>
+<inkml:ink xmlns:inkml="http://www.w3.org/2003/InkML">
+  <inkml:definitions>
+    <inkml:context xml:id="ctx0">
+      <inkml:inkSource xml:id="inkSrc0">
+        <inkml:traceFormat>
+          <inkml:channel name="X" type="integer" min="-2.14748E9" max="2.14748E9" units="cm"/>
+          <inkml:channel name="Y" type="integer" min="-2.14748E9" max="2.14748E9" units="cm"/>
+          <inkml:channel name="F" type="integer" max="32767" units="dev"/>
+        </inkml:traceFormat>
+        <inkml:channelProperties>
+          <inkml:channelProperty channel="X" name="resolution" value="1000" units="1/cm"/>
+          <inkml:channelProperty channel="Y" name="resolution" value="1000" units="1/cm"/>
+          <inkml:channelProperty channel="F" name="resolution" value="0" units="1/dev"/>
+        </inkml:channelProperties>
+      </inkml:inkSource>
+      <inkml:timestamp xml:id="ts0" timeString="2019-06-10T13:45:52.017"/>
+    </inkml:context>
+    <inkml:brush xml:id="br0">
+      <inkml:brushProperty name="width" value="0.05" units="cm"/>
+      <inkml:brushProperty name="height" value="0.05" units="cm"/>
+    </inkml:brush>
+  </inkml:definitions>
+  <inkml:trace contextRef="#ctx0" brushRef="#br0">578 0 2912,'0'1'68,"0"-1"-1,0 1 1,0-1 0,0 1 0,0-1-1,0 1 1,0-1 0,0 1-1,-1-1 1,1 1 0,0-1 0,0 1-1,-1-1 1,1 1 0,0-1-1,0 1 1,-1-1 0,1 1 0,-1-1-1,1 0 1,0 1 0,-1-1-1,1 0 1,-1 1 0,1-1 0,-1 0-1,1 1-67,-16 2 2078,1-1-992,13-1-795,0 0 1,-1-1-1,1 0 0,0 1 1,-1-1-1,1 0 1,0 0-1,-1 0 0,1-1 1,-2 1-292,-5-1 910,-1 1-188,-12-1-368,0 2 1,1 0-1,0 1 0,-1 1 0,1 1 1,-9 3-355,13-1-43,0 1 1,0 1-1,1 1 0,0 0 1,0 1-1,1 0 1,1 1-1,-1 1 1,-8 10 42,4-2-71,1 0-1,1 2 1,1 0 0,0 0-1,2 1 1,-2 8 71,6-11 85,2 0 0,0 1-1,2 1 1,0-1 0,1 1 0,1 0 0,1 0-1,2 0 1,0 0 0,1 2-85,1 3 128,1-1 0,1 1 0,1-1 0,2 0 0,0 0 0,2-1 0,1 0 0,3 5-128,-8-20-118,0-1-1,1 1 1,0-1 0,1 0-1,0 0 1,0-1 0,1 0-1,0 0 1,1 0 0,0-1 0,7 5 118,-13-10-164,0-1 0,0 0 0,0 0 0,1 0 0,-1 0 0,0 0 0,1-1 0,-1 1 0,1 0 0,-1-1 0,1 0 0,0 0 164,2 0-232,0-1 0,-1 0 0,1 0 0,0 0 0,0-1 0,0 1 232</inkml:trace>
+  <inkml:trace contextRef="#ctx0" brushRef="#br0" timeOffset="667.019">508 806 2240,'-1'7'141,"-1"1"-1,1-1 1,0 1-1,0 0 1,1 0 0,0-1-1,1 1-140,-1-3 197,1-1 0,0 0-1,0 0 1,1 0 0,-1-1 0,1 1-1,0 0 1,0 0 0,0-1 0,0 1-1,0-1 1,1 0 0,0 0-1,2 2-196,-1-1 316,0 0 0,1 0 0,0-1 0,0 1 0,0-1 0,0-1 0,0 1 0,1-1 0,-1 0 0,1 0 0,0 0 0,1 0-316,3-1 390,0 1 1,0-2-1,0 1 1,0-1 0,0-1-1,0 0 1,2 0-391,6-3 454,0 0-1,-1-1 1,1 0-1,-1-2 1,-1 0 0,1-1-1,-1 0 1,0-2-454,-8 5 166,0-1 0,0 0 0,0-1 1,-1 0-1,0 0 0,-1 0 0,1-1 0,-1 0 0,-1 0 1,0 0-1,4-7-166,-7 10 42,0 1-1,0-1 1,-1 0 0,1 1 0,-1-1 0,0 0-1,0 0 1,-1 0 0,1 0 0,-1 0 0,0 0-1,-1 0 1,1 0 0,-1 0 0,0 0 0,0 0-1,0 1 1,-1-1 0,0 0 0,0 1 0,0-1-1,0 1 1,-2-3-42,0 2-45,0 0 0,0 1 0,-1-1-1,1 1 1,-1 0 0,0 0 0,0 0 0,0 1-1,0 0 1,-1 0 0,0 0 0,1 0 0,-1 1-1,0 0 46,-9-2-303,-1 0 0,1 1 0,-1 1 0,-14-1 303,20 3-249,0 0 1,1 0-1,-1 1 1,0 1-1,1-1 1,-1 2-1,1-1 1,-1 1-1,1 1 1,-4 1 248,6-1-803,0 0 0,0 0 1,1 0-1,-1 1 0,1 0 1,0 0-1,1 0 0,-2 3 803,-3 3-3754</inkml:trace>
+  <inkml:trace contextRef="#ctx0" brushRef="#br0" timeOffset="1246.925">1164 598 5728,'3'-4'2166,"-2"2"-1421,0 9-403,-2 4-698,0 1 0,-1-1 1,-1 0-1,1 0 0,-3 4 356,-3 14-733,-1 5 574,-2 0 0,-2 1 159,-14 31 5315,36-74-2371,61-101-1274,-40 70-1468,1 2 0,31-28-202,-43 47-190,1 0 0,1 2 0,1 1 0,0 0 0,1 1 0,2 1 190,-15 8-146,-1 2 0,0-1 0,1 1 0,-1 1 0,1 0 1,0 0-1,0 0 0,-1 2 0,1-1 0,0 1 0,0 1 1,1 0 145,-3 0-94,1 0-1,-1 1 1,0 0 0,0 1 0,0 0 0,0 0 0,-1 1 0,1 0 0,-1 0 0,0 1 0,0 0 0,0 0 0,-1 0 0,4 5 94,0 1 20,-1 1-1,0 0 1,0 1-1,-1 0 1,-1 1-1,0 0 1,-1 0 0,0 0-1,-1 0 1,-1 1-1,2 9-19,-2-1 62,0 0-1,-2 0 1,0 0-1,-2 1 0,-1-1 1,0 0-1,-3 8-61,4-26-309,-1 1 0,0 0-1,-1-1 1,0 1 0,1-1-1,-2 1 1,1-1 0,-1 0-1,1 0 1,-2 0 309,4-4-62,0-1 0,0 0-1,-1 1 1,1-1 0,0 0 0,0 1-1,-1-1 1,1 0 0,0 0 0,0 1 0,-1-1-1,1 0 1,0 0 0,-1 0 0,1 0 0,-1 1-1,1-1 1,0 0 0,-1 0 0,1 0-1,0 0 1,-1 0 0,1 0 0,0 0 0,-1 0-1,1 0 1,-1 0 0,1 0 0,0 0-1,-1 0 1,1 0 0,0 0 0,-1-1 0,1 1-1,-1 0 1,1 0 62,-10-15-4101</inkml:trace>
+  <inkml:trace contextRef="#ctx0" brushRef="#br0" timeOffset="1796.724">2294 257 8128,'8'-3'1476,"-2"0"1428,-12 2-1514,-7 1-1515,0 2 1,-1-1-1,2 2 0,-1 0 0,-8 2 125,-62 26-1312,79-30 1264,-40 18-612,0 1-1,-2 4 661,28-14-170,0 1 0,1 1 0,1 1 0,0 0 0,0 1 0,1 2 170,12-14 11,1 1-1,0-1 1,0 1 0,1-1 0,-1 1-1,0 0 1,1-1 0,0 1-1,0 0 1,0 0 0,0 0-1,0 0 1,0 1 0,1-1-1,-1 0 1,1 0 0,0 0 0,0 0-1,0 0-10,1 1 22,0 0-1,0 0 0,0-1 0,0 1 1,0-1-1,1 1 0,0-1 1,-1 0-1,1 1 0,0-1 0,1 0 1,-1 0-1,1-1 0,-1 1 1,2 1-22,16 13 269,1-1 0,6 3-269,0 0 300,11 11-300,-31-23 97,0-1 1,0 1-1,-1 1 1,0-1-1,0 1 0,-1 0 1,1 2-98,-4-5 97,0-1 0,0 1 0,0 0 0,-1 0 0,1 0 1,-1 1-1,-1-1 0,1 0 0,-1 0 0,0 1 0,0-1 1,0 0-1,-1 0 0,1 1 0,-1-1 0,-1 0 0,0 2-97,-4 10 250,-1 0 0,-1 0-1,0-1 1,-5 6-250,6-10 118,-8 13-316,-1-1 1,-9 10 197,11-17-2117</inkml:trace>
+  <inkml:trace contextRef="#ctx0" brushRef="#br0" timeOffset="2366.666">2506 694 6816,'3'6'525,"1"0"0,1 0 0,-1 0 0,1 0 0,0-1 0,0 0 0,1 0 0,-1 0 0,5 2-525,-7-6 95,-1 0 1,0 0-1,0-1 1,0 1-1,1-1 1,-1 1 0,0-1-1,1 0 1,-1 0-1,0 0 1,1 0-1,-1 0 1,0 0-1,1-1 1,-1 1-1,0-1 1,0 0-1,0 0 1,1 0-1,-1 0 1,0 0-96,2-1-18,1 0 0,-1-1 0,0 0 0,0 0 0,0 0 1,-1 0-1,1 0 0,-1-1 0,2-2 18,-4 5 40,0-1-1,0 1 1,0-1-1,0 1 1,0-1-1,0 1 1,0-1-1,0 0 1,-1 0-1,1 1 1,-1-1-1,0 0 1,1 0-1,-1 0 1,0 1-1,0-1 1,0 0-1,0 0 1,0 0-1,0 0 1,-1 1-1,1-1 1,-1 0-1,1 0 1,-1 1 0,0-1-1,0 0-39,-1-1 136,0 0 0,0 0 1,-1 0-1,1 1 0,-1-1 0,0 1 0,1 0 1,-1 0-1,0 0 0,-1 0 0,1 0 0,0 1 1,-4-2-137,-7-2 53,0 0 1,-1 2 0,1-1 0,-1 2 0,0 0 0,0 0 0,0 2 0,0 0 0,-1 0 0,1 2 0,0 0 0,-5 1-54,8 0-108,0 0-1,0 1 1,0 0 0,0 0 0,1 2 0,-1-1-1,1 1 1,1 1 0,-1 0 0,1 1-1,1 0 1,-1 0 0,1 1 0,1 0 0,-1 1 108,6-6-26,-1 1 1,1 0-1,1 0 1,-1 0 0,1 0-1,-1 0 1,1 1 0,1-1-1,-1 1 1,1-1 0,0 1-1,0 0 1,1 4 25,0-7 53,0 1 1,0-1-1,1 0 1,-1 0-1,1 1 1,0-1-1,0 0 1,0 0-1,0 0 1,1 0-1,-1 0 1,1 0-1,-1-1 1,1 1-1,0 0 1,0-1-1,1 0 1,-1 1-1,0-1 1,1 0-1,-1 0 1,1 0-1,0 0 1,0-1 0,0 1-54,4 1 125,0 0 1,1-1 0,-1 0 0,0 0 0,1 0 0,0-1 0,-1 0 0,1-1 0,0 0 0,-1 0-1,1-1 1,0 1 0,-1-2 0,1 1 0,5-3-126,11-3 292,0-1 0,0-2 0,-1 0-1,4-4-291,9-5 615,0-3-1,7-6-614,-26 16 241,-1-1 1,0 0 0,-1-1 0,-1-1 0,6-8-242,-16 19 58,-1 0 1,0 0 0,0 0-1,-1-1 1,1 1 0,-1-1-1,0 1 1,0-1 0,0-1-59,-2 5-4,1 0 0,-1 0 1,0 1-1,0-1 1,0 0-1,0 1 0,0-1 1,0 0-1,0 0 0,0 1 1,0-1-1,0 0 0,0 0 1,-1 1-1,1-1 1,0 0-1,0 1 0,-1-1 1,1 0-1,0 1 0,-1-1 1,1 0-1,-1 1 1,1-1-1,-1 1 0,1-1 1,-1 1-1,1-1 0,-1 1 1,0-1-1,1 1 1,-1 0-1,1-1 0,-1 1 1,0 0-1,0 0 0,1-1 1,-1 1-1,0 0 4,-3-1-57,0 1 1,0 0-1,0-1 0,0 1 0,0 1 1,0-1-1,-2 1 57,-9 2-206,0 1-1,0 1 1,0 0-1,1 1 1,0 1 0,0 0-1,-9 7 207,-24 17-2048,-21 19 2048,38-28-704,-22 16-546,-30 23-1946,67-48 424,1-1 1,-6 10 2771,14-13-4064</inkml:trace>
+  <inkml:trace contextRef="#ctx0" brushRef="#br0" timeOffset="2726.681">2967 176 8736,'-16'0'3904,"15"0"-3216,1 0 400,-5-11 458,4 27-2192,0 0 1,-2 0-1,0-1 0,-1 1 1,0 0 645,-6 21-217,-14 80 1115,5 0 0,1 41-898,11 14-4265,7-174 1577</inkml:trace>
+  <inkml:trace contextRef="#ctx0" brushRef="#br0" timeOffset="3097.103">3153 698 7456,'15'0'1239,"0"0"0,0-1 1,0-1-1,4-2-1239,-10 2 456,-1 0 0,0-1 1,0-1-1,0 1 1,0-1-1,-1 0 0,1-1 1,0-1-457,11-7 276,0-1 1,-1-1-1,-1 0 1,0-2 0,-2 0-1,1 0 1,-2-2 0,5-8-277,-17 23 43,11-16 376,-2-1-1,6-14-418,-14 29 87,-1 0 1,0 0-1,0-1 0,-1 1 0,0-1 1,0 1-1,0-1 0,-1 1 0,0-1 0,0 1 1,-1-6-88,1 10 5,0 0 0,-1 0 1,1 0-1,-1 1 0,0-1 1,1 0-1,-1 1 0,0-1 1,0 0-1,0 1 0,0-1 1,0 1-1,0-1 1,0 1-1,-1 0 0,1-1 1,0 1-1,-1 0 0,1 0 1,-1 0-1,0 0 0,1 0 1,-1 0-1,0 1 0,1-1 1,-1 0-1,0 1 0,0-1 1,0 1-6,-3 0-57,0-1 0,0 1 0,0 0 1,1 1-1,-1-1 0,0 1 0,0 0 1,1 0-1,-1 1 0,0 0 0,-1 0 57,-22 11-103,1 2-1,1 0 0,0 2 0,1 1 1,0 1-1,2 1 0,1 1 0,0 1 1,1 1-1,2 0 0,-5 10 104,13-17 133,1 0 0,1 1 0,1 0 0,0 1 1,1 0-1,1 2-133,3-12 29,1 0 0,0 0 0,1 0 0,-1 0 0,2 1 0,-1-1 0,1 0 0,1 1 0,-1-1 0,1 0 0,1 1 0,-1-1 0,2 0 0,2 7-29,-4-12-131,1 1 0,0-1-1,0 1 1,0-1 0,1 1 0,-1-1-1,1 0 1,0 0 0,0-1-1,0 1 1,0 0 0,0-1-1,1 0 1,-1 0 0,1 0-1,-1 0 1,1 0 0,0-1-1,0 1 1,0-1 0,-1 0 0,1-1-1,0 1 1,0-1 0,1 1-1,2-1 132,6-1-673,0 0 0,1-1-1,-1 0 1,0-1-1,0-1 1,-1 0 0,10-4 673,67-31-6144</inkml:trace>
+</inkml:ink>
+</file>
+
+<file path=ppt/ink/ink6.xml><?xml version="1.0" encoding="utf-8"?>
 <inkml:ink xmlns:inkml="http://www.w3.org/2003/InkML">
   <inkml:definitions>
     <inkml:context xml:id="ctx0">
@@ -2184,7 +1856,7 @@
 </inkml:ink>
 </file>
 
-<file path=ppt/ink/ink9.xml><?xml version="1.0" encoding="utf-8"?>
+<file path=ppt/ink/ink7.xml><?xml version="1.0" encoding="utf-8"?>
 <inkml:ink xmlns:inkml="http://www.w3.org/2003/InkML">
   <inkml:definitions>
     <inkml:context xml:id="ctx0">
@@ -2213,6 +1885,70 @@
     </inkml:brush>
   </inkml:definitions>
   <inkml:trace contextRef="#ctx0" brushRef="#br0">1 155 6880,'0'0'0,"2"-5"3136,6-5-3174,3-1 460,5-2-438,6-1-1078,6-2 918,5-3-2346,5-3 2047,3-2-3445,-8 3 1846</inkml:trace>
+</inkml:ink>
+</file>
+
+<file path=ppt/ink/ink8.xml><?xml version="1.0" encoding="utf-8"?>
+<inkml:ink xmlns:inkml="http://www.w3.org/2003/InkML">
+  <inkml:definitions>
+    <inkml:context xml:id="ctx0">
+      <inkml:inkSource xml:id="inkSrc0">
+        <inkml:traceFormat>
+          <inkml:channel name="X" type="integer" min="-2.14748E9" max="2.14748E9" units="cm"/>
+          <inkml:channel name="Y" type="integer" min="-2.14748E9" max="2.14748E9" units="cm"/>
+          <inkml:channel name="F" type="integer" max="32767" units="dev"/>
+        </inkml:traceFormat>
+        <inkml:channelProperties>
+          <inkml:channelProperty channel="X" name="resolution" value="1000" units="1/cm"/>
+          <inkml:channelProperty channel="Y" name="resolution" value="1000" units="1/cm"/>
+          <inkml:channelProperty channel="F" name="resolution" value="0" units="1/dev"/>
+        </inkml:channelProperties>
+      </inkml:inkSource>
+      <inkml:timestamp xml:id="ts0" timeString="2019-06-01T06:28:02.507"/>
+    </inkml:context>
+    <inkml:brush xml:id="br0">
+      <inkml:brushProperty name="width" value="0.1" units="cm"/>
+      <inkml:brushProperty name="height" value="0.1" units="cm"/>
+      <inkml:brushProperty name="color" value="#AE198D"/>
+      <inkml:brushProperty name="inkEffects" value="galaxy"/>
+      <inkml:brushProperty name="anchorX" value="-10842.02832"/>
+      <inkml:brushProperty name="anchorY" value="-4485.45654"/>
+      <inkml:brushProperty name="scaleFactor" value="0.5"/>
+    </inkml:brush>
+  </inkml:definitions>
+  <inkml:trace contextRef="#ctx0" brushRef="#br0">1 0 3712,'0'0'0,"3"0"1696,4 2-1717,1 1 266,1 2-256,0 4-48,-1 3 1,-2 6 68,0 10-20,-1 9 831,-2 11-682,1 8 319,0 5-346,2 2 1131,4 7 37,5-5-1152,3-7 208,-13-45-301,1 0-1,5 8-34,-6-13-544,0-1 0,0 1 0,6 5 544,-6-8-66,-1 0-1,1-1 0,0 1 1,4 2 66,-4-4-326,-1 0 1,1 0 0,0-1-1,0 0 1,0 1 325,23 4-320,-2-5-464,-4-7 640,-5-5-1754,-4-3 1572,-6-4-1647,-3 3 917</inkml:trace>
+</inkml:ink>
+</file>
+
+<file path=ppt/ink/ink9.xml><?xml version="1.0" encoding="utf-8"?>
+<inkml:ink xmlns:inkml="http://www.w3.org/2003/InkML">
+  <inkml:definitions>
+    <inkml:context xml:id="ctx0">
+      <inkml:inkSource xml:id="inkSrc0">
+        <inkml:traceFormat>
+          <inkml:channel name="X" type="integer" min="-2.14748E9" max="2.14748E9" units="cm"/>
+          <inkml:channel name="Y" type="integer" min="-2.14748E9" max="2.14748E9" units="cm"/>
+          <inkml:channel name="F" type="integer" max="32767" units="dev"/>
+        </inkml:traceFormat>
+        <inkml:channelProperties>
+          <inkml:channelProperty channel="X" name="resolution" value="1000" units="1/cm"/>
+          <inkml:channelProperty channel="Y" name="resolution" value="1000" units="1/cm"/>
+          <inkml:channelProperty channel="F" name="resolution" value="0" units="1/dev"/>
+        </inkml:channelProperties>
+      </inkml:inkSource>
+      <inkml:timestamp xml:id="ts0" timeString="2019-06-01T06:28:02.807"/>
+    </inkml:context>
+    <inkml:brush xml:id="br0">
+      <inkml:brushProperty name="width" value="0.1" units="cm"/>
+      <inkml:brushProperty name="height" value="0.1" units="cm"/>
+      <inkml:brushProperty name="color" value="#AE198D"/>
+      <inkml:brushProperty name="inkEffects" value="galaxy"/>
+      <inkml:brushProperty name="anchorX" value="-11820.80859"/>
+      <inkml:brushProperty name="anchorY" value="-5730.18994"/>
+      <inkml:brushProperty name="scaleFactor" value="0.5"/>
+    </inkml:brush>
+  </inkml:definitions>
+  <inkml:trace contextRef="#ctx0" brushRef="#br0">1 49 1312,'0'0'0,"1"9"608,1 10-635,-2 2 742,2 1-624,0 0 149,3-2-155,4-5 587,4-4-549,6-6 410,4-7-453,3-5 688,3-7-619,0-3 1542,0-4-1414,-4-1 1664,-5-1-1599,-4 0 863,-8 0-602,-7 5-523,-1 17-46,0 0 0,0 0-1,-1-1 1,1 1 0,0 0 0,-1 0 0,1 0 0,-1 0 0,0 0 0,1 0 0,-1-1-34,-9-5 48,-4 6-224,-1 4 171,0 5-1793,0 2 1478,1 0-3919,3-1-1504</inkml:trace>
 </inkml:ink>
 </file>
 
@@ -2363,7 +2099,7 @@
           <a:p>
             <a:fld id="{79652DCB-1E04-4CE8-99FE-18CCC7FFA60D}" type="datetimeFigureOut">
               <a:rPr lang="en-US" smtClean="0"/>
-              <a:t>6/1/2019</a:t>
+              <a:t>6/10/2019</a:t>
             </a:fld>
             <a:endParaRPr lang="en-US"/>
           </a:p>
@@ -2561,7 +2297,7 @@
           <a:p>
             <a:fld id="{79652DCB-1E04-4CE8-99FE-18CCC7FFA60D}" type="datetimeFigureOut">
               <a:rPr lang="en-US" smtClean="0"/>
-              <a:t>6/1/2019</a:t>
+              <a:t>6/10/2019</a:t>
             </a:fld>
             <a:endParaRPr lang="en-US"/>
           </a:p>
@@ -2769,7 +2505,7 @@
           <a:p>
             <a:fld id="{79652DCB-1E04-4CE8-99FE-18CCC7FFA60D}" type="datetimeFigureOut">
               <a:rPr lang="en-US" smtClean="0"/>
-              <a:t>6/1/2019</a:t>
+              <a:t>6/10/2019</a:t>
             </a:fld>
             <a:endParaRPr lang="en-US"/>
           </a:p>
@@ -2967,7 +2703,7 @@
           <a:p>
             <a:fld id="{79652DCB-1E04-4CE8-99FE-18CCC7FFA60D}" type="datetimeFigureOut">
               <a:rPr lang="en-US" smtClean="0"/>
-              <a:t>6/1/2019</a:t>
+              <a:t>6/10/2019</a:t>
             </a:fld>
             <a:endParaRPr lang="en-US"/>
           </a:p>
@@ -3242,7 +2978,7 @@
           <a:p>
             <a:fld id="{79652DCB-1E04-4CE8-99FE-18CCC7FFA60D}" type="datetimeFigureOut">
               <a:rPr lang="en-US" smtClean="0"/>
-              <a:t>6/1/2019</a:t>
+              <a:t>6/10/2019</a:t>
             </a:fld>
             <a:endParaRPr lang="en-US"/>
           </a:p>
@@ -3507,7 +3243,7 @@
           <a:p>
             <a:fld id="{79652DCB-1E04-4CE8-99FE-18CCC7FFA60D}" type="datetimeFigureOut">
               <a:rPr lang="en-US" smtClean="0"/>
-              <a:t>6/1/2019</a:t>
+              <a:t>6/10/2019</a:t>
             </a:fld>
             <a:endParaRPr lang="en-US"/>
           </a:p>
@@ -3919,7 +3655,7 @@
           <a:p>
             <a:fld id="{79652DCB-1E04-4CE8-99FE-18CCC7FFA60D}" type="datetimeFigureOut">
               <a:rPr lang="en-US" smtClean="0"/>
-              <a:t>6/1/2019</a:t>
+              <a:t>6/10/2019</a:t>
             </a:fld>
             <a:endParaRPr lang="en-US"/>
           </a:p>
@@ -4060,7 +3796,7 @@
           <a:p>
             <a:fld id="{79652DCB-1E04-4CE8-99FE-18CCC7FFA60D}" type="datetimeFigureOut">
               <a:rPr lang="en-US" smtClean="0"/>
-              <a:t>6/1/2019</a:t>
+              <a:t>6/10/2019</a:t>
             </a:fld>
             <a:endParaRPr lang="en-US"/>
           </a:p>
@@ -4173,7 +3909,7 @@
           <a:p>
             <a:fld id="{79652DCB-1E04-4CE8-99FE-18CCC7FFA60D}" type="datetimeFigureOut">
               <a:rPr lang="en-US" smtClean="0"/>
-              <a:t>6/1/2019</a:t>
+              <a:t>6/10/2019</a:t>
             </a:fld>
             <a:endParaRPr lang="en-US"/>
           </a:p>
@@ -4484,7 +4220,7 @@
           <a:p>
             <a:fld id="{79652DCB-1E04-4CE8-99FE-18CCC7FFA60D}" type="datetimeFigureOut">
               <a:rPr lang="en-US" smtClean="0"/>
-              <a:t>6/1/2019</a:t>
+              <a:t>6/10/2019</a:t>
             </a:fld>
             <a:endParaRPr lang="en-US"/>
           </a:p>
@@ -4772,7 +4508,7 @@
           <a:p>
             <a:fld id="{79652DCB-1E04-4CE8-99FE-18CCC7FFA60D}" type="datetimeFigureOut">
               <a:rPr lang="en-US" smtClean="0"/>
-              <a:t>6/1/2019</a:t>
+              <a:t>6/10/2019</a:t>
             </a:fld>
             <a:endParaRPr lang="en-US"/>
           </a:p>
@@ -5013,7 +4749,7 @@
           <a:p>
             <a:fld id="{79652DCB-1E04-4CE8-99FE-18CCC7FFA60D}" type="datetimeFigureOut">
               <a:rPr lang="en-US" smtClean="0"/>
-              <a:t>6/1/2019</a:t>
+              <a:t>6/10/2019</a:t>
             </a:fld>
             <a:endParaRPr lang="en-US"/>
           </a:p>
@@ -5621,8 +5357,163 @@
           <a:chExt cx="0" cy="0"/>
         </a:xfrm>
       </p:grpSpPr>
-      <mc:AlternateContent xmlns:mc="http://schemas.openxmlformats.org/markup-compatibility/2006">
-        <mc:Choice xmlns:p14="http://schemas.microsoft.com/office/powerpoint/2010/main" xmlns:aink="http://schemas.microsoft.com/office/drawing/2016/ink" Requires="p14 aink">
+      <p:sp>
+        <p:nvSpPr>
+          <p:cNvPr id="2" name="Rectangle 1">
+            <a:extLst>
+              <a:ext uri="{FF2B5EF4-FFF2-40B4-BE49-F238E27FC236}">
+                <a16:creationId xmlns:a16="http://schemas.microsoft.com/office/drawing/2014/main" id="{BDDB8BDD-0AF3-4095-B848-D58DBBB803E7}"/>
+              </a:ext>
+            </a:extLst>
+          </p:cNvPr>
+          <p:cNvSpPr>
+            <a:spLocks noChangeArrowheads="1"/>
+          </p:cNvSpPr>
+          <p:nvPr/>
+        </p:nvSpPr>
+        <p:spPr bwMode="auto">
+          <a:xfrm>
+            <a:off x="1621735" y="2505670"/>
+            <a:ext cx="8948530" cy="1200329"/>
+          </a:xfrm>
+          <a:prstGeom prst="rect">
+            <a:avLst/>
+          </a:prstGeom>
+          <a:solidFill>
+            <a:schemeClr val="bg2"/>
+          </a:solidFill>
+          <a:ln>
+            <a:noFill/>
+          </a:ln>
+          <a:effectLst/>
+        </p:spPr>
+        <p:txBody>
+          <a:bodyPr vert="horz" wrap="square" lIns="91440" tIns="45720" rIns="91440" bIns="45720" numCol="1" anchor="ctr" anchorCtr="0" compatLnSpc="1">
+            <a:prstTxWarp prst="textNoShape">
+              <a:avLst/>
+            </a:prstTxWarp>
+            <a:spAutoFit/>
+          </a:bodyPr>
+          <a:lstStyle/>
+          <a:p>
+            <a:pPr marL="0" marR="0" lvl="0" indent="0" algn="l" defTabSz="914400" rtl="0" eaLnBrk="0" fontAlgn="base" latinLnBrk="0" hangingPunct="0">
+              <a:lnSpc>
+                <a:spcPct val="100000"/>
+              </a:lnSpc>
+              <a:spcBef>
+                <a:spcPct val="0"/>
+              </a:spcBef>
+              <a:spcAft>
+                <a:spcPct val="0"/>
+              </a:spcAft>
+              <a:buClrTx/>
+              <a:buSzTx/>
+              <a:buFontTx/>
+              <a:buNone/>
+              <a:tabLst/>
+            </a:pPr>
+            <a:r>
+              <a:rPr kumimoji="0" lang="en-US" altLang="en-US" sz="2400" b="0" i="0" u="none" strike="noStrike" cap="none" normalizeH="0" baseline="0">
+                <a:ln>
+                  <a:noFill/>
+                </a:ln>
+                <a:solidFill>
+                  <a:schemeClr val="tx1"/>
+                </a:solidFill>
+                <a:effectLst/>
+              </a:rPr>
+              <a:t>Entities must depend on abstractions not on concretions. It states that the high level module must not depend on the low level module, but they should depend on abstractions.</a:t>
+            </a:r>
+          </a:p>
+        </p:txBody>
+      </p:sp>
+      <p:sp>
+        <p:nvSpPr>
+          <p:cNvPr id="3" name="Rectangle 2">
+            <a:extLst>
+              <a:ext uri="{FF2B5EF4-FFF2-40B4-BE49-F238E27FC236}">
+                <a16:creationId xmlns:a16="http://schemas.microsoft.com/office/drawing/2014/main" id="{4204C1C1-6BF7-4E86-8ECF-88B7425991BC}"/>
+              </a:ext>
+            </a:extLst>
+          </p:cNvPr>
+          <p:cNvSpPr/>
+          <p:nvPr/>
+        </p:nvSpPr>
+        <p:spPr>
+          <a:xfrm>
+            <a:off x="1510752" y="2505670"/>
+            <a:ext cx="114300" cy="1200329"/>
+          </a:xfrm>
+          <a:prstGeom prst="rect">
+            <a:avLst/>
+          </a:prstGeom>
+          <a:solidFill>
+            <a:schemeClr val="accent1">
+              <a:lumMod val="60000"/>
+              <a:lumOff val="40000"/>
+            </a:schemeClr>
+          </a:solidFill>
+          <a:ln>
+            <a:noFill/>
+          </a:ln>
+        </p:spPr>
+        <p:style>
+          <a:lnRef idx="2">
+            <a:schemeClr val="accent1">
+              <a:shade val="50000"/>
+            </a:schemeClr>
+          </a:lnRef>
+          <a:fillRef idx="1">
+            <a:schemeClr val="accent1"/>
+          </a:fillRef>
+          <a:effectRef idx="0">
+            <a:schemeClr val="accent1"/>
+          </a:effectRef>
+          <a:fontRef idx="minor">
+            <a:schemeClr val="lt1"/>
+          </a:fontRef>
+        </p:style>
+        <p:txBody>
+          <a:bodyPr rtlCol="0" anchor="ctr"/>
+          <a:lstStyle/>
+          <a:p>
+            <a:pPr algn="ctr"/>
+            <a:endParaRPr lang="en-US"/>
+          </a:p>
+        </p:txBody>
+      </p:sp>
+    </p:spTree>
+    <p:extLst>
+      <p:ext uri="{BB962C8B-B14F-4D97-AF65-F5344CB8AC3E}">
+        <p14:creationId xmlns:p14="http://schemas.microsoft.com/office/powerpoint/2010/main" val="2430212479"/>
+      </p:ext>
+    </p:extLst>
+  </p:cSld>
+  <p:clrMapOvr>
+    <a:masterClrMapping/>
+  </p:clrMapOvr>
+</p:sld>
+</file>
+
+<file path=ppt/slides/slide3.xml><?xml version="1.0" encoding="utf-8"?>
+<p:sld xmlns:a="http://schemas.openxmlformats.org/drawingml/2006/main" xmlns:r="http://schemas.openxmlformats.org/officeDocument/2006/relationships" xmlns:p="http://schemas.openxmlformats.org/presentationml/2006/main">
+  <p:cSld>
+    <p:spTree>
+      <p:nvGrpSpPr>
+        <p:cNvPr id="1" name=""/>
+        <p:cNvGrpSpPr/>
+        <p:nvPr/>
+      </p:nvGrpSpPr>
+      <p:grpSpPr>
+        <a:xfrm>
+          <a:off x="0" y="0"/>
+          <a:ext cx="0" cy="0"/>
+          <a:chOff x="0" y="0"/>
+          <a:chExt cx="0" cy="0"/>
+        </a:xfrm>
+      </p:grpSpPr>
+      <mc:AlternateContent xmlns:mc="http://schemas.openxmlformats.org/markup-compatibility/2006" xmlns:p14="http://schemas.microsoft.com/office/powerpoint/2010/main" xmlns:aink="http://schemas.microsoft.com/office/drawing/2016/ink">
+        <mc:Choice Requires="p14 aink">
           <p:contentPart p14:bwMode="auto" r:id="rId2">
             <p14:nvContentPartPr>
               <p14:cNvPr id="4" name="Ink 3">
@@ -5641,7 +5532,7 @@
             </p14:xfrm>
           </p:contentPart>
         </mc:Choice>
-        <mc:Fallback>
+        <mc:Fallback xmlns="">
           <p:pic>
             <p:nvPicPr>
               <p:cNvPr id="4" name="Ink 3">
@@ -5672,8 +5563,8 @@
           </p:pic>
         </mc:Fallback>
       </mc:AlternateContent>
-      <mc:AlternateContent xmlns:mc="http://schemas.openxmlformats.org/markup-compatibility/2006">
-        <mc:Choice xmlns:p14="http://schemas.microsoft.com/office/powerpoint/2010/main" xmlns:aink="http://schemas.microsoft.com/office/drawing/2016/ink" Requires="p14 aink">
+      <mc:AlternateContent xmlns:mc="http://schemas.openxmlformats.org/markup-compatibility/2006" xmlns:p14="http://schemas.microsoft.com/office/powerpoint/2010/main" xmlns:aink="http://schemas.microsoft.com/office/drawing/2016/ink">
+        <mc:Choice Requires="p14 aink">
           <p:contentPart p14:bwMode="auto" r:id="rId4">
             <p14:nvContentPartPr>
               <p14:cNvPr id="5" name="Ink 4">
@@ -5692,7 +5583,7 @@
             </p14:xfrm>
           </p:contentPart>
         </mc:Choice>
-        <mc:Fallback>
+        <mc:Fallback xmlns="">
           <p:pic>
             <p:nvPicPr>
               <p:cNvPr id="5" name="Ink 4">
@@ -5723,8 +5614,8 @@
           </p:pic>
         </mc:Fallback>
       </mc:AlternateContent>
-      <mc:AlternateContent xmlns:mc="http://schemas.openxmlformats.org/markup-compatibility/2006">
-        <mc:Choice xmlns:p14="http://schemas.microsoft.com/office/powerpoint/2010/main" xmlns:aink="http://schemas.microsoft.com/office/drawing/2016/ink" Requires="p14 aink">
+      <mc:AlternateContent xmlns:mc="http://schemas.openxmlformats.org/markup-compatibility/2006" xmlns:p14="http://schemas.microsoft.com/office/powerpoint/2010/main" xmlns:aink="http://schemas.microsoft.com/office/drawing/2016/ink">
+        <mc:Choice Requires="p14 aink">
           <p:contentPart p14:bwMode="auto" r:id="rId6">
             <p14:nvContentPartPr>
               <p14:cNvPr id="6" name="Ink 5">
@@ -5743,7 +5634,7 @@
             </p14:xfrm>
           </p:contentPart>
         </mc:Choice>
-        <mc:Fallback>
+        <mc:Fallback xmlns="">
           <p:pic>
             <p:nvPicPr>
               <p:cNvPr id="6" name="Ink 5">
@@ -5774,8 +5665,8 @@
           </p:pic>
         </mc:Fallback>
       </mc:AlternateContent>
-      <mc:AlternateContent xmlns:mc="http://schemas.openxmlformats.org/markup-compatibility/2006">
-        <mc:Choice xmlns:p14="http://schemas.microsoft.com/office/powerpoint/2010/main" xmlns:aink="http://schemas.microsoft.com/office/drawing/2016/ink" Requires="p14 aink">
+      <mc:AlternateContent xmlns:mc="http://schemas.openxmlformats.org/markup-compatibility/2006" xmlns:p14="http://schemas.microsoft.com/office/powerpoint/2010/main" xmlns:aink="http://schemas.microsoft.com/office/drawing/2016/ink">
+        <mc:Choice Requires="p14 aink">
           <p:contentPart p14:bwMode="auto" r:id="rId8">
             <p14:nvContentPartPr>
               <p14:cNvPr id="7" name="Ink 6">
@@ -5794,7 +5685,7 @@
             </p14:xfrm>
           </p:contentPart>
         </mc:Choice>
-        <mc:Fallback>
+        <mc:Fallback xmlns="">
           <p:pic>
             <p:nvPicPr>
               <p:cNvPr id="7" name="Ink 6">
@@ -5825,111 +5716,9 @@
           </p:pic>
         </mc:Fallback>
       </mc:AlternateContent>
-      <mc:AlternateContent xmlns:mc="http://schemas.openxmlformats.org/markup-compatibility/2006">
-        <mc:Choice xmlns:p14="http://schemas.microsoft.com/office/powerpoint/2010/main" xmlns:aink="http://schemas.microsoft.com/office/drawing/2016/ink" Requires="p14 aink">
+      <mc:AlternateContent xmlns:mc="http://schemas.openxmlformats.org/markup-compatibility/2006" xmlns:p14="http://schemas.microsoft.com/office/powerpoint/2010/main" xmlns:aink="http://schemas.microsoft.com/office/drawing/2016/ink">
+        <mc:Choice Requires="p14 aink">
           <p:contentPart p14:bwMode="auto" r:id="rId10">
-            <p14:nvContentPartPr>
-              <p14:cNvPr id="8" name="Ink 7">
-                <a:extLst>
-                  <a:ext uri="{FF2B5EF4-FFF2-40B4-BE49-F238E27FC236}">
-                    <a16:creationId xmlns:a16="http://schemas.microsoft.com/office/drawing/2014/main" id="{08E06317-AB8B-451C-A361-F9B97775E41B}"/>
-                  </a:ext>
-                </a:extLst>
-              </p14:cNvPr>
-              <p14:cNvContentPartPr/>
-              <p14:nvPr/>
-            </p14:nvContentPartPr>
-            <p14:xfrm>
-              <a:off x="2116706" y="1063268"/>
-              <a:ext cx="703800" cy="881640"/>
-            </p14:xfrm>
-          </p:contentPart>
-        </mc:Choice>
-        <mc:Fallback>
-          <p:pic>
-            <p:nvPicPr>
-              <p:cNvPr id="8" name="Ink 7">
-                <a:extLst>
-                  <a:ext uri="{FF2B5EF4-FFF2-40B4-BE49-F238E27FC236}">
-                    <a16:creationId xmlns:a16="http://schemas.microsoft.com/office/drawing/2014/main" id="{08E06317-AB8B-451C-A361-F9B97775E41B}"/>
-                  </a:ext>
-                </a:extLst>
-              </p:cNvPr>
-              <p:cNvPicPr/>
-              <p:nvPr/>
-            </p:nvPicPr>
-            <p:blipFill>
-              <a:blip r:embed="rId11"/>
-              <a:stretch>
-                <a:fillRect/>
-              </a:stretch>
-            </p:blipFill>
-            <p:spPr>
-              <a:xfrm>
-                <a:off x="2098706" y="1045268"/>
-                <a:ext cx="739440" cy="917280"/>
-              </a:xfrm>
-              <a:prstGeom prst="rect">
-                <a:avLst/>
-              </a:prstGeom>
-            </p:spPr>
-          </p:pic>
-        </mc:Fallback>
-      </mc:AlternateContent>
-      <mc:AlternateContent xmlns:mc="http://schemas.openxmlformats.org/markup-compatibility/2006">
-        <mc:Choice xmlns:p14="http://schemas.microsoft.com/office/powerpoint/2010/main" xmlns:aink="http://schemas.microsoft.com/office/drawing/2016/ink" Requires="p14 aink">
-          <p:contentPart p14:bwMode="auto" r:id="rId12">
-            <p14:nvContentPartPr>
-              <p14:cNvPr id="9" name="Ink 8">
-                <a:extLst>
-                  <a:ext uri="{FF2B5EF4-FFF2-40B4-BE49-F238E27FC236}">
-                    <a16:creationId xmlns:a16="http://schemas.microsoft.com/office/drawing/2014/main" id="{A0AA1180-FF5E-4E1E-AA7D-C6AD666F5B3D}"/>
-                  </a:ext>
-                </a:extLst>
-              </p14:cNvPr>
-              <p14:cNvContentPartPr/>
-              <p14:nvPr/>
-            </p14:nvContentPartPr>
-            <p14:xfrm>
-              <a:off x="2794946" y="1067588"/>
-              <a:ext cx="259200" cy="64800"/>
-            </p14:xfrm>
-          </p:contentPart>
-        </mc:Choice>
-        <mc:Fallback>
-          <p:pic>
-            <p:nvPicPr>
-              <p:cNvPr id="9" name="Ink 8">
-                <a:extLst>
-                  <a:ext uri="{FF2B5EF4-FFF2-40B4-BE49-F238E27FC236}">
-                    <a16:creationId xmlns:a16="http://schemas.microsoft.com/office/drawing/2014/main" id="{A0AA1180-FF5E-4E1E-AA7D-C6AD666F5B3D}"/>
-                  </a:ext>
-                </a:extLst>
-              </p:cNvPr>
-              <p:cNvPicPr/>
-              <p:nvPr/>
-            </p:nvPicPr>
-            <p:blipFill>
-              <a:blip r:embed="rId13"/>
-              <a:stretch>
-                <a:fillRect/>
-              </a:stretch>
-            </p:blipFill>
-            <p:spPr>
-              <a:xfrm>
-                <a:off x="2777306" y="1049948"/>
-                <a:ext cx="294840" cy="100440"/>
-              </a:xfrm>
-              <a:prstGeom prst="rect">
-                <a:avLst/>
-              </a:prstGeom>
-            </p:spPr>
-          </p:pic>
-        </mc:Fallback>
-      </mc:AlternateContent>
-      <mc:AlternateContent xmlns:mc="http://schemas.openxmlformats.org/markup-compatibility/2006">
-        <mc:Choice xmlns:p14="http://schemas.microsoft.com/office/powerpoint/2010/main" xmlns:aink="http://schemas.microsoft.com/office/drawing/2016/ink" Requires="p14 aink">
-          <p:contentPart p14:bwMode="auto" r:id="rId14">
             <p14:nvContentPartPr>
               <p14:cNvPr id="10" name="Ink 9">
                 <a:extLst>
@@ -5947,7 +5736,7 @@
             </p14:xfrm>
           </p:contentPart>
         </mc:Choice>
-        <mc:Fallback>
+        <mc:Fallback xmlns="">
           <p:pic>
             <p:nvPicPr>
               <p:cNvPr id="10" name="Ink 9">
@@ -5978,8 +5767,8 @@
           </p:pic>
         </mc:Fallback>
       </mc:AlternateContent>
-      <mc:AlternateContent xmlns:mc="http://schemas.openxmlformats.org/markup-compatibility/2006">
-        <mc:Choice xmlns:p14="http://schemas.microsoft.com/office/powerpoint/2010/main" xmlns:aink="http://schemas.microsoft.com/office/drawing/2016/ink" Requires="p14 aink">
+      <mc:AlternateContent xmlns:mc="http://schemas.openxmlformats.org/markup-compatibility/2006" xmlns:p14="http://schemas.microsoft.com/office/powerpoint/2010/main" xmlns:aink="http://schemas.microsoft.com/office/drawing/2016/ink">
+        <mc:Choice Requires="p14 aink">
           <p:contentPart p14:bwMode="auto" r:id="rId16">
             <p14:nvContentPartPr>
               <p14:cNvPr id="11" name="Ink 10">
@@ -5998,7 +5787,7 @@
             </p14:xfrm>
           </p:contentPart>
         </mc:Choice>
-        <mc:Fallback>
+        <mc:Fallback xmlns="">
           <p:pic>
             <p:nvPicPr>
               <p:cNvPr id="11" name="Ink 10">
@@ -6029,8 +5818,8 @@
           </p:pic>
         </mc:Fallback>
       </mc:AlternateContent>
-      <mc:AlternateContent xmlns:mc="http://schemas.openxmlformats.org/markup-compatibility/2006">
-        <mc:Choice xmlns:p14="http://schemas.microsoft.com/office/powerpoint/2010/main" xmlns:aink="http://schemas.microsoft.com/office/drawing/2016/ink" Requires="p14 aink">
+      <mc:AlternateContent xmlns:mc="http://schemas.openxmlformats.org/markup-compatibility/2006" xmlns:p14="http://schemas.microsoft.com/office/powerpoint/2010/main" xmlns:aink="http://schemas.microsoft.com/office/drawing/2016/ink">
+        <mc:Choice Requires="p14 aink">
           <p:contentPart p14:bwMode="auto" r:id="rId18">
             <p14:nvContentPartPr>
               <p14:cNvPr id="12" name="Ink 11">
@@ -6049,7 +5838,7 @@
             </p14:xfrm>
           </p:contentPart>
         </mc:Choice>
-        <mc:Fallback>
+        <mc:Fallback xmlns="">
           <p:pic>
             <p:nvPicPr>
               <p:cNvPr id="12" name="Ink 11">
@@ -6080,8 +5869,8 @@
           </p:pic>
         </mc:Fallback>
       </mc:AlternateContent>
-      <mc:AlternateContent xmlns:mc="http://schemas.openxmlformats.org/markup-compatibility/2006">
-        <mc:Choice xmlns:p14="http://schemas.microsoft.com/office/powerpoint/2010/main" xmlns:aink="http://schemas.microsoft.com/office/drawing/2016/ink" Requires="p14 aink">
+      <mc:AlternateContent xmlns:mc="http://schemas.openxmlformats.org/markup-compatibility/2006" xmlns:p14="http://schemas.microsoft.com/office/powerpoint/2010/main" xmlns:aink="http://schemas.microsoft.com/office/drawing/2016/ink">
+        <mc:Choice Requires="p14 aink">
           <p:contentPart p14:bwMode="auto" r:id="rId20">
             <p14:nvContentPartPr>
               <p14:cNvPr id="13" name="Ink 12">
@@ -6100,7 +5889,7 @@
             </p14:xfrm>
           </p:contentPart>
         </mc:Choice>
-        <mc:Fallback>
+        <mc:Fallback xmlns="">
           <p:pic>
             <p:nvPicPr>
               <p:cNvPr id="13" name="Ink 12">
@@ -6131,8 +5920,8 @@
           </p:pic>
         </mc:Fallback>
       </mc:AlternateContent>
-      <mc:AlternateContent xmlns:mc="http://schemas.openxmlformats.org/markup-compatibility/2006">
-        <mc:Choice xmlns:p14="http://schemas.microsoft.com/office/powerpoint/2010/main" xmlns:aink="http://schemas.microsoft.com/office/drawing/2016/ink" Requires="p14 aink">
+      <mc:AlternateContent xmlns:mc="http://schemas.openxmlformats.org/markup-compatibility/2006" xmlns:p14="http://schemas.microsoft.com/office/powerpoint/2010/main" xmlns:aink="http://schemas.microsoft.com/office/drawing/2016/ink">
+        <mc:Choice Requires="p14 aink">
           <p:contentPart p14:bwMode="auto" r:id="rId22">
             <p14:nvContentPartPr>
               <p14:cNvPr id="14" name="Ink 13">
@@ -6151,7 +5940,7 @@
             </p14:xfrm>
           </p:contentPart>
         </mc:Choice>
-        <mc:Fallback>
+        <mc:Fallback xmlns="">
           <p:pic>
             <p:nvPicPr>
               <p:cNvPr id="14" name="Ink 13">
@@ -6182,8 +5971,8 @@
           </p:pic>
         </mc:Fallback>
       </mc:AlternateContent>
-      <mc:AlternateContent xmlns:mc="http://schemas.openxmlformats.org/markup-compatibility/2006">
-        <mc:Choice xmlns:p14="http://schemas.microsoft.com/office/powerpoint/2010/main" xmlns:aink="http://schemas.microsoft.com/office/drawing/2016/ink" Requires="p14 aink">
+      <mc:AlternateContent xmlns:mc="http://schemas.openxmlformats.org/markup-compatibility/2006" xmlns:p14="http://schemas.microsoft.com/office/powerpoint/2010/main" xmlns:aink="http://schemas.microsoft.com/office/drawing/2016/ink">
+        <mc:Choice Requires="p14 aink">
           <p:contentPart p14:bwMode="auto" r:id="rId24">
             <p14:nvContentPartPr>
               <p14:cNvPr id="15" name="Ink 14">
@@ -6202,7 +5991,7 @@
             </p14:xfrm>
           </p:contentPart>
         </mc:Choice>
-        <mc:Fallback>
+        <mc:Fallback xmlns="">
           <p:pic>
             <p:nvPicPr>
               <p:cNvPr id="15" name="Ink 14">
@@ -6233,8 +6022,8 @@
           </p:pic>
         </mc:Fallback>
       </mc:AlternateContent>
-      <mc:AlternateContent xmlns:mc="http://schemas.openxmlformats.org/markup-compatibility/2006">
-        <mc:Choice xmlns:p14="http://schemas.microsoft.com/office/powerpoint/2010/main" xmlns:aink="http://schemas.microsoft.com/office/drawing/2016/ink" Requires="p14 aink">
+      <mc:AlternateContent xmlns:mc="http://schemas.openxmlformats.org/markup-compatibility/2006" xmlns:p14="http://schemas.microsoft.com/office/powerpoint/2010/main" xmlns:aink="http://schemas.microsoft.com/office/drawing/2016/ink">
+        <mc:Choice Requires="p14 aink">
           <p:contentPart p14:bwMode="auto" r:id="rId26">
             <p14:nvContentPartPr>
               <p14:cNvPr id="16" name="Ink 15">
@@ -6253,7 +6042,7 @@
             </p14:xfrm>
           </p:contentPart>
         </mc:Choice>
-        <mc:Fallback>
+        <mc:Fallback xmlns="">
           <p:pic>
             <p:nvPicPr>
               <p:cNvPr id="16" name="Ink 15">
@@ -6284,8 +6073,8 @@
           </p:pic>
         </mc:Fallback>
       </mc:AlternateContent>
-      <mc:AlternateContent xmlns:mc="http://schemas.openxmlformats.org/markup-compatibility/2006">
-        <mc:Choice xmlns:p14="http://schemas.microsoft.com/office/powerpoint/2010/main" xmlns:aink="http://schemas.microsoft.com/office/drawing/2016/ink" Requires="p14 aink">
+      <mc:AlternateContent xmlns:mc="http://schemas.openxmlformats.org/markup-compatibility/2006" xmlns:p14="http://schemas.microsoft.com/office/powerpoint/2010/main" xmlns:aink="http://schemas.microsoft.com/office/drawing/2016/ink">
+        <mc:Choice Requires="p14 aink">
           <p:contentPart p14:bwMode="auto" r:id="rId28">
             <p14:nvContentPartPr>
               <p14:cNvPr id="17" name="Ink 16">
@@ -6304,7 +6093,7 @@
             </p14:xfrm>
           </p:contentPart>
         </mc:Choice>
-        <mc:Fallback>
+        <mc:Fallback xmlns="">
           <p:pic>
             <p:nvPicPr>
               <p:cNvPr id="17" name="Ink 16">
@@ -6335,60 +6124,9 @@
           </p:pic>
         </mc:Fallback>
       </mc:AlternateContent>
-      <mc:AlternateContent xmlns:mc="http://schemas.openxmlformats.org/markup-compatibility/2006">
-        <mc:Choice xmlns:p14="http://schemas.microsoft.com/office/powerpoint/2010/main" xmlns:aink="http://schemas.microsoft.com/office/drawing/2016/ink" Requires="p14 aink">
+      <mc:AlternateContent xmlns:mc="http://schemas.openxmlformats.org/markup-compatibility/2006" xmlns:p14="http://schemas.microsoft.com/office/powerpoint/2010/main" xmlns:aink="http://schemas.microsoft.com/office/drawing/2016/ink">
+        <mc:Choice Requires="p14 aink">
           <p:contentPart p14:bwMode="auto" r:id="rId30">
-            <p14:nvContentPartPr>
-              <p14:cNvPr id="18" name="Ink 17">
-                <a:extLst>
-                  <a:ext uri="{FF2B5EF4-FFF2-40B4-BE49-F238E27FC236}">
-                    <a16:creationId xmlns:a16="http://schemas.microsoft.com/office/drawing/2014/main" id="{1EBCBE75-201F-47F6-96D9-CEFF2DDEE258}"/>
-                  </a:ext>
-                </a:extLst>
-              </p14:cNvPr>
-              <p14:cNvContentPartPr/>
-              <p14:nvPr/>
-            </p14:nvContentPartPr>
-            <p14:xfrm>
-              <a:off x="2495786" y="1859948"/>
-              <a:ext cx="349200" cy="522720"/>
-            </p14:xfrm>
-          </p:contentPart>
-        </mc:Choice>
-        <mc:Fallback>
-          <p:pic>
-            <p:nvPicPr>
-              <p:cNvPr id="18" name="Ink 17">
-                <a:extLst>
-                  <a:ext uri="{FF2B5EF4-FFF2-40B4-BE49-F238E27FC236}">
-                    <a16:creationId xmlns:a16="http://schemas.microsoft.com/office/drawing/2014/main" id="{1EBCBE75-201F-47F6-96D9-CEFF2DDEE258}"/>
-                  </a:ext>
-                </a:extLst>
-              </p:cNvPr>
-              <p:cNvPicPr/>
-              <p:nvPr/>
-            </p:nvPicPr>
-            <p:blipFill>
-              <a:blip r:embed="rId31"/>
-              <a:stretch>
-                <a:fillRect/>
-              </a:stretch>
-            </p:blipFill>
-            <p:spPr>
-              <a:xfrm>
-                <a:off x="2477786" y="1842308"/>
-                <a:ext cx="384840" cy="558360"/>
-              </a:xfrm>
-              <a:prstGeom prst="rect">
-                <a:avLst/>
-              </a:prstGeom>
-            </p:spPr>
-          </p:pic>
-        </mc:Fallback>
-      </mc:AlternateContent>
-      <mc:AlternateContent xmlns:mc="http://schemas.openxmlformats.org/markup-compatibility/2006">
-        <mc:Choice xmlns:p14="http://schemas.microsoft.com/office/powerpoint/2010/main" xmlns:aink="http://schemas.microsoft.com/office/drawing/2016/ink" Requires="p14 aink">
-          <p:contentPart p14:bwMode="auto" r:id="rId32">
             <p14:nvContentPartPr>
               <p14:cNvPr id="19" name="Ink 18">
                 <a:extLst>
@@ -6406,7 +6144,7 @@
             </p14:xfrm>
           </p:contentPart>
         </mc:Choice>
-        <mc:Fallback>
+        <mc:Fallback xmlns="">
           <p:pic>
             <p:nvPicPr>
               <p:cNvPr id="19" name="Ink 18">
@@ -6437,8 +6175,8 @@
           </p:pic>
         </mc:Fallback>
       </mc:AlternateContent>
-      <mc:AlternateContent xmlns:mc="http://schemas.openxmlformats.org/markup-compatibility/2006">
-        <mc:Choice xmlns:p14="http://schemas.microsoft.com/office/powerpoint/2010/main" xmlns:aink="http://schemas.microsoft.com/office/drawing/2016/ink" Requires="p14 aink">
+      <mc:AlternateContent xmlns:mc="http://schemas.openxmlformats.org/markup-compatibility/2006" xmlns:p14="http://schemas.microsoft.com/office/powerpoint/2010/main" xmlns:aink="http://schemas.microsoft.com/office/drawing/2016/ink">
+        <mc:Choice Requires="p14 aink">
           <p:contentPart p14:bwMode="auto" r:id="rId34">
             <p14:nvContentPartPr>
               <p14:cNvPr id="20" name="Ink 19">
@@ -6457,7 +6195,7 @@
             </p14:xfrm>
           </p:contentPart>
         </mc:Choice>
-        <mc:Fallback>
+        <mc:Fallback xmlns="">
           <p:pic>
             <p:nvPicPr>
               <p:cNvPr id="20" name="Ink 19">
@@ -6488,8 +6226,8 @@
           </p:pic>
         </mc:Fallback>
       </mc:AlternateContent>
-      <mc:AlternateContent xmlns:mc="http://schemas.openxmlformats.org/markup-compatibility/2006">
-        <mc:Choice xmlns:p14="http://schemas.microsoft.com/office/powerpoint/2010/main" xmlns:aink="http://schemas.microsoft.com/office/drawing/2016/ink" Requires="p14 aink">
+      <mc:AlternateContent xmlns:mc="http://schemas.openxmlformats.org/markup-compatibility/2006" xmlns:p14="http://schemas.microsoft.com/office/powerpoint/2010/main" xmlns:aink="http://schemas.microsoft.com/office/drawing/2016/ink">
+        <mc:Choice Requires="p14 aink">
           <p:contentPart p14:bwMode="auto" r:id="rId36">
             <p14:nvContentPartPr>
               <p14:cNvPr id="21" name="Ink 20">
@@ -6508,7 +6246,7 @@
             </p14:xfrm>
           </p:contentPart>
         </mc:Choice>
-        <mc:Fallback>
+        <mc:Fallback xmlns="">
           <p:pic>
             <p:nvPicPr>
               <p:cNvPr id="21" name="Ink 20">
@@ -6539,8 +6277,8 @@
           </p:pic>
         </mc:Fallback>
       </mc:AlternateContent>
-      <mc:AlternateContent xmlns:mc="http://schemas.openxmlformats.org/markup-compatibility/2006">
-        <mc:Choice xmlns:p14="http://schemas.microsoft.com/office/powerpoint/2010/main" xmlns:aink="http://schemas.microsoft.com/office/drawing/2016/ink" Requires="p14 aink">
+      <mc:AlternateContent xmlns:mc="http://schemas.openxmlformats.org/markup-compatibility/2006" xmlns:p14="http://schemas.microsoft.com/office/powerpoint/2010/main" xmlns:aink="http://schemas.microsoft.com/office/drawing/2016/ink">
+        <mc:Choice Requires="p14 aink">
           <p:contentPart p14:bwMode="auto" r:id="rId38">
             <p14:nvContentPartPr>
               <p14:cNvPr id="22" name="Ink 21">
@@ -6559,7 +6297,7 @@
             </p14:xfrm>
           </p:contentPart>
         </mc:Choice>
-        <mc:Fallback>
+        <mc:Fallback xmlns="">
           <p:pic>
             <p:nvPicPr>
               <p:cNvPr id="22" name="Ink 21">
@@ -6590,8 +6328,8 @@
           </p:pic>
         </mc:Fallback>
       </mc:AlternateContent>
-      <mc:AlternateContent xmlns:mc="http://schemas.openxmlformats.org/markup-compatibility/2006">
-        <mc:Choice xmlns:p14="http://schemas.microsoft.com/office/powerpoint/2010/main" xmlns:aink="http://schemas.microsoft.com/office/drawing/2016/ink" Requires="p14 aink">
+      <mc:AlternateContent xmlns:mc="http://schemas.openxmlformats.org/markup-compatibility/2006" xmlns:p14="http://schemas.microsoft.com/office/powerpoint/2010/main" xmlns:aink="http://schemas.microsoft.com/office/drawing/2016/ink">
+        <mc:Choice Requires="p14 aink">
           <p:contentPart p14:bwMode="auto" r:id="rId40">
             <p14:nvContentPartPr>
               <p14:cNvPr id="23" name="Ink 22">
@@ -6610,7 +6348,7 @@
             </p14:xfrm>
           </p:contentPart>
         </mc:Choice>
-        <mc:Fallback>
+        <mc:Fallback xmlns="">
           <p:pic>
             <p:nvPicPr>
               <p:cNvPr id="23" name="Ink 22">
@@ -6641,8 +6379,8 @@
           </p:pic>
         </mc:Fallback>
       </mc:AlternateContent>
-      <mc:AlternateContent xmlns:mc="http://schemas.openxmlformats.org/markup-compatibility/2006">
-        <mc:Choice xmlns:p14="http://schemas.microsoft.com/office/powerpoint/2010/main" xmlns:aink="http://schemas.microsoft.com/office/drawing/2016/ink" Requires="p14 aink">
+      <mc:AlternateContent xmlns:mc="http://schemas.openxmlformats.org/markup-compatibility/2006" xmlns:p14="http://schemas.microsoft.com/office/powerpoint/2010/main" xmlns:aink="http://schemas.microsoft.com/office/drawing/2016/ink">
+        <mc:Choice Requires="p14 aink">
           <p:contentPart p14:bwMode="auto" r:id="rId42">
             <p14:nvContentPartPr>
               <p14:cNvPr id="24" name="Ink 23">
@@ -6661,7 +6399,7 @@
             </p14:xfrm>
           </p:contentPart>
         </mc:Choice>
-        <mc:Fallback>
+        <mc:Fallback xmlns="">
           <p:pic>
             <p:nvPicPr>
               <p:cNvPr id="24" name="Ink 23">
@@ -6692,8 +6430,8 @@
           </p:pic>
         </mc:Fallback>
       </mc:AlternateContent>
-      <mc:AlternateContent xmlns:mc="http://schemas.openxmlformats.org/markup-compatibility/2006">
-        <mc:Choice xmlns:p14="http://schemas.microsoft.com/office/powerpoint/2010/main" xmlns:aink="http://schemas.microsoft.com/office/drawing/2016/ink" Requires="p14 aink">
+      <mc:AlternateContent xmlns:mc="http://schemas.openxmlformats.org/markup-compatibility/2006" xmlns:p14="http://schemas.microsoft.com/office/powerpoint/2010/main" xmlns:aink="http://schemas.microsoft.com/office/drawing/2016/ink">
+        <mc:Choice Requires="p14 aink">
           <p:contentPart p14:bwMode="auto" r:id="rId44">
             <p14:nvContentPartPr>
               <p14:cNvPr id="25" name="Ink 24">
@@ -6712,7 +6450,7 @@
             </p14:xfrm>
           </p:contentPart>
         </mc:Choice>
-        <mc:Fallback>
+        <mc:Fallback xmlns="">
           <p:pic>
             <p:nvPicPr>
               <p:cNvPr id="25" name="Ink 24">
@@ -6743,8 +6481,8 @@
           </p:pic>
         </mc:Fallback>
       </mc:AlternateContent>
-      <mc:AlternateContent xmlns:mc="http://schemas.openxmlformats.org/markup-compatibility/2006">
-        <mc:Choice xmlns:p14="http://schemas.microsoft.com/office/powerpoint/2010/main" xmlns:aink="http://schemas.microsoft.com/office/drawing/2016/ink" Requires="p14 aink">
+      <mc:AlternateContent xmlns:mc="http://schemas.openxmlformats.org/markup-compatibility/2006" xmlns:p14="http://schemas.microsoft.com/office/powerpoint/2010/main" xmlns:aink="http://schemas.microsoft.com/office/drawing/2016/ink">
+        <mc:Choice Requires="p14 aink">
           <p:contentPart p14:bwMode="auto" r:id="rId46">
             <p14:nvContentPartPr>
               <p14:cNvPr id="26" name="Ink 25">
@@ -6763,7 +6501,7 @@
             </p14:xfrm>
           </p:contentPart>
         </mc:Choice>
-        <mc:Fallback>
+        <mc:Fallback xmlns="">
           <p:pic>
             <p:nvPicPr>
               <p:cNvPr id="26" name="Ink 25">
@@ -6794,8 +6532,8 @@
           </p:pic>
         </mc:Fallback>
       </mc:AlternateContent>
-      <mc:AlternateContent xmlns:mc="http://schemas.openxmlformats.org/markup-compatibility/2006">
-        <mc:Choice xmlns:p14="http://schemas.microsoft.com/office/powerpoint/2010/main" xmlns:aink="http://schemas.microsoft.com/office/drawing/2016/ink" Requires="p14 aink">
+      <mc:AlternateContent xmlns:mc="http://schemas.openxmlformats.org/markup-compatibility/2006" xmlns:p14="http://schemas.microsoft.com/office/powerpoint/2010/main" xmlns:aink="http://schemas.microsoft.com/office/drawing/2016/ink">
+        <mc:Choice Requires="p14 aink">
           <p:contentPart p14:bwMode="auto" r:id="rId48">
             <p14:nvContentPartPr>
               <p14:cNvPr id="27" name="Ink 26">
@@ -6814,7 +6552,7 @@
             </p14:xfrm>
           </p:contentPart>
         </mc:Choice>
-        <mc:Fallback>
+        <mc:Fallback xmlns="">
           <p:pic>
             <p:nvPicPr>
               <p:cNvPr id="27" name="Ink 26">
@@ -6845,8 +6583,8 @@
           </p:pic>
         </mc:Fallback>
       </mc:AlternateContent>
-      <mc:AlternateContent xmlns:mc="http://schemas.openxmlformats.org/markup-compatibility/2006">
-        <mc:Choice xmlns:p14="http://schemas.microsoft.com/office/powerpoint/2010/main" xmlns:aink="http://schemas.microsoft.com/office/drawing/2016/ink" Requires="p14 aink">
+      <mc:AlternateContent xmlns:mc="http://schemas.openxmlformats.org/markup-compatibility/2006" xmlns:p14="http://schemas.microsoft.com/office/powerpoint/2010/main" xmlns:aink="http://schemas.microsoft.com/office/drawing/2016/ink">
+        <mc:Choice Requires="p14 aink">
           <p:contentPart p14:bwMode="auto" r:id="rId50">
             <p14:nvContentPartPr>
               <p14:cNvPr id="28" name="Ink 27">
@@ -6865,7 +6603,7 @@
             </p14:xfrm>
           </p:contentPart>
         </mc:Choice>
-        <mc:Fallback>
+        <mc:Fallback xmlns="">
           <p:pic>
             <p:nvPicPr>
               <p:cNvPr id="28" name="Ink 27">
@@ -6896,8 +6634,8 @@
           </p:pic>
         </mc:Fallback>
       </mc:AlternateContent>
-      <mc:AlternateContent xmlns:mc="http://schemas.openxmlformats.org/markup-compatibility/2006">
-        <mc:Choice xmlns:p14="http://schemas.microsoft.com/office/powerpoint/2010/main" xmlns:aink="http://schemas.microsoft.com/office/drawing/2016/ink" Requires="p14 aink">
+      <mc:AlternateContent xmlns:mc="http://schemas.openxmlformats.org/markup-compatibility/2006" xmlns:p14="http://schemas.microsoft.com/office/powerpoint/2010/main" xmlns:aink="http://schemas.microsoft.com/office/drawing/2016/ink">
+        <mc:Choice Requires="p14 aink">
           <p:contentPart p14:bwMode="auto" r:id="rId52">
             <p14:nvContentPartPr>
               <p14:cNvPr id="29" name="Ink 28">
@@ -6916,7 +6654,7 @@
             </p14:xfrm>
           </p:contentPart>
         </mc:Choice>
-        <mc:Fallback>
+        <mc:Fallback xmlns="">
           <p:pic>
             <p:nvPicPr>
               <p:cNvPr id="29" name="Ink 28">
@@ -6947,8 +6685,8 @@
           </p:pic>
         </mc:Fallback>
       </mc:AlternateContent>
-      <mc:AlternateContent xmlns:mc="http://schemas.openxmlformats.org/markup-compatibility/2006">
-        <mc:Choice xmlns:p14="http://schemas.microsoft.com/office/powerpoint/2010/main" xmlns:aink="http://schemas.microsoft.com/office/drawing/2016/ink" Requires="p14 aink">
+      <mc:AlternateContent xmlns:mc="http://schemas.openxmlformats.org/markup-compatibility/2006" xmlns:p14="http://schemas.microsoft.com/office/powerpoint/2010/main" xmlns:aink="http://schemas.microsoft.com/office/drawing/2016/ink">
+        <mc:Choice Requires="p14 aink">
           <p:contentPart p14:bwMode="auto" r:id="rId54">
             <p14:nvContentPartPr>
               <p14:cNvPr id="30" name="Ink 29">
@@ -6967,7 +6705,7 @@
             </p14:xfrm>
           </p:contentPart>
         </mc:Choice>
-        <mc:Fallback>
+        <mc:Fallback xmlns="">
           <p:pic>
             <p:nvPicPr>
               <p:cNvPr id="30" name="Ink 29">
@@ -6998,8 +6736,8 @@
           </p:pic>
         </mc:Fallback>
       </mc:AlternateContent>
-      <mc:AlternateContent xmlns:mc="http://schemas.openxmlformats.org/markup-compatibility/2006">
-        <mc:Choice xmlns:p14="http://schemas.microsoft.com/office/powerpoint/2010/main" xmlns:aink="http://schemas.microsoft.com/office/drawing/2016/ink" Requires="p14 aink">
+      <mc:AlternateContent xmlns:mc="http://schemas.openxmlformats.org/markup-compatibility/2006" xmlns:p14="http://schemas.microsoft.com/office/powerpoint/2010/main" xmlns:aink="http://schemas.microsoft.com/office/drawing/2016/ink">
+        <mc:Choice Requires="p14 aink">
           <p:contentPart p14:bwMode="auto" r:id="rId56">
             <p14:nvContentPartPr>
               <p14:cNvPr id="31" name="Ink 30">
@@ -7018,7 +6756,7 @@
             </p14:xfrm>
           </p:contentPart>
         </mc:Choice>
-        <mc:Fallback>
+        <mc:Fallback xmlns="">
           <p:pic>
             <p:nvPicPr>
               <p:cNvPr id="31" name="Ink 30">
@@ -7049,8 +6787,8 @@
           </p:pic>
         </mc:Fallback>
       </mc:AlternateContent>
-      <mc:AlternateContent xmlns:mc="http://schemas.openxmlformats.org/markup-compatibility/2006">
-        <mc:Choice xmlns:p14="http://schemas.microsoft.com/office/powerpoint/2010/main" xmlns:aink="http://schemas.microsoft.com/office/drawing/2016/ink" Requires="p14 aink">
+      <mc:AlternateContent xmlns:mc="http://schemas.openxmlformats.org/markup-compatibility/2006" xmlns:p14="http://schemas.microsoft.com/office/powerpoint/2010/main" xmlns:aink="http://schemas.microsoft.com/office/drawing/2016/ink">
+        <mc:Choice Requires="p14 aink">
           <p:contentPart p14:bwMode="auto" r:id="rId58">
             <p14:nvContentPartPr>
               <p14:cNvPr id="32" name="Ink 31">
@@ -7069,7 +6807,7 @@
             </p14:xfrm>
           </p:contentPart>
         </mc:Choice>
-        <mc:Fallback>
+        <mc:Fallback xmlns="">
           <p:pic>
             <p:nvPicPr>
               <p:cNvPr id="32" name="Ink 31">
@@ -7100,8 +6838,8 @@
           </p:pic>
         </mc:Fallback>
       </mc:AlternateContent>
-      <mc:AlternateContent xmlns:mc="http://schemas.openxmlformats.org/markup-compatibility/2006">
-        <mc:Choice xmlns:p14="http://schemas.microsoft.com/office/powerpoint/2010/main" xmlns:aink="http://schemas.microsoft.com/office/drawing/2016/ink" Requires="p14 aink">
+      <mc:AlternateContent xmlns:mc="http://schemas.openxmlformats.org/markup-compatibility/2006" xmlns:p14="http://schemas.microsoft.com/office/powerpoint/2010/main" xmlns:aink="http://schemas.microsoft.com/office/drawing/2016/ink">
+        <mc:Choice Requires="p14 aink">
           <p:contentPart p14:bwMode="auto" r:id="rId60">
             <p14:nvContentPartPr>
               <p14:cNvPr id="33" name="Ink 32">
@@ -7120,7 +6858,7 @@
             </p14:xfrm>
           </p:contentPart>
         </mc:Choice>
-        <mc:Fallback>
+        <mc:Fallback xmlns="">
           <p:pic>
             <p:nvPicPr>
               <p:cNvPr id="33" name="Ink 32">
@@ -7151,8 +6889,8 @@
           </p:pic>
         </mc:Fallback>
       </mc:AlternateContent>
-      <mc:AlternateContent xmlns:mc="http://schemas.openxmlformats.org/markup-compatibility/2006">
-        <mc:Choice xmlns:p14="http://schemas.microsoft.com/office/powerpoint/2010/main" xmlns:aink="http://schemas.microsoft.com/office/drawing/2016/ink" Requires="p14 aink">
+      <mc:AlternateContent xmlns:mc="http://schemas.openxmlformats.org/markup-compatibility/2006" xmlns:p14="http://schemas.microsoft.com/office/powerpoint/2010/main" xmlns:aink="http://schemas.microsoft.com/office/drawing/2016/ink">
+        <mc:Choice Requires="p14 aink">
           <p:contentPart p14:bwMode="auto" r:id="rId62">
             <p14:nvContentPartPr>
               <p14:cNvPr id="34" name="Ink 33">
@@ -7171,7 +6909,7 @@
             </p14:xfrm>
           </p:contentPart>
         </mc:Choice>
-        <mc:Fallback>
+        <mc:Fallback xmlns="">
           <p:pic>
             <p:nvPicPr>
               <p:cNvPr id="34" name="Ink 33">
@@ -7202,8 +6940,8 @@
           </p:pic>
         </mc:Fallback>
       </mc:AlternateContent>
-      <mc:AlternateContent xmlns:mc="http://schemas.openxmlformats.org/markup-compatibility/2006">
-        <mc:Choice xmlns:p14="http://schemas.microsoft.com/office/powerpoint/2010/main" xmlns:aink="http://schemas.microsoft.com/office/drawing/2016/ink" Requires="p14 aink">
+      <mc:AlternateContent xmlns:mc="http://schemas.openxmlformats.org/markup-compatibility/2006" xmlns:p14="http://schemas.microsoft.com/office/powerpoint/2010/main" xmlns:aink="http://schemas.microsoft.com/office/drawing/2016/ink">
+        <mc:Choice Requires="p14 aink">
           <p:contentPart p14:bwMode="auto" r:id="rId64">
             <p14:nvContentPartPr>
               <p14:cNvPr id="35" name="Ink 34">
@@ -7222,7 +6960,7 @@
             </p14:xfrm>
           </p:contentPart>
         </mc:Choice>
-        <mc:Fallback>
+        <mc:Fallback xmlns="">
           <p:pic>
             <p:nvPicPr>
               <p:cNvPr id="35" name="Ink 34">
@@ -7253,8 +6991,8 @@
           </p:pic>
         </mc:Fallback>
       </mc:AlternateContent>
-      <mc:AlternateContent xmlns:mc="http://schemas.openxmlformats.org/markup-compatibility/2006">
-        <mc:Choice xmlns:p14="http://schemas.microsoft.com/office/powerpoint/2010/main" xmlns:aink="http://schemas.microsoft.com/office/drawing/2016/ink" Requires="p14 aink">
+      <mc:AlternateContent xmlns:mc="http://schemas.openxmlformats.org/markup-compatibility/2006" xmlns:p14="http://schemas.microsoft.com/office/powerpoint/2010/main" xmlns:aink="http://schemas.microsoft.com/office/drawing/2016/ink">
+        <mc:Choice Requires="p14 aink">
           <p:contentPart p14:bwMode="auto" r:id="rId66">
             <p14:nvContentPartPr>
               <p14:cNvPr id="36" name="Ink 35">
@@ -7273,7 +7011,7 @@
             </p14:xfrm>
           </p:contentPart>
         </mc:Choice>
-        <mc:Fallback>
+        <mc:Fallback xmlns="">
           <p:pic>
             <p:nvPicPr>
               <p:cNvPr id="36" name="Ink 35">
@@ -7304,8 +7042,8 @@
           </p:pic>
         </mc:Fallback>
       </mc:AlternateContent>
-      <mc:AlternateContent xmlns:mc="http://schemas.openxmlformats.org/markup-compatibility/2006">
-        <mc:Choice xmlns:p14="http://schemas.microsoft.com/office/powerpoint/2010/main" xmlns:aink="http://schemas.microsoft.com/office/drawing/2016/ink" Requires="p14 aink">
+      <mc:AlternateContent xmlns:mc="http://schemas.openxmlformats.org/markup-compatibility/2006" xmlns:p14="http://schemas.microsoft.com/office/powerpoint/2010/main" xmlns:aink="http://schemas.microsoft.com/office/drawing/2016/ink">
+        <mc:Choice Requires="p14 aink">
           <p:contentPart p14:bwMode="auto" r:id="rId68">
             <p14:nvContentPartPr>
               <p14:cNvPr id="37" name="Ink 36">
@@ -7324,7 +7062,7 @@
             </p14:xfrm>
           </p:contentPart>
         </mc:Choice>
-        <mc:Fallback>
+        <mc:Fallback xmlns="">
           <p:pic>
             <p:nvPicPr>
               <p:cNvPr id="37" name="Ink 36">
@@ -7355,8 +7093,8 @@
           </p:pic>
         </mc:Fallback>
       </mc:AlternateContent>
-      <mc:AlternateContent xmlns:mc="http://schemas.openxmlformats.org/markup-compatibility/2006">
-        <mc:Choice xmlns:p14="http://schemas.microsoft.com/office/powerpoint/2010/main" xmlns:aink="http://schemas.microsoft.com/office/drawing/2016/ink" Requires="p14 aink">
+      <mc:AlternateContent xmlns:mc="http://schemas.openxmlformats.org/markup-compatibility/2006" xmlns:p14="http://schemas.microsoft.com/office/powerpoint/2010/main" xmlns:aink="http://schemas.microsoft.com/office/drawing/2016/ink">
+        <mc:Choice Requires="p14 aink">
           <p:contentPart p14:bwMode="auto" r:id="rId70">
             <p14:nvContentPartPr>
               <p14:cNvPr id="38" name="Ink 37">
@@ -7375,7 +7113,7 @@
             </p14:xfrm>
           </p:contentPart>
         </mc:Choice>
-        <mc:Fallback>
+        <mc:Fallback xmlns="">
           <p:pic>
             <p:nvPicPr>
               <p:cNvPr id="38" name="Ink 37">
@@ -7406,8 +7144,8 @@
           </p:pic>
         </mc:Fallback>
       </mc:AlternateContent>
-      <mc:AlternateContent xmlns:mc="http://schemas.openxmlformats.org/markup-compatibility/2006">
-        <mc:Choice xmlns:p14="http://schemas.microsoft.com/office/powerpoint/2010/main" xmlns:aink="http://schemas.microsoft.com/office/drawing/2016/ink" Requires="p14 aink">
+      <mc:AlternateContent xmlns:mc="http://schemas.openxmlformats.org/markup-compatibility/2006" xmlns:p14="http://schemas.microsoft.com/office/powerpoint/2010/main" xmlns:aink="http://schemas.microsoft.com/office/drawing/2016/ink">
+        <mc:Choice Requires="p14 aink">
           <p:contentPart p14:bwMode="auto" r:id="rId72">
             <p14:nvContentPartPr>
               <p14:cNvPr id="39" name="Ink 38">
@@ -7426,7 +7164,7 @@
             </p14:xfrm>
           </p:contentPart>
         </mc:Choice>
-        <mc:Fallback>
+        <mc:Fallback xmlns="">
           <p:pic>
             <p:nvPicPr>
               <p:cNvPr id="39" name="Ink 38">
@@ -7457,8 +7195,8 @@
           </p:pic>
         </mc:Fallback>
       </mc:AlternateContent>
-      <mc:AlternateContent xmlns:mc="http://schemas.openxmlformats.org/markup-compatibility/2006">
-        <mc:Choice xmlns:p14="http://schemas.microsoft.com/office/powerpoint/2010/main" xmlns:aink="http://schemas.microsoft.com/office/drawing/2016/ink" Requires="p14 aink">
+      <mc:AlternateContent xmlns:mc="http://schemas.openxmlformats.org/markup-compatibility/2006" xmlns:p14="http://schemas.microsoft.com/office/powerpoint/2010/main" xmlns:aink="http://schemas.microsoft.com/office/drawing/2016/ink">
+        <mc:Choice Requires="p14 aink">
           <p:contentPart p14:bwMode="auto" r:id="rId74">
             <p14:nvContentPartPr>
               <p14:cNvPr id="40" name="Ink 39">
@@ -7477,7 +7215,7 @@
             </p14:xfrm>
           </p:contentPart>
         </mc:Choice>
-        <mc:Fallback>
+        <mc:Fallback xmlns="">
           <p:pic>
             <p:nvPicPr>
               <p:cNvPr id="40" name="Ink 39">
@@ -7508,8 +7246,8 @@
           </p:pic>
         </mc:Fallback>
       </mc:AlternateContent>
-      <mc:AlternateContent xmlns:mc="http://schemas.openxmlformats.org/markup-compatibility/2006">
-        <mc:Choice xmlns:p14="http://schemas.microsoft.com/office/powerpoint/2010/main" xmlns:aink="http://schemas.microsoft.com/office/drawing/2016/ink" Requires="p14 aink">
+      <mc:AlternateContent xmlns:mc="http://schemas.openxmlformats.org/markup-compatibility/2006" xmlns:p14="http://schemas.microsoft.com/office/powerpoint/2010/main" xmlns:aink="http://schemas.microsoft.com/office/drawing/2016/ink">
+        <mc:Choice Requires="p14 aink">
           <p:contentPart p14:bwMode="auto" r:id="rId76">
             <p14:nvContentPartPr>
               <p14:cNvPr id="41" name="Ink 40">
@@ -7528,7 +7266,7 @@
             </p14:xfrm>
           </p:contentPart>
         </mc:Choice>
-        <mc:Fallback>
+        <mc:Fallback xmlns="">
           <p:pic>
             <p:nvPicPr>
               <p:cNvPr id="41" name="Ink 40">
@@ -7559,8 +7297,8 @@
           </p:pic>
         </mc:Fallback>
       </mc:AlternateContent>
-      <mc:AlternateContent xmlns:mc="http://schemas.openxmlformats.org/markup-compatibility/2006">
-        <mc:Choice xmlns:p14="http://schemas.microsoft.com/office/powerpoint/2010/main" xmlns:aink="http://schemas.microsoft.com/office/drawing/2016/ink" Requires="p14 aink">
+      <mc:AlternateContent xmlns:mc="http://schemas.openxmlformats.org/markup-compatibility/2006" xmlns:p14="http://schemas.microsoft.com/office/powerpoint/2010/main" xmlns:aink="http://schemas.microsoft.com/office/drawing/2016/ink">
+        <mc:Choice Requires="p14 aink">
           <p:contentPart p14:bwMode="auto" r:id="rId78">
             <p14:nvContentPartPr>
               <p14:cNvPr id="42" name="Ink 41">
@@ -7579,7 +7317,7 @@
             </p14:xfrm>
           </p:contentPart>
         </mc:Choice>
-        <mc:Fallback>
+        <mc:Fallback xmlns="">
           <p:pic>
             <p:nvPicPr>
               <p:cNvPr id="42" name="Ink 41">
@@ -7610,8 +7348,8 @@
           </p:pic>
         </mc:Fallback>
       </mc:AlternateContent>
-      <mc:AlternateContent xmlns:mc="http://schemas.openxmlformats.org/markup-compatibility/2006">
-        <mc:Choice xmlns:p14="http://schemas.microsoft.com/office/powerpoint/2010/main" xmlns:aink="http://schemas.microsoft.com/office/drawing/2016/ink" Requires="p14 aink">
+      <mc:AlternateContent xmlns:mc="http://schemas.openxmlformats.org/markup-compatibility/2006" xmlns:p14="http://schemas.microsoft.com/office/powerpoint/2010/main" xmlns:aink="http://schemas.microsoft.com/office/drawing/2016/ink">
+        <mc:Choice Requires="p14 aink">
           <p:contentPart p14:bwMode="auto" r:id="rId80">
             <p14:nvContentPartPr>
               <p14:cNvPr id="43" name="Ink 42">
@@ -7630,7 +7368,7 @@
             </p14:xfrm>
           </p:contentPart>
         </mc:Choice>
-        <mc:Fallback>
+        <mc:Fallback xmlns="">
           <p:pic>
             <p:nvPicPr>
               <p:cNvPr id="43" name="Ink 42">
@@ -7661,8 +7399,8 @@
           </p:pic>
         </mc:Fallback>
       </mc:AlternateContent>
-      <mc:AlternateContent xmlns:mc="http://schemas.openxmlformats.org/markup-compatibility/2006">
-        <mc:Choice xmlns:p14="http://schemas.microsoft.com/office/powerpoint/2010/main" xmlns:aink="http://schemas.microsoft.com/office/drawing/2016/ink" Requires="p14 aink">
+      <mc:AlternateContent xmlns:mc="http://schemas.openxmlformats.org/markup-compatibility/2006" xmlns:p14="http://schemas.microsoft.com/office/powerpoint/2010/main" xmlns:aink="http://schemas.microsoft.com/office/drawing/2016/ink">
+        <mc:Choice Requires="p14 aink">
           <p:contentPart p14:bwMode="auto" r:id="rId82">
             <p14:nvContentPartPr>
               <p14:cNvPr id="44" name="Ink 43">
@@ -7681,7 +7419,7 @@
             </p14:xfrm>
           </p:contentPart>
         </mc:Choice>
-        <mc:Fallback>
+        <mc:Fallback xmlns="">
           <p:pic>
             <p:nvPicPr>
               <p:cNvPr id="44" name="Ink 43">
@@ -7712,8 +7450,8 @@
           </p:pic>
         </mc:Fallback>
       </mc:AlternateContent>
-      <mc:AlternateContent xmlns:mc="http://schemas.openxmlformats.org/markup-compatibility/2006">
-        <mc:Choice xmlns:p14="http://schemas.microsoft.com/office/powerpoint/2010/main" xmlns:aink="http://schemas.microsoft.com/office/drawing/2016/ink" Requires="p14 aink">
+      <mc:AlternateContent xmlns:mc="http://schemas.openxmlformats.org/markup-compatibility/2006" xmlns:p14="http://schemas.microsoft.com/office/powerpoint/2010/main" xmlns:aink="http://schemas.microsoft.com/office/drawing/2016/ink">
+        <mc:Choice Requires="p14 aink">
           <p:contentPart p14:bwMode="auto" r:id="rId84">
             <p14:nvContentPartPr>
               <p14:cNvPr id="45" name="Ink 44">
@@ -7732,7 +7470,7 @@
             </p14:xfrm>
           </p:contentPart>
         </mc:Choice>
-        <mc:Fallback>
+        <mc:Fallback xmlns="">
           <p:pic>
             <p:nvPicPr>
               <p:cNvPr id="45" name="Ink 44">
@@ -7763,8 +7501,8 @@
           </p:pic>
         </mc:Fallback>
       </mc:AlternateContent>
-      <mc:AlternateContent xmlns:mc="http://schemas.openxmlformats.org/markup-compatibility/2006">
-        <mc:Choice xmlns:p14="http://schemas.microsoft.com/office/powerpoint/2010/main" xmlns:aink="http://schemas.microsoft.com/office/drawing/2016/ink" Requires="p14 aink">
+      <mc:AlternateContent xmlns:mc="http://schemas.openxmlformats.org/markup-compatibility/2006" xmlns:p14="http://schemas.microsoft.com/office/powerpoint/2010/main" xmlns:aink="http://schemas.microsoft.com/office/drawing/2016/ink">
+        <mc:Choice Requires="p14 aink">
           <p:contentPart p14:bwMode="auto" r:id="rId86">
             <p14:nvContentPartPr>
               <p14:cNvPr id="46" name="Ink 45">
@@ -7783,7 +7521,7 @@
             </p14:xfrm>
           </p:contentPart>
         </mc:Choice>
-        <mc:Fallback>
+        <mc:Fallback xmlns="">
           <p:pic>
             <p:nvPicPr>
               <p:cNvPr id="46" name="Ink 45">
@@ -7814,8 +7552,8 @@
           </p:pic>
         </mc:Fallback>
       </mc:AlternateContent>
-      <mc:AlternateContent xmlns:mc="http://schemas.openxmlformats.org/markup-compatibility/2006">
-        <mc:Choice xmlns:p14="http://schemas.microsoft.com/office/powerpoint/2010/main" xmlns:aink="http://schemas.microsoft.com/office/drawing/2016/ink" Requires="p14 aink">
+      <mc:AlternateContent xmlns:mc="http://schemas.openxmlformats.org/markup-compatibility/2006" xmlns:p14="http://schemas.microsoft.com/office/powerpoint/2010/main" xmlns:aink="http://schemas.microsoft.com/office/drawing/2016/ink">
+        <mc:Choice Requires="p14 aink">
           <p:contentPart p14:bwMode="auto" r:id="rId88">
             <p14:nvContentPartPr>
               <p14:cNvPr id="47" name="Ink 46">
@@ -7834,7 +7572,7 @@
             </p14:xfrm>
           </p:contentPart>
         </mc:Choice>
-        <mc:Fallback>
+        <mc:Fallback xmlns="">
           <p:pic>
             <p:nvPicPr>
               <p:cNvPr id="47" name="Ink 46">
@@ -7865,8 +7603,8 @@
           </p:pic>
         </mc:Fallback>
       </mc:AlternateContent>
-      <mc:AlternateContent xmlns:mc="http://schemas.openxmlformats.org/markup-compatibility/2006">
-        <mc:Choice xmlns:p14="http://schemas.microsoft.com/office/powerpoint/2010/main" xmlns:aink="http://schemas.microsoft.com/office/drawing/2016/ink" Requires="p14 aink">
+      <mc:AlternateContent xmlns:mc="http://schemas.openxmlformats.org/markup-compatibility/2006" xmlns:p14="http://schemas.microsoft.com/office/powerpoint/2010/main" xmlns:aink="http://schemas.microsoft.com/office/drawing/2016/ink">
+        <mc:Choice Requires="p14 aink">
           <p:contentPart p14:bwMode="auto" r:id="rId90">
             <p14:nvContentPartPr>
               <p14:cNvPr id="48" name="Ink 47">
@@ -7885,7 +7623,7 @@
             </p14:xfrm>
           </p:contentPart>
         </mc:Choice>
-        <mc:Fallback>
+        <mc:Fallback xmlns="">
           <p:pic>
             <p:nvPicPr>
               <p:cNvPr id="48" name="Ink 47">
@@ -7916,8 +7654,8 @@
           </p:pic>
         </mc:Fallback>
       </mc:AlternateContent>
-      <mc:AlternateContent xmlns:mc="http://schemas.openxmlformats.org/markup-compatibility/2006">
-        <mc:Choice xmlns:p14="http://schemas.microsoft.com/office/powerpoint/2010/main" xmlns:aink="http://schemas.microsoft.com/office/drawing/2016/ink" Requires="p14 aink">
+      <mc:AlternateContent xmlns:mc="http://schemas.openxmlformats.org/markup-compatibility/2006" xmlns:p14="http://schemas.microsoft.com/office/powerpoint/2010/main" xmlns:aink="http://schemas.microsoft.com/office/drawing/2016/ink">
+        <mc:Choice Requires="p14 aink">
           <p:contentPart p14:bwMode="auto" r:id="rId92">
             <p14:nvContentPartPr>
               <p14:cNvPr id="49" name="Ink 48">
@@ -7936,7 +7674,7 @@
             </p14:xfrm>
           </p:contentPart>
         </mc:Choice>
-        <mc:Fallback>
+        <mc:Fallback xmlns="">
           <p:pic>
             <p:nvPicPr>
               <p:cNvPr id="49" name="Ink 48">
@@ -7967,8 +7705,8 @@
           </p:pic>
         </mc:Fallback>
       </mc:AlternateContent>
-      <mc:AlternateContent xmlns:mc="http://schemas.openxmlformats.org/markup-compatibility/2006">
-        <mc:Choice xmlns:p14="http://schemas.microsoft.com/office/powerpoint/2010/main" xmlns:aink="http://schemas.microsoft.com/office/drawing/2016/ink" Requires="p14 aink">
+      <mc:AlternateContent xmlns:mc="http://schemas.openxmlformats.org/markup-compatibility/2006" xmlns:p14="http://schemas.microsoft.com/office/powerpoint/2010/main" xmlns:aink="http://schemas.microsoft.com/office/drawing/2016/ink">
+        <mc:Choice Requires="p14 aink">
           <p:contentPart p14:bwMode="auto" r:id="rId94">
             <p14:nvContentPartPr>
               <p14:cNvPr id="50" name="Ink 49">
@@ -7987,7 +7725,7 @@
             </p14:xfrm>
           </p:contentPart>
         </mc:Choice>
-        <mc:Fallback>
+        <mc:Fallback xmlns="">
           <p:pic>
             <p:nvPicPr>
               <p:cNvPr id="50" name="Ink 49">
@@ -8018,8 +7756,8 @@
           </p:pic>
         </mc:Fallback>
       </mc:AlternateContent>
-      <mc:AlternateContent xmlns:mc="http://schemas.openxmlformats.org/markup-compatibility/2006">
-        <mc:Choice xmlns:p14="http://schemas.microsoft.com/office/powerpoint/2010/main" xmlns:aink="http://schemas.microsoft.com/office/drawing/2016/ink" Requires="p14 aink">
+      <mc:AlternateContent xmlns:mc="http://schemas.openxmlformats.org/markup-compatibility/2006" xmlns:p14="http://schemas.microsoft.com/office/powerpoint/2010/main" xmlns:aink="http://schemas.microsoft.com/office/drawing/2016/ink">
+        <mc:Choice Requires="p14 aink">
           <p:contentPart p14:bwMode="auto" r:id="rId96">
             <p14:nvContentPartPr>
               <p14:cNvPr id="51" name="Ink 50">
@@ -8038,7 +7776,7 @@
             </p14:xfrm>
           </p:contentPart>
         </mc:Choice>
-        <mc:Fallback>
+        <mc:Fallback xmlns="">
           <p:pic>
             <p:nvPicPr>
               <p:cNvPr id="51" name="Ink 50">
@@ -8069,8 +7807,8 @@
           </p:pic>
         </mc:Fallback>
       </mc:AlternateContent>
-      <mc:AlternateContent xmlns:mc="http://schemas.openxmlformats.org/markup-compatibility/2006">
-        <mc:Choice xmlns:p14="http://schemas.microsoft.com/office/powerpoint/2010/main" xmlns:aink="http://schemas.microsoft.com/office/drawing/2016/ink" Requires="p14 aink">
+      <mc:AlternateContent xmlns:mc="http://schemas.openxmlformats.org/markup-compatibility/2006" xmlns:p14="http://schemas.microsoft.com/office/powerpoint/2010/main" xmlns:aink="http://schemas.microsoft.com/office/drawing/2016/ink">
+        <mc:Choice Requires="p14 aink">
           <p:contentPart p14:bwMode="auto" r:id="rId98">
             <p14:nvContentPartPr>
               <p14:cNvPr id="52" name="Ink 51">
@@ -8089,7 +7827,7 @@
             </p14:xfrm>
           </p:contentPart>
         </mc:Choice>
-        <mc:Fallback>
+        <mc:Fallback xmlns="">
           <p:pic>
             <p:nvPicPr>
               <p:cNvPr id="52" name="Ink 51">
@@ -8120,8 +7858,8 @@
           </p:pic>
         </mc:Fallback>
       </mc:AlternateContent>
-      <mc:AlternateContent xmlns:mc="http://schemas.openxmlformats.org/markup-compatibility/2006">
-        <mc:Choice xmlns:p14="http://schemas.microsoft.com/office/powerpoint/2010/main" xmlns:aink="http://schemas.microsoft.com/office/drawing/2016/ink" Requires="p14 aink">
+      <mc:AlternateContent xmlns:mc="http://schemas.openxmlformats.org/markup-compatibility/2006" xmlns:p14="http://schemas.microsoft.com/office/powerpoint/2010/main" xmlns:aink="http://schemas.microsoft.com/office/drawing/2016/ink">
+        <mc:Choice Requires="p14 aink">
           <p:contentPart p14:bwMode="auto" r:id="rId100">
             <p14:nvContentPartPr>
               <p14:cNvPr id="53" name="Ink 52">
@@ -8140,7 +7878,7 @@
             </p14:xfrm>
           </p:contentPart>
         </mc:Choice>
-        <mc:Fallback>
+        <mc:Fallback xmlns="">
           <p:pic>
             <p:nvPicPr>
               <p:cNvPr id="53" name="Ink 52">
@@ -8171,8 +7909,8 @@
           </p:pic>
         </mc:Fallback>
       </mc:AlternateContent>
-      <mc:AlternateContent xmlns:mc="http://schemas.openxmlformats.org/markup-compatibility/2006">
-        <mc:Choice xmlns:p14="http://schemas.microsoft.com/office/powerpoint/2010/main" xmlns:aink="http://schemas.microsoft.com/office/drawing/2016/ink" Requires="p14 aink">
+      <mc:AlternateContent xmlns:mc="http://schemas.openxmlformats.org/markup-compatibility/2006" xmlns:p14="http://schemas.microsoft.com/office/powerpoint/2010/main" xmlns:aink="http://schemas.microsoft.com/office/drawing/2016/ink">
+        <mc:Choice Requires="p14 aink">
           <p:contentPart p14:bwMode="auto" r:id="rId102">
             <p14:nvContentPartPr>
               <p14:cNvPr id="54" name="Ink 53">
@@ -8191,7 +7929,7 @@
             </p14:xfrm>
           </p:contentPart>
         </mc:Choice>
-        <mc:Fallback>
+        <mc:Fallback xmlns="">
           <p:pic>
             <p:nvPicPr>
               <p:cNvPr id="54" name="Ink 53">
@@ -8222,8 +7960,8 @@
           </p:pic>
         </mc:Fallback>
       </mc:AlternateContent>
-      <mc:AlternateContent xmlns:mc="http://schemas.openxmlformats.org/markup-compatibility/2006">
-        <mc:Choice xmlns:p14="http://schemas.microsoft.com/office/powerpoint/2010/main" xmlns:aink="http://schemas.microsoft.com/office/drawing/2016/ink" Requires="p14 aink">
+      <mc:AlternateContent xmlns:mc="http://schemas.openxmlformats.org/markup-compatibility/2006" xmlns:p14="http://schemas.microsoft.com/office/powerpoint/2010/main" xmlns:aink="http://schemas.microsoft.com/office/drawing/2016/ink">
+        <mc:Choice Requires="p14 aink">
           <p:contentPart p14:bwMode="auto" r:id="rId104">
             <p14:nvContentPartPr>
               <p14:cNvPr id="55" name="Ink 54">
@@ -8242,7 +7980,7 @@
             </p14:xfrm>
           </p:contentPart>
         </mc:Choice>
-        <mc:Fallback>
+        <mc:Fallback xmlns="">
           <p:pic>
             <p:nvPicPr>
               <p:cNvPr id="55" name="Ink 54">
@@ -8273,8 +8011,8 @@
           </p:pic>
         </mc:Fallback>
       </mc:AlternateContent>
-      <mc:AlternateContent xmlns:mc="http://schemas.openxmlformats.org/markup-compatibility/2006">
-        <mc:Choice xmlns:p14="http://schemas.microsoft.com/office/powerpoint/2010/main" xmlns:aink="http://schemas.microsoft.com/office/drawing/2016/ink" Requires="p14 aink">
+      <mc:AlternateContent xmlns:mc="http://schemas.openxmlformats.org/markup-compatibility/2006" xmlns:p14="http://schemas.microsoft.com/office/powerpoint/2010/main" xmlns:aink="http://schemas.microsoft.com/office/drawing/2016/ink">
+        <mc:Choice Requires="p14 aink">
           <p:contentPart p14:bwMode="auto" r:id="rId106">
             <p14:nvContentPartPr>
               <p14:cNvPr id="56" name="Ink 55">
@@ -8293,7 +8031,7 @@
             </p14:xfrm>
           </p:contentPart>
         </mc:Choice>
-        <mc:Fallback>
+        <mc:Fallback xmlns="">
           <p:pic>
             <p:nvPicPr>
               <p:cNvPr id="56" name="Ink 55">
@@ -8324,8 +8062,8 @@
           </p:pic>
         </mc:Fallback>
       </mc:AlternateContent>
-      <mc:AlternateContent xmlns:mc="http://schemas.openxmlformats.org/markup-compatibility/2006">
-        <mc:Choice xmlns:p14="http://schemas.microsoft.com/office/powerpoint/2010/main" xmlns:aink="http://schemas.microsoft.com/office/drawing/2016/ink" Requires="p14 aink">
+      <mc:AlternateContent xmlns:mc="http://schemas.openxmlformats.org/markup-compatibility/2006" xmlns:p14="http://schemas.microsoft.com/office/powerpoint/2010/main" xmlns:aink="http://schemas.microsoft.com/office/drawing/2016/ink">
+        <mc:Choice Requires="p14 aink">
           <p:contentPart p14:bwMode="auto" r:id="rId108">
             <p14:nvContentPartPr>
               <p14:cNvPr id="57" name="Ink 56">
@@ -8344,7 +8082,7 @@
             </p14:xfrm>
           </p:contentPart>
         </mc:Choice>
-        <mc:Fallback>
+        <mc:Fallback xmlns="">
           <p:pic>
             <p:nvPicPr>
               <p:cNvPr id="57" name="Ink 56">
@@ -8375,366 +8113,9 @@
           </p:pic>
         </mc:Fallback>
       </mc:AlternateContent>
-      <mc:AlternateContent xmlns:mc="http://schemas.openxmlformats.org/markup-compatibility/2006">
-        <mc:Choice xmlns:p14="http://schemas.microsoft.com/office/powerpoint/2010/main" xmlns:aink="http://schemas.microsoft.com/office/drawing/2016/ink" Requires="p14 aink">
+      <mc:AlternateContent xmlns:mc="http://schemas.openxmlformats.org/markup-compatibility/2006" xmlns:p14="http://schemas.microsoft.com/office/powerpoint/2010/main">
+        <mc:Choice Requires="p14">
           <p:contentPart p14:bwMode="auto" r:id="rId110">
-            <p14:nvContentPartPr>
-              <p14:cNvPr id="58" name="Ink 57">
-                <a:extLst>
-                  <a:ext uri="{FF2B5EF4-FFF2-40B4-BE49-F238E27FC236}">
-                    <a16:creationId xmlns:a16="http://schemas.microsoft.com/office/drawing/2014/main" id="{56F63A00-6B87-4AF6-824B-CE5FFCBA76E4}"/>
-                  </a:ext>
-                </a:extLst>
-              </p14:cNvPr>
-              <p14:cNvContentPartPr/>
-              <p14:nvPr/>
-            </p14:nvContentPartPr>
-            <p14:xfrm>
-              <a:off x="5513306" y="1434428"/>
-              <a:ext cx="108360" cy="119520"/>
-            </p14:xfrm>
-          </p:contentPart>
-        </mc:Choice>
-        <mc:Fallback>
-          <p:pic>
-            <p:nvPicPr>
-              <p:cNvPr id="58" name="Ink 57">
-                <a:extLst>
-                  <a:ext uri="{FF2B5EF4-FFF2-40B4-BE49-F238E27FC236}">
-                    <a16:creationId xmlns:a16="http://schemas.microsoft.com/office/drawing/2014/main" id="{56F63A00-6B87-4AF6-824B-CE5FFCBA76E4}"/>
-                  </a:ext>
-                </a:extLst>
-              </p:cNvPr>
-              <p:cNvPicPr/>
-              <p:nvPr/>
-            </p:nvPicPr>
-            <p:blipFill>
-              <a:blip r:embed="rId111"/>
-              <a:stretch>
-                <a:fillRect/>
-              </a:stretch>
-            </p:blipFill>
-            <p:spPr>
-              <a:xfrm>
-                <a:off x="5495306" y="1416428"/>
-                <a:ext cx="144000" cy="155160"/>
-              </a:xfrm>
-              <a:prstGeom prst="rect">
-                <a:avLst/>
-              </a:prstGeom>
-            </p:spPr>
-          </p:pic>
-        </mc:Fallback>
-      </mc:AlternateContent>
-      <mc:AlternateContent xmlns:mc="http://schemas.openxmlformats.org/markup-compatibility/2006">
-        <mc:Choice xmlns:p14="http://schemas.microsoft.com/office/powerpoint/2010/main" xmlns:aink="http://schemas.microsoft.com/office/drawing/2016/ink" Requires="p14 aink">
-          <p:contentPart p14:bwMode="auto" r:id="rId112">
-            <p14:nvContentPartPr>
-              <p14:cNvPr id="59" name="Ink 58">
-                <a:extLst>
-                  <a:ext uri="{FF2B5EF4-FFF2-40B4-BE49-F238E27FC236}">
-                    <a16:creationId xmlns:a16="http://schemas.microsoft.com/office/drawing/2014/main" id="{74CB92D3-611A-4935-AE37-CECEE94817A0}"/>
-                  </a:ext>
-                </a:extLst>
-              </p14:cNvPr>
-              <p14:cNvContentPartPr/>
-              <p14:nvPr/>
-            </p14:nvContentPartPr>
-            <p14:xfrm>
-              <a:off x="5544266" y="1669508"/>
-              <a:ext cx="184680" cy="101520"/>
-            </p14:xfrm>
-          </p:contentPart>
-        </mc:Choice>
-        <mc:Fallback>
-          <p:pic>
-            <p:nvPicPr>
-              <p:cNvPr id="59" name="Ink 58">
-                <a:extLst>
-                  <a:ext uri="{FF2B5EF4-FFF2-40B4-BE49-F238E27FC236}">
-                    <a16:creationId xmlns:a16="http://schemas.microsoft.com/office/drawing/2014/main" id="{74CB92D3-611A-4935-AE37-CECEE94817A0}"/>
-                  </a:ext>
-                </a:extLst>
-              </p:cNvPr>
-              <p:cNvPicPr/>
-              <p:nvPr/>
-            </p:nvPicPr>
-            <p:blipFill>
-              <a:blip r:embed="rId113"/>
-              <a:stretch>
-                <a:fillRect/>
-              </a:stretch>
-            </p:blipFill>
-            <p:spPr>
-              <a:xfrm>
-                <a:off x="5526626" y="1651508"/>
-                <a:ext cx="220320" cy="137160"/>
-              </a:xfrm>
-              <a:prstGeom prst="rect">
-                <a:avLst/>
-              </a:prstGeom>
-            </p:spPr>
-          </p:pic>
-        </mc:Fallback>
-      </mc:AlternateContent>
-      <mc:AlternateContent xmlns:mc="http://schemas.openxmlformats.org/markup-compatibility/2006">
-        <mc:Choice xmlns:p14="http://schemas.microsoft.com/office/powerpoint/2010/main" xmlns:aink="http://schemas.microsoft.com/office/drawing/2016/ink" Requires="p14 aink">
-          <p:contentPart p14:bwMode="auto" r:id="rId114">
-            <p14:nvContentPartPr>
-              <p14:cNvPr id="60" name="Ink 59">
-                <a:extLst>
-                  <a:ext uri="{FF2B5EF4-FFF2-40B4-BE49-F238E27FC236}">
-                    <a16:creationId xmlns:a16="http://schemas.microsoft.com/office/drawing/2014/main" id="{19077785-FC30-459B-AEBD-2A6DF522F4DE}"/>
-                  </a:ext>
-                </a:extLst>
-              </p14:cNvPr>
-              <p14:cNvContentPartPr/>
-              <p14:nvPr/>
-            </p14:nvContentPartPr>
-            <p14:xfrm>
-              <a:off x="5739026" y="1448468"/>
-              <a:ext cx="123480" cy="275760"/>
-            </p14:xfrm>
-          </p:contentPart>
-        </mc:Choice>
-        <mc:Fallback>
-          <p:pic>
-            <p:nvPicPr>
-              <p:cNvPr id="60" name="Ink 59">
-                <a:extLst>
-                  <a:ext uri="{FF2B5EF4-FFF2-40B4-BE49-F238E27FC236}">
-                    <a16:creationId xmlns:a16="http://schemas.microsoft.com/office/drawing/2014/main" id="{19077785-FC30-459B-AEBD-2A6DF522F4DE}"/>
-                  </a:ext>
-                </a:extLst>
-              </p:cNvPr>
-              <p:cNvPicPr/>
-              <p:nvPr/>
-            </p:nvPicPr>
-            <p:blipFill>
-              <a:blip r:embed="rId115"/>
-              <a:stretch>
-                <a:fillRect/>
-              </a:stretch>
-            </p:blipFill>
-            <p:spPr>
-              <a:xfrm>
-                <a:off x="5721386" y="1430468"/>
-                <a:ext cx="159120" cy="311400"/>
-              </a:xfrm>
-              <a:prstGeom prst="rect">
-                <a:avLst/>
-              </a:prstGeom>
-            </p:spPr>
-          </p:pic>
-        </mc:Fallback>
-      </mc:AlternateContent>
-      <mc:AlternateContent xmlns:mc="http://schemas.openxmlformats.org/markup-compatibility/2006">
-        <mc:Choice xmlns:p14="http://schemas.microsoft.com/office/powerpoint/2010/main" xmlns:aink="http://schemas.microsoft.com/office/drawing/2016/ink" Requires="p14 aink">
-          <p:contentPart p14:bwMode="auto" r:id="rId116">
-            <p14:nvContentPartPr>
-              <p14:cNvPr id="61" name="Ink 60">
-                <a:extLst>
-                  <a:ext uri="{FF2B5EF4-FFF2-40B4-BE49-F238E27FC236}">
-                    <a16:creationId xmlns:a16="http://schemas.microsoft.com/office/drawing/2014/main" id="{89AF4E95-C464-4825-87A0-E20854833724}"/>
-                  </a:ext>
-                </a:extLst>
-              </p14:cNvPr>
-              <p14:cNvContentPartPr/>
-              <p14:nvPr/>
-            </p14:nvContentPartPr>
-            <p14:xfrm>
-              <a:off x="5990306" y="1471148"/>
-              <a:ext cx="194400" cy="194040"/>
-            </p14:xfrm>
-          </p:contentPart>
-        </mc:Choice>
-        <mc:Fallback>
-          <p:pic>
-            <p:nvPicPr>
-              <p:cNvPr id="61" name="Ink 60">
-                <a:extLst>
-                  <a:ext uri="{FF2B5EF4-FFF2-40B4-BE49-F238E27FC236}">
-                    <a16:creationId xmlns:a16="http://schemas.microsoft.com/office/drawing/2014/main" id="{89AF4E95-C464-4825-87A0-E20854833724}"/>
-                  </a:ext>
-                </a:extLst>
-              </p:cNvPr>
-              <p:cNvPicPr/>
-              <p:nvPr/>
-            </p:nvPicPr>
-            <p:blipFill>
-              <a:blip r:embed="rId117"/>
-              <a:stretch>
-                <a:fillRect/>
-              </a:stretch>
-            </p:blipFill>
-            <p:spPr>
-              <a:xfrm>
-                <a:off x="5972666" y="1453508"/>
-                <a:ext cx="230040" cy="229680"/>
-              </a:xfrm>
-              <a:prstGeom prst="rect">
-                <a:avLst/>
-              </a:prstGeom>
-            </p:spPr>
-          </p:pic>
-        </mc:Fallback>
-      </mc:AlternateContent>
-      <mc:AlternateContent xmlns:mc="http://schemas.openxmlformats.org/markup-compatibility/2006">
-        <mc:Choice xmlns:p14="http://schemas.microsoft.com/office/powerpoint/2010/main" xmlns:aink="http://schemas.microsoft.com/office/drawing/2016/ink" Requires="p14 aink">
-          <p:contentPart p14:bwMode="auto" r:id="rId118">
-            <p14:nvContentPartPr>
-              <p14:cNvPr id="62" name="Ink 61">
-                <a:extLst>
-                  <a:ext uri="{FF2B5EF4-FFF2-40B4-BE49-F238E27FC236}">
-                    <a16:creationId xmlns:a16="http://schemas.microsoft.com/office/drawing/2014/main" id="{BFC21D79-687C-437D-863F-11FFF7DB21CD}"/>
-                  </a:ext>
-                </a:extLst>
-              </p14:cNvPr>
-              <p14:cNvContentPartPr/>
-              <p14:nvPr/>
-            </p14:nvContentPartPr>
-            <p14:xfrm>
-              <a:off x="6252386" y="1592108"/>
-              <a:ext cx="128160" cy="222840"/>
-            </p14:xfrm>
-          </p:contentPart>
-        </mc:Choice>
-        <mc:Fallback>
-          <p:pic>
-            <p:nvPicPr>
-              <p:cNvPr id="62" name="Ink 61">
-                <a:extLst>
-                  <a:ext uri="{FF2B5EF4-FFF2-40B4-BE49-F238E27FC236}">
-                    <a16:creationId xmlns:a16="http://schemas.microsoft.com/office/drawing/2014/main" id="{BFC21D79-687C-437D-863F-11FFF7DB21CD}"/>
-                  </a:ext>
-                </a:extLst>
-              </p:cNvPr>
-              <p:cNvPicPr/>
-              <p:nvPr/>
-            </p:nvPicPr>
-            <p:blipFill>
-              <a:blip r:embed="rId119"/>
-              <a:stretch>
-                <a:fillRect/>
-              </a:stretch>
-            </p:blipFill>
-            <p:spPr>
-              <a:xfrm>
-                <a:off x="6234746" y="1574108"/>
-                <a:ext cx="163800" cy="258480"/>
-              </a:xfrm>
-              <a:prstGeom prst="rect">
-                <a:avLst/>
-              </a:prstGeom>
-            </p:spPr>
-          </p:pic>
-        </mc:Fallback>
-      </mc:AlternateContent>
-      <mc:AlternateContent xmlns:mc="http://schemas.openxmlformats.org/markup-compatibility/2006">
-        <mc:Choice xmlns:p14="http://schemas.microsoft.com/office/powerpoint/2010/main" xmlns:aink="http://schemas.microsoft.com/office/drawing/2016/ink" Requires="p14 aink">
-          <p:contentPart p14:bwMode="auto" r:id="rId120">
-            <p14:nvContentPartPr>
-              <p14:cNvPr id="63" name="Ink 62">
-                <a:extLst>
-                  <a:ext uri="{FF2B5EF4-FFF2-40B4-BE49-F238E27FC236}">
-                    <a16:creationId xmlns:a16="http://schemas.microsoft.com/office/drawing/2014/main" id="{AD23CDEF-026D-4C4B-A08C-75CFB90F9157}"/>
-                  </a:ext>
-                </a:extLst>
-              </p14:cNvPr>
-              <p14:cNvContentPartPr/>
-              <p14:nvPr/>
-            </p14:nvContentPartPr>
-            <p14:xfrm>
-              <a:off x="6380906" y="1585268"/>
-              <a:ext cx="111600" cy="197640"/>
-            </p14:xfrm>
-          </p:contentPart>
-        </mc:Choice>
-        <mc:Fallback>
-          <p:pic>
-            <p:nvPicPr>
-              <p:cNvPr id="63" name="Ink 62">
-                <a:extLst>
-                  <a:ext uri="{FF2B5EF4-FFF2-40B4-BE49-F238E27FC236}">
-                    <a16:creationId xmlns:a16="http://schemas.microsoft.com/office/drawing/2014/main" id="{AD23CDEF-026D-4C4B-A08C-75CFB90F9157}"/>
-                  </a:ext>
-                </a:extLst>
-              </p:cNvPr>
-              <p:cNvPicPr/>
-              <p:nvPr/>
-            </p:nvPicPr>
-            <p:blipFill>
-              <a:blip r:embed="rId121"/>
-              <a:stretch>
-                <a:fillRect/>
-              </a:stretch>
-            </p:blipFill>
-            <p:spPr>
-              <a:xfrm>
-                <a:off x="6363266" y="1567628"/>
-                <a:ext cx="147240" cy="233280"/>
-              </a:xfrm>
-              <a:prstGeom prst="rect">
-                <a:avLst/>
-              </a:prstGeom>
-            </p:spPr>
-          </p:pic>
-        </mc:Fallback>
-      </mc:AlternateContent>
-      <mc:AlternateContent xmlns:mc="http://schemas.openxmlformats.org/markup-compatibility/2006">
-        <mc:Choice xmlns:p14="http://schemas.microsoft.com/office/powerpoint/2010/main" xmlns:aink="http://schemas.microsoft.com/office/drawing/2016/ink" Requires="p14 aink">
-          <p:contentPart p14:bwMode="auto" r:id="rId122">
-            <p14:nvContentPartPr>
-              <p14:cNvPr id="64" name="Ink 63">
-                <a:extLst>
-                  <a:ext uri="{FF2B5EF4-FFF2-40B4-BE49-F238E27FC236}">
-                    <a16:creationId xmlns:a16="http://schemas.microsoft.com/office/drawing/2014/main" id="{7602BFA0-4ECE-4F1E-BA3A-5FF45C369957}"/>
-                  </a:ext>
-                </a:extLst>
-              </p14:cNvPr>
-              <p14:cNvContentPartPr/>
-              <p14:nvPr/>
-            </p14:nvContentPartPr>
-            <p14:xfrm>
-              <a:off x="6548306" y="1609748"/>
-              <a:ext cx="177120" cy="86760"/>
-            </p14:xfrm>
-          </p:contentPart>
-        </mc:Choice>
-        <mc:Fallback>
-          <p:pic>
-            <p:nvPicPr>
-              <p:cNvPr id="64" name="Ink 63">
-                <a:extLst>
-                  <a:ext uri="{FF2B5EF4-FFF2-40B4-BE49-F238E27FC236}">
-                    <a16:creationId xmlns:a16="http://schemas.microsoft.com/office/drawing/2014/main" id="{7602BFA0-4ECE-4F1E-BA3A-5FF45C369957}"/>
-                  </a:ext>
-                </a:extLst>
-              </p:cNvPr>
-              <p:cNvPicPr/>
-              <p:nvPr/>
-            </p:nvPicPr>
-            <p:blipFill>
-              <a:blip r:embed="rId123"/>
-              <a:stretch>
-                <a:fillRect/>
-              </a:stretch>
-            </p:blipFill>
-            <p:spPr>
-              <a:xfrm>
-                <a:off x="6530666" y="1591748"/>
-                <a:ext cx="212760" cy="122400"/>
-              </a:xfrm>
-              <a:prstGeom prst="rect">
-                <a:avLst/>
-              </a:prstGeom>
-            </p:spPr>
-          </p:pic>
-        </mc:Fallback>
-      </mc:AlternateContent>
-      <mc:AlternateContent xmlns:mc="http://schemas.openxmlformats.org/markup-compatibility/2006">
-        <mc:Choice xmlns:p14="http://schemas.microsoft.com/office/powerpoint/2010/main" Requires="p14">
-          <p:contentPart p14:bwMode="auto" r:id="rId124">
             <p14:nvContentPartPr>
               <p14:cNvPr id="88" name="Ink 87">
                 <a:extLst>
@@ -8752,7 +8133,7 @@
             </p14:xfrm>
           </p:contentPart>
         </mc:Choice>
-        <mc:Fallback>
+        <mc:Fallback xmlns="">
           <p:pic>
             <p:nvPicPr>
               <p:cNvPr id="88" name="Ink 87">
@@ -8783,111 +8164,9 @@
           </p:pic>
         </mc:Fallback>
       </mc:AlternateContent>
-      <mc:AlternateContent xmlns:mc="http://schemas.openxmlformats.org/markup-compatibility/2006">
-        <mc:Choice xmlns:p14="http://schemas.microsoft.com/office/powerpoint/2010/main" Requires="p14">
+      <mc:AlternateContent xmlns:mc="http://schemas.openxmlformats.org/markup-compatibility/2006" xmlns:p14="http://schemas.microsoft.com/office/powerpoint/2010/main">
+        <mc:Choice Requires="p14">
           <p:contentPart p14:bwMode="auto" r:id="rId126">
-            <p14:nvContentPartPr>
-              <p14:cNvPr id="110" name="Ink 109">
-                <a:extLst>
-                  <a:ext uri="{FF2B5EF4-FFF2-40B4-BE49-F238E27FC236}">
-                    <a16:creationId xmlns:a16="http://schemas.microsoft.com/office/drawing/2014/main" id="{9125CFD1-6F54-4738-998B-7FB4160152C3}"/>
-                  </a:ext>
-                </a:extLst>
-              </p14:cNvPr>
-              <p14:cNvContentPartPr/>
-              <p14:nvPr/>
-            </p14:nvContentPartPr>
-            <p14:xfrm>
-              <a:off x="400586" y="2694068"/>
-              <a:ext cx="2037600" cy="1154520"/>
-            </p14:xfrm>
-          </p:contentPart>
-        </mc:Choice>
-        <mc:Fallback>
-          <p:pic>
-            <p:nvPicPr>
-              <p:cNvPr id="110" name="Ink 109">
-                <a:extLst>
-                  <a:ext uri="{FF2B5EF4-FFF2-40B4-BE49-F238E27FC236}">
-                    <a16:creationId xmlns:a16="http://schemas.microsoft.com/office/drawing/2014/main" id="{9125CFD1-6F54-4738-998B-7FB4160152C3}"/>
-                  </a:ext>
-                </a:extLst>
-              </p:cNvPr>
-              <p:cNvPicPr/>
-              <p:nvPr/>
-            </p:nvPicPr>
-            <p:blipFill>
-              <a:blip r:embed="rId127"/>
-              <a:stretch>
-                <a:fillRect/>
-              </a:stretch>
-            </p:blipFill>
-            <p:spPr>
-              <a:xfrm>
-                <a:off x="391586" y="2685068"/>
-                <a:ext cx="2055240" cy="1172160"/>
-              </a:xfrm>
-              <a:prstGeom prst="rect">
-                <a:avLst/>
-              </a:prstGeom>
-            </p:spPr>
-          </p:pic>
-        </mc:Fallback>
-      </mc:AlternateContent>
-      <mc:AlternateContent xmlns:mc="http://schemas.openxmlformats.org/markup-compatibility/2006">
-        <mc:Choice xmlns:p14="http://schemas.microsoft.com/office/powerpoint/2010/main" Requires="p14">
-          <p:contentPart p14:bwMode="auto" r:id="rId128">
-            <p14:nvContentPartPr>
-              <p14:cNvPr id="113" name="Ink 112">
-                <a:extLst>
-                  <a:ext uri="{FF2B5EF4-FFF2-40B4-BE49-F238E27FC236}">
-                    <a16:creationId xmlns:a16="http://schemas.microsoft.com/office/drawing/2014/main" id="{DB1531BD-C3B4-4AAC-BFF2-AA34AD57665B}"/>
-                  </a:ext>
-                </a:extLst>
-              </p14:cNvPr>
-              <p14:cNvContentPartPr/>
-              <p14:nvPr/>
-            </p14:nvContentPartPr>
-            <p14:xfrm>
-              <a:off x="2223986" y="1609748"/>
-              <a:ext cx="1026000" cy="1541520"/>
-            </p14:xfrm>
-          </p:contentPart>
-        </mc:Choice>
-        <mc:Fallback>
-          <p:pic>
-            <p:nvPicPr>
-              <p:cNvPr id="113" name="Ink 112">
-                <a:extLst>
-                  <a:ext uri="{FF2B5EF4-FFF2-40B4-BE49-F238E27FC236}">
-                    <a16:creationId xmlns:a16="http://schemas.microsoft.com/office/drawing/2014/main" id="{DB1531BD-C3B4-4AAC-BFF2-AA34AD57665B}"/>
-                  </a:ext>
-                </a:extLst>
-              </p:cNvPr>
-              <p:cNvPicPr/>
-              <p:nvPr/>
-            </p:nvPicPr>
-            <p:blipFill>
-              <a:blip r:embed="rId129"/>
-              <a:stretch>
-                <a:fillRect/>
-              </a:stretch>
-            </p:blipFill>
-            <p:spPr>
-              <a:xfrm>
-                <a:off x="2214989" y="1601108"/>
-                <a:ext cx="1043634" cy="1559160"/>
-              </a:xfrm>
-              <a:prstGeom prst="rect">
-                <a:avLst/>
-              </a:prstGeom>
-            </p:spPr>
-          </p:pic>
-        </mc:Fallback>
-      </mc:AlternateContent>
-      <mc:AlternateContent xmlns:mc="http://schemas.openxmlformats.org/markup-compatibility/2006">
-        <mc:Choice xmlns:p14="http://schemas.microsoft.com/office/powerpoint/2010/main" Requires="p14">
-          <p:contentPart p14:bwMode="auto" r:id="rId130">
             <p14:nvContentPartPr>
               <p14:cNvPr id="137" name="Ink 136">
                 <a:extLst>
@@ -8905,7 +8184,7 @@
             </p14:xfrm>
           </p:contentPart>
         </mc:Choice>
-        <mc:Fallback>
+        <mc:Fallback xmlns="">
           <p:pic>
             <p:nvPicPr>
               <p:cNvPr id="137" name="Ink 136">
@@ -8928,6 +8207,210 @@
               <a:xfrm>
                 <a:off x="4897707" y="2452508"/>
                 <a:ext cx="3119038" cy="1147680"/>
+              </a:xfrm>
+              <a:prstGeom prst="rect">
+                <a:avLst/>
+              </a:prstGeom>
+            </p:spPr>
+          </p:pic>
+        </mc:Fallback>
+      </mc:AlternateContent>
+      <mc:AlternateContent xmlns:mc="http://schemas.openxmlformats.org/markup-compatibility/2006">
+        <mc:Choice xmlns:p14="http://schemas.microsoft.com/office/powerpoint/2010/main" Requires="p14">
+          <p:contentPart p14:bwMode="auto" r:id="rId132">
+            <p14:nvContentPartPr>
+              <p14:cNvPr id="2" name="Ink 1">
+                <a:extLst>
+                  <a:ext uri="{FF2B5EF4-FFF2-40B4-BE49-F238E27FC236}">
+                    <a16:creationId xmlns:a16="http://schemas.microsoft.com/office/drawing/2014/main" id="{68B1C06A-CF47-4AFA-B93C-0B172CDC8D15}"/>
+                  </a:ext>
+                </a:extLst>
+              </p14:cNvPr>
+              <p14:cNvContentPartPr/>
+              <p14:nvPr/>
+            </p14:nvContentPartPr>
+            <p14:xfrm>
+              <a:off x="3720146" y="1380788"/>
+              <a:ext cx="235440" cy="548280"/>
+            </p14:xfrm>
+          </p:contentPart>
+        </mc:Choice>
+        <mc:Fallback>
+          <p:pic>
+            <p:nvPicPr>
+              <p:cNvPr id="2" name="Ink 1">
+                <a:extLst>
+                  <a:ext uri="{FF2B5EF4-FFF2-40B4-BE49-F238E27FC236}">
+                    <a16:creationId xmlns:a16="http://schemas.microsoft.com/office/drawing/2014/main" id="{68B1C06A-CF47-4AFA-B93C-0B172CDC8D15}"/>
+                  </a:ext>
+                </a:extLst>
+              </p:cNvPr>
+              <p:cNvPicPr/>
+              <p:nvPr/>
+            </p:nvPicPr>
+            <p:blipFill>
+              <a:blip r:embed="rId133"/>
+              <a:stretch>
+                <a:fillRect/>
+              </a:stretch>
+            </p:blipFill>
+            <p:spPr>
+              <a:xfrm>
+                <a:off x="3711506" y="1371788"/>
+                <a:ext cx="253080" cy="565920"/>
+              </a:xfrm>
+              <a:prstGeom prst="rect">
+                <a:avLst/>
+              </a:prstGeom>
+            </p:spPr>
+          </p:pic>
+        </mc:Fallback>
+      </mc:AlternateContent>
+      <mc:AlternateContent xmlns:mc="http://schemas.openxmlformats.org/markup-compatibility/2006">
+        <mc:Choice xmlns:p14="http://schemas.microsoft.com/office/powerpoint/2010/main" Requires="p14">
+          <p:contentPart p14:bwMode="auto" r:id="rId134">
+            <p14:nvContentPartPr>
+              <p14:cNvPr id="3" name="Ink 2">
+                <a:extLst>
+                  <a:ext uri="{FF2B5EF4-FFF2-40B4-BE49-F238E27FC236}">
+                    <a16:creationId xmlns:a16="http://schemas.microsoft.com/office/drawing/2014/main" id="{B41CCB51-5BD3-49EC-92BF-461FAFB68AC2}"/>
+                  </a:ext>
+                </a:extLst>
+              </p14:cNvPr>
+              <p14:cNvContentPartPr/>
+              <p14:nvPr/>
+            </p14:nvContentPartPr>
+            <p14:xfrm>
+              <a:off x="2042186" y="1998188"/>
+              <a:ext cx="1011240" cy="444240"/>
+            </p14:xfrm>
+          </p:contentPart>
+        </mc:Choice>
+        <mc:Fallback>
+          <p:pic>
+            <p:nvPicPr>
+              <p:cNvPr id="3" name="Ink 2">
+                <a:extLst>
+                  <a:ext uri="{FF2B5EF4-FFF2-40B4-BE49-F238E27FC236}">
+                    <a16:creationId xmlns:a16="http://schemas.microsoft.com/office/drawing/2014/main" id="{B41CCB51-5BD3-49EC-92BF-461FAFB68AC2}"/>
+                  </a:ext>
+                </a:extLst>
+              </p:cNvPr>
+              <p:cNvPicPr/>
+              <p:nvPr/>
+            </p:nvPicPr>
+            <p:blipFill>
+              <a:blip r:embed="rId135"/>
+              <a:stretch>
+                <a:fillRect/>
+              </a:stretch>
+            </p:blipFill>
+            <p:spPr>
+              <a:xfrm>
+                <a:off x="2033186" y="1989188"/>
+                <a:ext cx="1028880" cy="461880"/>
+              </a:xfrm>
+              <a:prstGeom prst="rect">
+                <a:avLst/>
+              </a:prstGeom>
+            </p:spPr>
+          </p:pic>
+        </mc:Fallback>
+      </mc:AlternateContent>
+      <mc:AlternateContent xmlns:mc="http://schemas.openxmlformats.org/markup-compatibility/2006">
+        <mc:Choice xmlns:p14="http://schemas.microsoft.com/office/powerpoint/2010/main" Requires="p14">
+          <p:contentPart p14:bwMode="auto" r:id="rId136">
+            <p14:nvContentPartPr>
+              <p14:cNvPr id="75" name="Ink 74">
+                <a:extLst>
+                  <a:ext uri="{FF2B5EF4-FFF2-40B4-BE49-F238E27FC236}">
+                    <a16:creationId xmlns:a16="http://schemas.microsoft.com/office/drawing/2014/main" id="{A96C995B-462E-4CBD-9F5F-FA2D252DAA67}"/>
+                  </a:ext>
+                </a:extLst>
+              </p14:cNvPr>
+              <p14:cNvContentPartPr/>
+              <p14:nvPr/>
+            </p14:nvContentPartPr>
+            <p14:xfrm>
+              <a:off x="4613306" y="3041108"/>
+              <a:ext cx="3301560" cy="2179800"/>
+            </p14:xfrm>
+          </p:contentPart>
+        </mc:Choice>
+        <mc:Fallback>
+          <p:pic>
+            <p:nvPicPr>
+              <p:cNvPr id="75" name="Ink 74">
+                <a:extLst>
+                  <a:ext uri="{FF2B5EF4-FFF2-40B4-BE49-F238E27FC236}">
+                    <a16:creationId xmlns:a16="http://schemas.microsoft.com/office/drawing/2014/main" id="{A96C995B-462E-4CBD-9F5F-FA2D252DAA67}"/>
+                  </a:ext>
+                </a:extLst>
+              </p:cNvPr>
+              <p:cNvPicPr/>
+              <p:nvPr/>
+            </p:nvPicPr>
+            <p:blipFill>
+              <a:blip r:embed="rId137"/>
+              <a:stretch>
+                <a:fillRect/>
+              </a:stretch>
+            </p:blipFill>
+            <p:spPr>
+              <a:xfrm>
+                <a:off x="4604306" y="3032108"/>
+                <a:ext cx="3319200" cy="2197440"/>
+              </a:xfrm>
+              <a:prstGeom prst="rect">
+                <a:avLst/>
+              </a:prstGeom>
+            </p:spPr>
+          </p:pic>
+        </mc:Fallback>
+      </mc:AlternateContent>
+      <mc:AlternateContent xmlns:mc="http://schemas.openxmlformats.org/markup-compatibility/2006">
+        <mc:Choice xmlns:p14="http://schemas.microsoft.com/office/powerpoint/2010/main" Requires="p14">
+          <p:contentPart p14:bwMode="auto" r:id="rId138">
+            <p14:nvContentPartPr>
+              <p14:cNvPr id="83" name="Ink 82">
+                <a:extLst>
+                  <a:ext uri="{FF2B5EF4-FFF2-40B4-BE49-F238E27FC236}">
+                    <a16:creationId xmlns:a16="http://schemas.microsoft.com/office/drawing/2014/main" id="{4D506178-0D00-43C9-A8D5-828734B4739C}"/>
+                  </a:ext>
+                </a:extLst>
+              </p14:cNvPr>
+              <p14:cNvContentPartPr/>
+              <p14:nvPr/>
+            </p14:nvContentPartPr>
+            <p14:xfrm>
+              <a:off x="5559386" y="1396268"/>
+              <a:ext cx="1265400" cy="365760"/>
+            </p14:xfrm>
+          </p:contentPart>
+        </mc:Choice>
+        <mc:Fallback>
+          <p:pic>
+            <p:nvPicPr>
+              <p:cNvPr id="83" name="Ink 82">
+                <a:extLst>
+                  <a:ext uri="{FF2B5EF4-FFF2-40B4-BE49-F238E27FC236}">
+                    <a16:creationId xmlns:a16="http://schemas.microsoft.com/office/drawing/2014/main" id="{4D506178-0D00-43C9-A8D5-828734B4739C}"/>
+                  </a:ext>
+                </a:extLst>
+              </p:cNvPr>
+              <p:cNvPicPr/>
+              <p:nvPr/>
+            </p:nvPicPr>
+            <p:blipFill>
+              <a:blip r:embed="rId139"/>
+              <a:stretch>
+                <a:fillRect/>
+              </a:stretch>
+            </p:blipFill>
+            <p:spPr>
+              <a:xfrm>
+                <a:off x="5550746" y="1387277"/>
+                <a:ext cx="1283040" cy="383383"/>
               </a:xfrm>
               <a:prstGeom prst="rect">
                 <a:avLst/>

</xml_diff>